<commit_message>
fix slide after fix after fix after fix
</commit_message>
<xml_diff>
--- a/งานนำเสนอ1.pptx
+++ b/งานนำเสนอ1.pptx
@@ -4,19 +4,30 @@
   <p:sldMasterIdLst>
     <p:sldMasterId id="2147483648" r:id="rId1"/>
   </p:sldMasterIdLst>
+  <p:notesMasterIdLst>
+    <p:notesMasterId r:id="rId22"/>
+  </p:notesMasterIdLst>
   <p:sldIdLst>
     <p:sldId id="257" r:id="rId2"/>
-    <p:sldId id="256" r:id="rId3"/>
-    <p:sldId id="258" r:id="rId4"/>
-    <p:sldId id="259" r:id="rId5"/>
-    <p:sldId id="260" r:id="rId6"/>
-    <p:sldId id="261" r:id="rId7"/>
-    <p:sldId id="262" r:id="rId8"/>
-    <p:sldId id="263" r:id="rId9"/>
-    <p:sldId id="264" r:id="rId10"/>
-    <p:sldId id="265" r:id="rId11"/>
-    <p:sldId id="266" r:id="rId12"/>
-    <p:sldId id="267" r:id="rId13"/>
+    <p:sldId id="268" r:id="rId3"/>
+    <p:sldId id="269" r:id="rId4"/>
+    <p:sldId id="270" r:id="rId5"/>
+    <p:sldId id="271" r:id="rId6"/>
+    <p:sldId id="272" r:id="rId7"/>
+    <p:sldId id="273" r:id="rId8"/>
+    <p:sldId id="274" r:id="rId9"/>
+    <p:sldId id="275" r:id="rId10"/>
+    <p:sldId id="256" r:id="rId11"/>
+    <p:sldId id="258" r:id="rId12"/>
+    <p:sldId id="259" r:id="rId13"/>
+    <p:sldId id="260" r:id="rId14"/>
+    <p:sldId id="261" r:id="rId15"/>
+    <p:sldId id="262" r:id="rId16"/>
+    <p:sldId id="263" r:id="rId17"/>
+    <p:sldId id="264" r:id="rId18"/>
+    <p:sldId id="265" r:id="rId19"/>
+    <p:sldId id="266" r:id="rId20"/>
+    <p:sldId id="267" r:id="rId21"/>
   </p:sldIdLst>
   <p:sldSz cx="12192000" cy="6858000"/>
   <p:notesSz cx="6858000" cy="9144000"/>
@@ -127,13 +138,13 @@
 <pc:chgInfo xmlns:a="http://schemas.openxmlformats.org/drawingml/2006/main" xmlns:r="http://schemas.openxmlformats.org/officeDocument/2006/relationships" xmlns:ac="http://schemas.microsoft.com/office/drawing/2013/main/command" xmlns:pc="http://schemas.microsoft.com/office/powerpoint/2013/main/command">
   <pc:docChgLst>
     <pc:chgData name="Jirayut Phothawilkiat" userId="377d1d9b-678a-47d3-abab-d54cd61b47aa" providerId="ADAL" clId="{9C11F69D-CE34-45E0-9802-26A1F77F75AD}"/>
-    <pc:docChg chg="undo custSel addSld modSld sldOrd">
-      <pc:chgData name="Jirayut Phothawilkiat" userId="377d1d9b-678a-47d3-abab-d54cd61b47aa" providerId="ADAL" clId="{9C11F69D-CE34-45E0-9802-26A1F77F75AD}" dt="2024-04-20T07:51:26.157" v="541" actId="1036"/>
+    <pc:docChg chg="undo custSel addSld delSld modSld sldOrd">
+      <pc:chgData name="Jirayut Phothawilkiat" userId="377d1d9b-678a-47d3-abab-d54cd61b47aa" providerId="ADAL" clId="{9C11F69D-CE34-45E0-9802-26A1F77F75AD}" dt="2024-04-26T10:10:07.154" v="893" actId="1076"/>
       <pc:docMkLst>
         <pc:docMk/>
       </pc:docMkLst>
       <pc:sldChg chg="addSp delSp modSp mod">
-        <pc:chgData name="Jirayut Phothawilkiat" userId="377d1d9b-678a-47d3-abab-d54cd61b47aa" providerId="ADAL" clId="{9C11F69D-CE34-45E0-9802-26A1F77F75AD}" dt="2024-04-19T15:55:48.008" v="483" actId="1076"/>
+        <pc:chgData name="Jirayut Phothawilkiat" userId="377d1d9b-678a-47d3-abab-d54cd61b47aa" providerId="ADAL" clId="{9C11F69D-CE34-45E0-9802-26A1F77F75AD}" dt="2024-04-26T10:08:51.683" v="858" actId="20577"/>
         <pc:sldMkLst>
           <pc:docMk/>
           <pc:sldMk cId="1301947537" sldId="256"/>
@@ -155,7 +166,7 @@
           </ac:spMkLst>
         </pc:spChg>
         <pc:spChg chg="add mod">
-          <ac:chgData name="Jirayut Phothawilkiat" userId="377d1d9b-678a-47d3-abab-d54cd61b47aa" providerId="ADAL" clId="{9C11F69D-CE34-45E0-9802-26A1F77F75AD}" dt="2024-04-19T15:23:49.370" v="86" actId="20577"/>
+          <ac:chgData name="Jirayut Phothawilkiat" userId="377d1d9b-678a-47d3-abab-d54cd61b47aa" providerId="ADAL" clId="{9C11F69D-CE34-45E0-9802-26A1F77F75AD}" dt="2024-04-26T10:08:51.683" v="858" actId="20577"/>
           <ac:spMkLst>
             <pc:docMk/>
             <pc:sldMk cId="1301947537" sldId="256"/>
@@ -252,7 +263,7 @@
         </pc:picChg>
       </pc:sldChg>
       <pc:sldChg chg="addSp modSp add mod ord">
-        <pc:chgData name="Jirayut Phothawilkiat" userId="377d1d9b-678a-47d3-abab-d54cd61b47aa" providerId="ADAL" clId="{9C11F69D-CE34-45E0-9802-26A1F77F75AD}" dt="2024-04-19T15:34:23.784" v="160" actId="1076"/>
+        <pc:chgData name="Jirayut Phothawilkiat" userId="377d1d9b-678a-47d3-abab-d54cd61b47aa" providerId="ADAL" clId="{9C11F69D-CE34-45E0-9802-26A1F77F75AD}" dt="2024-04-26T10:10:07.154" v="893" actId="1076"/>
         <pc:sldMkLst>
           <pc:docMk/>
           <pc:sldMk cId="1618823253" sldId="257"/>
@@ -281,15 +292,39 @@
             <ac:spMk id="4" creationId="{EDE25388-F283-E29A-1A02-50B15ACB9EA3}"/>
           </ac:spMkLst>
         </pc:spChg>
+        <pc:spChg chg="mod">
+          <ac:chgData name="Jirayut Phothawilkiat" userId="377d1d9b-678a-47d3-abab-d54cd61b47aa" providerId="ADAL" clId="{9C11F69D-CE34-45E0-9802-26A1F77F75AD}" dt="2024-04-26T10:07:49.659" v="830" actId="255"/>
+          <ac:spMkLst>
+            <pc:docMk/>
+            <pc:sldMk cId="1618823253" sldId="257"/>
+            <ac:spMk id="5" creationId="{4FC3C662-55D7-B964-17EC-5A49534800FA}"/>
+          </ac:spMkLst>
+        </pc:spChg>
+        <pc:spChg chg="add mod">
+          <ac:chgData name="Jirayut Phothawilkiat" userId="377d1d9b-678a-47d3-abab-d54cd61b47aa" providerId="ADAL" clId="{9C11F69D-CE34-45E0-9802-26A1F77F75AD}" dt="2024-04-26T10:10:07.154" v="893" actId="1076"/>
+          <ac:spMkLst>
+            <pc:docMk/>
+            <pc:sldMk cId="1618823253" sldId="257"/>
+            <ac:spMk id="6" creationId="{BA5FB7F9-D609-BE13-E6CB-3A86A84EF991}"/>
+          </ac:spMkLst>
+        </pc:spChg>
+        <pc:spChg chg="add mod">
+          <ac:chgData name="Jirayut Phothawilkiat" userId="377d1d9b-678a-47d3-abab-d54cd61b47aa" providerId="ADAL" clId="{9C11F69D-CE34-45E0-9802-26A1F77F75AD}" dt="2024-04-26T10:10:07.154" v="893" actId="1076"/>
+          <ac:spMkLst>
+            <pc:docMk/>
+            <pc:sldMk cId="1618823253" sldId="257"/>
+            <ac:spMk id="7" creationId="{2F4F2964-A748-3A04-D2E6-DDA09F31AC64}"/>
+          </ac:spMkLst>
+        </pc:spChg>
       </pc:sldChg>
       <pc:sldChg chg="addSp delSp modSp add mod">
-        <pc:chgData name="Jirayut Phothawilkiat" userId="377d1d9b-678a-47d3-abab-d54cd61b47aa" providerId="ADAL" clId="{9C11F69D-CE34-45E0-9802-26A1F77F75AD}" dt="2024-04-19T15:35:52.673" v="196" actId="1076"/>
+        <pc:chgData name="Jirayut Phothawilkiat" userId="377d1d9b-678a-47d3-abab-d54cd61b47aa" providerId="ADAL" clId="{9C11F69D-CE34-45E0-9802-26A1F77F75AD}" dt="2024-04-26T10:08:55.124" v="861" actId="20577"/>
         <pc:sldMkLst>
           <pc:docMk/>
           <pc:sldMk cId="942632483" sldId="258"/>
         </pc:sldMkLst>
         <pc:spChg chg="add mod">
-          <ac:chgData name="Jirayut Phothawilkiat" userId="377d1d9b-678a-47d3-abab-d54cd61b47aa" providerId="ADAL" clId="{9C11F69D-CE34-45E0-9802-26A1F77F75AD}" dt="2024-04-19T15:23:54.433" v="88" actId="20577"/>
+          <ac:chgData name="Jirayut Phothawilkiat" userId="377d1d9b-678a-47d3-abab-d54cd61b47aa" providerId="ADAL" clId="{9C11F69D-CE34-45E0-9802-26A1F77F75AD}" dt="2024-04-26T10:08:55.124" v="861" actId="20577"/>
           <ac:spMkLst>
             <pc:docMk/>
             <pc:sldMk cId="942632483" sldId="258"/>
@@ -338,13 +373,13 @@
         </pc:picChg>
       </pc:sldChg>
       <pc:sldChg chg="addSp modSp add mod">
-        <pc:chgData name="Jirayut Phothawilkiat" userId="377d1d9b-678a-47d3-abab-d54cd61b47aa" providerId="ADAL" clId="{9C11F69D-CE34-45E0-9802-26A1F77F75AD}" dt="2024-04-19T16:01:11.230" v="484" actId="1076"/>
+        <pc:chgData name="Jirayut Phothawilkiat" userId="377d1d9b-678a-47d3-abab-d54cd61b47aa" providerId="ADAL" clId="{9C11F69D-CE34-45E0-9802-26A1F77F75AD}" dt="2024-04-26T10:08:58.855" v="864" actId="20577"/>
         <pc:sldMkLst>
           <pc:docMk/>
           <pc:sldMk cId="1978481048" sldId="259"/>
         </pc:sldMkLst>
         <pc:spChg chg="add mod">
-          <ac:chgData name="Jirayut Phothawilkiat" userId="377d1d9b-678a-47d3-abab-d54cd61b47aa" providerId="ADAL" clId="{9C11F69D-CE34-45E0-9802-26A1F77F75AD}" dt="2024-04-19T15:23:58.459" v="90" actId="20577"/>
+          <ac:chgData name="Jirayut Phothawilkiat" userId="377d1d9b-678a-47d3-abab-d54cd61b47aa" providerId="ADAL" clId="{9C11F69D-CE34-45E0-9802-26A1F77F75AD}" dt="2024-04-26T10:08:58.855" v="864" actId="20577"/>
           <ac:spMkLst>
             <pc:docMk/>
             <pc:sldMk cId="1978481048" sldId="259"/>
@@ -377,13 +412,13 @@
         </pc:picChg>
       </pc:sldChg>
       <pc:sldChg chg="addSp modSp add mod">
-        <pc:chgData name="Jirayut Phothawilkiat" userId="377d1d9b-678a-47d3-abab-d54cd61b47aa" providerId="ADAL" clId="{9C11F69D-CE34-45E0-9802-26A1F77F75AD}" dt="2024-04-19T15:37:18.552" v="231" actId="1076"/>
+        <pc:chgData name="Jirayut Phothawilkiat" userId="377d1d9b-678a-47d3-abab-d54cd61b47aa" providerId="ADAL" clId="{9C11F69D-CE34-45E0-9802-26A1F77F75AD}" dt="2024-04-26T10:09:01.887" v="867" actId="20577"/>
         <pc:sldMkLst>
           <pc:docMk/>
           <pc:sldMk cId="367910129" sldId="260"/>
         </pc:sldMkLst>
         <pc:spChg chg="add mod">
-          <ac:chgData name="Jirayut Phothawilkiat" userId="377d1d9b-678a-47d3-abab-d54cd61b47aa" providerId="ADAL" clId="{9C11F69D-CE34-45E0-9802-26A1F77F75AD}" dt="2024-04-19T15:24:04.443" v="92" actId="20577"/>
+          <ac:chgData name="Jirayut Phothawilkiat" userId="377d1d9b-678a-47d3-abab-d54cd61b47aa" providerId="ADAL" clId="{9C11F69D-CE34-45E0-9802-26A1F77F75AD}" dt="2024-04-26T10:09:01.887" v="867" actId="20577"/>
           <ac:spMkLst>
             <pc:docMk/>
             <pc:sldMk cId="367910129" sldId="260"/>
@@ -408,13 +443,13 @@
         </pc:picChg>
       </pc:sldChg>
       <pc:sldChg chg="addSp modSp add mod">
-        <pc:chgData name="Jirayut Phothawilkiat" userId="377d1d9b-678a-47d3-abab-d54cd61b47aa" providerId="ADAL" clId="{9C11F69D-CE34-45E0-9802-26A1F77F75AD}" dt="2024-04-19T15:37:46.923" v="245" actId="1076"/>
+        <pc:chgData name="Jirayut Phothawilkiat" userId="377d1d9b-678a-47d3-abab-d54cd61b47aa" providerId="ADAL" clId="{9C11F69D-CE34-45E0-9802-26A1F77F75AD}" dt="2024-04-26T10:09:04.777" v="870" actId="20577"/>
         <pc:sldMkLst>
           <pc:docMk/>
           <pc:sldMk cId="2050740203" sldId="261"/>
         </pc:sldMkLst>
         <pc:spChg chg="add mod">
-          <ac:chgData name="Jirayut Phothawilkiat" userId="377d1d9b-678a-47d3-abab-d54cd61b47aa" providerId="ADAL" clId="{9C11F69D-CE34-45E0-9802-26A1F77F75AD}" dt="2024-04-19T15:24:14.086" v="96" actId="20577"/>
+          <ac:chgData name="Jirayut Phothawilkiat" userId="377d1d9b-678a-47d3-abab-d54cd61b47aa" providerId="ADAL" clId="{9C11F69D-CE34-45E0-9802-26A1F77F75AD}" dt="2024-04-26T10:09:04.777" v="870" actId="20577"/>
           <ac:spMkLst>
             <pc:docMk/>
             <pc:sldMk cId="2050740203" sldId="261"/>
@@ -439,13 +474,13 @@
         </pc:picChg>
       </pc:sldChg>
       <pc:sldChg chg="addSp modSp add mod">
-        <pc:chgData name="Jirayut Phothawilkiat" userId="377d1d9b-678a-47d3-abab-d54cd61b47aa" providerId="ADAL" clId="{9C11F69D-CE34-45E0-9802-26A1F77F75AD}" dt="2024-04-19T15:38:22.337" v="270" actId="1076"/>
+        <pc:chgData name="Jirayut Phothawilkiat" userId="377d1d9b-678a-47d3-abab-d54cd61b47aa" providerId="ADAL" clId="{9C11F69D-CE34-45E0-9802-26A1F77F75AD}" dt="2024-04-26T10:09:08.738" v="873" actId="20577"/>
         <pc:sldMkLst>
           <pc:docMk/>
           <pc:sldMk cId="489752955" sldId="262"/>
         </pc:sldMkLst>
         <pc:spChg chg="add mod">
-          <ac:chgData name="Jirayut Phothawilkiat" userId="377d1d9b-678a-47d3-abab-d54cd61b47aa" providerId="ADAL" clId="{9C11F69D-CE34-45E0-9802-26A1F77F75AD}" dt="2024-04-19T15:24:20.413" v="98" actId="20577"/>
+          <ac:chgData name="Jirayut Phothawilkiat" userId="377d1d9b-678a-47d3-abab-d54cd61b47aa" providerId="ADAL" clId="{9C11F69D-CE34-45E0-9802-26A1F77F75AD}" dt="2024-04-26T10:09:08.738" v="873" actId="20577"/>
           <ac:spMkLst>
             <pc:docMk/>
             <pc:sldMk cId="489752955" sldId="262"/>
@@ -470,13 +505,13 @@
         </pc:picChg>
       </pc:sldChg>
       <pc:sldChg chg="addSp modSp add mod">
-        <pc:chgData name="Jirayut Phothawilkiat" userId="377d1d9b-678a-47d3-abab-d54cd61b47aa" providerId="ADAL" clId="{9C11F69D-CE34-45E0-9802-26A1F77F75AD}" dt="2024-04-19T15:38:48.202" v="286" actId="1076"/>
+        <pc:chgData name="Jirayut Phothawilkiat" userId="377d1d9b-678a-47d3-abab-d54cd61b47aa" providerId="ADAL" clId="{9C11F69D-CE34-45E0-9802-26A1F77F75AD}" dt="2024-04-26T10:09:12.046" v="876" actId="20577"/>
         <pc:sldMkLst>
           <pc:docMk/>
           <pc:sldMk cId="667543355" sldId="263"/>
         </pc:sldMkLst>
         <pc:spChg chg="add mod">
-          <ac:chgData name="Jirayut Phothawilkiat" userId="377d1d9b-678a-47d3-abab-d54cd61b47aa" providerId="ADAL" clId="{9C11F69D-CE34-45E0-9802-26A1F77F75AD}" dt="2024-04-19T15:24:26.413" v="100" actId="20577"/>
+          <ac:chgData name="Jirayut Phothawilkiat" userId="377d1d9b-678a-47d3-abab-d54cd61b47aa" providerId="ADAL" clId="{9C11F69D-CE34-45E0-9802-26A1F77F75AD}" dt="2024-04-26T10:09:12.046" v="876" actId="20577"/>
           <ac:spMkLst>
             <pc:docMk/>
             <pc:sldMk cId="667543355" sldId="263"/>
@@ -501,13 +536,13 @@
         </pc:picChg>
       </pc:sldChg>
       <pc:sldChg chg="addSp modSp add mod">
-        <pc:chgData name="Jirayut Phothawilkiat" userId="377d1d9b-678a-47d3-abab-d54cd61b47aa" providerId="ADAL" clId="{9C11F69D-CE34-45E0-9802-26A1F77F75AD}" dt="2024-04-19T15:39:18.435" v="305" actId="1076"/>
+        <pc:chgData name="Jirayut Phothawilkiat" userId="377d1d9b-678a-47d3-abab-d54cd61b47aa" providerId="ADAL" clId="{9C11F69D-CE34-45E0-9802-26A1F77F75AD}" dt="2024-04-26T10:09:15.051" v="879" actId="20577"/>
         <pc:sldMkLst>
           <pc:docMk/>
           <pc:sldMk cId="982277753" sldId="264"/>
         </pc:sldMkLst>
         <pc:spChg chg="add mod">
-          <ac:chgData name="Jirayut Phothawilkiat" userId="377d1d9b-678a-47d3-abab-d54cd61b47aa" providerId="ADAL" clId="{9C11F69D-CE34-45E0-9802-26A1F77F75AD}" dt="2024-04-19T15:24:34.871" v="104" actId="20577"/>
+          <ac:chgData name="Jirayut Phothawilkiat" userId="377d1d9b-678a-47d3-abab-d54cd61b47aa" providerId="ADAL" clId="{9C11F69D-CE34-45E0-9802-26A1F77F75AD}" dt="2024-04-26T10:09:15.051" v="879" actId="20577"/>
           <ac:spMkLst>
             <pc:docMk/>
             <pc:sldMk cId="982277753" sldId="264"/>
@@ -532,13 +567,13 @@
         </pc:picChg>
       </pc:sldChg>
       <pc:sldChg chg="addSp modSp add mod">
-        <pc:chgData name="Jirayut Phothawilkiat" userId="377d1d9b-678a-47d3-abab-d54cd61b47aa" providerId="ADAL" clId="{9C11F69D-CE34-45E0-9802-26A1F77F75AD}" dt="2024-04-19T15:39:40.206" v="327" actId="1076"/>
+        <pc:chgData name="Jirayut Phothawilkiat" userId="377d1d9b-678a-47d3-abab-d54cd61b47aa" providerId="ADAL" clId="{9C11F69D-CE34-45E0-9802-26A1F77F75AD}" dt="2024-04-26T10:09:18.231" v="881" actId="20577"/>
         <pc:sldMkLst>
           <pc:docMk/>
           <pc:sldMk cId="1492219135" sldId="265"/>
         </pc:sldMkLst>
         <pc:spChg chg="add mod">
-          <ac:chgData name="Jirayut Phothawilkiat" userId="377d1d9b-678a-47d3-abab-d54cd61b47aa" providerId="ADAL" clId="{9C11F69D-CE34-45E0-9802-26A1F77F75AD}" dt="2024-04-19T15:24:39.782" v="106" actId="20577"/>
+          <ac:chgData name="Jirayut Phothawilkiat" userId="377d1d9b-678a-47d3-abab-d54cd61b47aa" providerId="ADAL" clId="{9C11F69D-CE34-45E0-9802-26A1F77F75AD}" dt="2024-04-26T10:09:18.231" v="881" actId="20577"/>
           <ac:spMkLst>
             <pc:docMk/>
             <pc:sldMk cId="1492219135" sldId="265"/>
@@ -563,13 +598,13 @@
         </pc:picChg>
       </pc:sldChg>
       <pc:sldChg chg="addSp modSp add mod">
-        <pc:chgData name="Jirayut Phothawilkiat" userId="377d1d9b-678a-47d3-abab-d54cd61b47aa" providerId="ADAL" clId="{9C11F69D-CE34-45E0-9802-26A1F77F75AD}" dt="2024-04-19T15:40:29.745" v="350" actId="1076"/>
+        <pc:chgData name="Jirayut Phothawilkiat" userId="377d1d9b-678a-47d3-abab-d54cd61b47aa" providerId="ADAL" clId="{9C11F69D-CE34-45E0-9802-26A1F77F75AD}" dt="2024-04-26T10:09:21.197" v="883" actId="20577"/>
         <pc:sldMkLst>
           <pc:docMk/>
           <pc:sldMk cId="2936513065" sldId="266"/>
         </pc:sldMkLst>
         <pc:spChg chg="add mod">
-          <ac:chgData name="Jirayut Phothawilkiat" userId="377d1d9b-678a-47d3-abab-d54cd61b47aa" providerId="ADAL" clId="{9C11F69D-CE34-45E0-9802-26A1F77F75AD}" dt="2024-04-19T15:24:50.113" v="108" actId="20577"/>
+          <ac:chgData name="Jirayut Phothawilkiat" userId="377d1d9b-678a-47d3-abab-d54cd61b47aa" providerId="ADAL" clId="{9C11F69D-CE34-45E0-9802-26A1F77F75AD}" dt="2024-04-26T10:09:21.197" v="883" actId="20577"/>
           <ac:spMkLst>
             <pc:docMk/>
             <pc:sldMk cId="2936513065" sldId="266"/>
@@ -593,8 +628,8 @@
           </ac:picMkLst>
         </pc:picChg>
       </pc:sldChg>
-      <pc:sldChg chg="addSp modSp add mod">
-        <pc:chgData name="Jirayut Phothawilkiat" userId="377d1d9b-678a-47d3-abab-d54cd61b47aa" providerId="ADAL" clId="{9C11F69D-CE34-45E0-9802-26A1F77F75AD}" dt="2024-04-20T07:51:26.157" v="541" actId="1036"/>
+      <pc:sldChg chg="addSp delSp modSp add mod">
+        <pc:chgData name="Jirayut Phothawilkiat" userId="377d1d9b-678a-47d3-abab-d54cd61b47aa" providerId="ADAL" clId="{9C11F69D-CE34-45E0-9802-26A1F77F75AD}" dt="2024-04-26T10:09:25.414" v="887" actId="20577"/>
         <pc:sldMkLst>
           <pc:docMk/>
           <pc:sldMk cId="9958844" sldId="267"/>
@@ -608,7 +643,7 @@
           </ac:spMkLst>
         </pc:spChg>
         <pc:spChg chg="add mod">
-          <ac:chgData name="Jirayut Phothawilkiat" userId="377d1d9b-678a-47d3-abab-d54cd61b47aa" providerId="ADAL" clId="{9C11F69D-CE34-45E0-9802-26A1F77F75AD}" dt="2024-04-20T07:50:59.812" v="510" actId="1076"/>
+          <ac:chgData name="Jirayut Phothawilkiat" userId="377d1d9b-678a-47d3-abab-d54cd61b47aa" providerId="ADAL" clId="{9C11F69D-CE34-45E0-9802-26A1F77F75AD}" dt="2024-04-26T09:48:06.005" v="676" actId="1076"/>
           <ac:spMkLst>
             <pc:docMk/>
             <pc:sldMk cId="9958844" sldId="267"/>
@@ -616,7 +651,7 @@
           </ac:spMkLst>
         </pc:spChg>
         <pc:spChg chg="add mod">
-          <ac:chgData name="Jirayut Phothawilkiat" userId="377d1d9b-678a-47d3-abab-d54cd61b47aa" providerId="ADAL" clId="{9C11F69D-CE34-45E0-9802-26A1F77F75AD}" dt="2024-04-19T15:24:56.600" v="110" actId="20577"/>
+          <ac:chgData name="Jirayut Phothawilkiat" userId="377d1d9b-678a-47d3-abab-d54cd61b47aa" providerId="ADAL" clId="{9C11F69D-CE34-45E0-9802-26A1F77F75AD}" dt="2024-04-26T10:09:25.414" v="887" actId="20577"/>
           <ac:spMkLst>
             <pc:docMk/>
             <pc:sldMk cId="9958844" sldId="267"/>
@@ -624,7 +659,7 @@
           </ac:spMkLst>
         </pc:spChg>
         <pc:spChg chg="add mod">
-          <ac:chgData name="Jirayut Phothawilkiat" userId="377d1d9b-678a-47d3-abab-d54cd61b47aa" providerId="ADAL" clId="{9C11F69D-CE34-45E0-9802-26A1F77F75AD}" dt="2024-04-20T07:50:59.812" v="510" actId="1076"/>
+          <ac:chgData name="Jirayut Phothawilkiat" userId="377d1d9b-678a-47d3-abab-d54cd61b47aa" providerId="ADAL" clId="{9C11F69D-CE34-45E0-9802-26A1F77F75AD}" dt="2024-04-26T09:48:03.094" v="675" actId="1076"/>
           <ac:spMkLst>
             <pc:docMk/>
             <pc:sldMk cId="9958844" sldId="267"/>
@@ -632,7 +667,7 @@
           </ac:spMkLst>
         </pc:spChg>
         <pc:spChg chg="add mod">
-          <ac:chgData name="Jirayut Phothawilkiat" userId="377d1d9b-678a-47d3-abab-d54cd61b47aa" providerId="ADAL" clId="{9C11F69D-CE34-45E0-9802-26A1F77F75AD}" dt="2024-04-20T07:51:26.157" v="541" actId="1036"/>
+          <ac:chgData name="Jirayut Phothawilkiat" userId="377d1d9b-678a-47d3-abab-d54cd61b47aa" providerId="ADAL" clId="{9C11F69D-CE34-45E0-9802-26A1F77F75AD}" dt="2024-04-26T09:48:16.941" v="679" actId="1076"/>
           <ac:spMkLst>
             <pc:docMk/>
             <pc:sldMk cId="9958844" sldId="267"/>
@@ -640,7 +675,7 @@
           </ac:spMkLst>
         </pc:spChg>
         <pc:spChg chg="add mod">
-          <ac:chgData name="Jirayut Phothawilkiat" userId="377d1d9b-678a-47d3-abab-d54cd61b47aa" providerId="ADAL" clId="{9C11F69D-CE34-45E0-9802-26A1F77F75AD}" dt="2024-04-20T07:51:26.157" v="541" actId="1036"/>
+          <ac:chgData name="Jirayut Phothawilkiat" userId="377d1d9b-678a-47d3-abab-d54cd61b47aa" providerId="ADAL" clId="{9C11F69D-CE34-45E0-9802-26A1F77F75AD}" dt="2024-04-26T09:48:09.992" v="677" actId="1076"/>
           <ac:spMkLst>
             <pc:docMk/>
             <pc:sldMk cId="9958844" sldId="267"/>
@@ -648,7 +683,7 @@
           </ac:spMkLst>
         </pc:spChg>
         <pc:spChg chg="add mod">
-          <ac:chgData name="Jirayut Phothawilkiat" userId="377d1d9b-678a-47d3-abab-d54cd61b47aa" providerId="ADAL" clId="{9C11F69D-CE34-45E0-9802-26A1F77F75AD}" dt="2024-04-20T07:51:26.157" v="541" actId="1036"/>
+          <ac:chgData name="Jirayut Phothawilkiat" userId="377d1d9b-678a-47d3-abab-d54cd61b47aa" providerId="ADAL" clId="{9C11F69D-CE34-45E0-9802-26A1F77F75AD}" dt="2024-04-26T09:48:13.702" v="678" actId="1076"/>
           <ac:spMkLst>
             <pc:docMk/>
             <pc:sldMk cId="9958844" sldId="267"/>
@@ -656,7 +691,7 @@
           </ac:spMkLst>
         </pc:spChg>
         <pc:spChg chg="add mod">
-          <ac:chgData name="Jirayut Phothawilkiat" userId="377d1d9b-678a-47d3-abab-d54cd61b47aa" providerId="ADAL" clId="{9C11F69D-CE34-45E0-9802-26A1F77F75AD}" dt="2024-04-19T15:48:16.756" v="461" actId="1076"/>
+          <ac:chgData name="Jirayut Phothawilkiat" userId="377d1d9b-678a-47d3-abab-d54cd61b47aa" providerId="ADAL" clId="{9C11F69D-CE34-45E0-9802-26A1F77F75AD}" dt="2024-04-26T09:43:08.075" v="632" actId="1076"/>
           <ac:spMkLst>
             <pc:docMk/>
             <pc:sldMk cId="9958844" sldId="267"/>
@@ -671,6 +706,14 @@
             <ac:spMk id="10" creationId="{F9C16AC9-75A1-4573-D6B8-E1B1429A8170}"/>
           </ac:spMkLst>
         </pc:spChg>
+        <pc:spChg chg="add del">
+          <ac:chgData name="Jirayut Phothawilkiat" userId="377d1d9b-678a-47d3-abab-d54cd61b47aa" providerId="ADAL" clId="{9C11F69D-CE34-45E0-9802-26A1F77F75AD}" dt="2024-04-26T09:43:21.843" v="637" actId="22"/>
+          <ac:spMkLst>
+            <pc:docMk/>
+            <pc:sldMk cId="9958844" sldId="267"/>
+            <ac:spMk id="10" creationId="{FFA0D59D-3E5E-2B35-B7CB-ED944B7B0DC6}"/>
+          </ac:spMkLst>
+        </pc:spChg>
         <pc:spChg chg="add mod">
           <ac:chgData name="Jirayut Phothawilkiat" userId="377d1d9b-678a-47d3-abab-d54cd61b47aa" providerId="ADAL" clId="{9C11F69D-CE34-45E0-9802-26A1F77F75AD}" dt="2024-04-20T07:50:23.535" v="501" actId="1076"/>
           <ac:spMkLst>
@@ -687,10 +730,790 @@
             <ac:spMk id="12" creationId="{117B714A-4999-BED9-5D59-30BB48685399}"/>
           </ac:spMkLst>
         </pc:spChg>
+        <pc:spChg chg="add mod">
+          <ac:chgData name="Jirayut Phothawilkiat" userId="377d1d9b-678a-47d3-abab-d54cd61b47aa" providerId="ADAL" clId="{9C11F69D-CE34-45E0-9802-26A1F77F75AD}" dt="2024-04-26T09:45:55.343" v="671"/>
+          <ac:spMkLst>
+            <pc:docMk/>
+            <pc:sldMk cId="9958844" sldId="267"/>
+            <ac:spMk id="12" creationId="{9483C7E3-4BCF-9B0F-7631-6F7189BA420B}"/>
+          </ac:spMkLst>
+        </pc:spChg>
+      </pc:sldChg>
+      <pc:sldChg chg="addSp delSp modSp new mod">
+        <pc:chgData name="Jirayut Phothawilkiat" userId="377d1d9b-678a-47d3-abab-d54cd61b47aa" providerId="ADAL" clId="{9C11F69D-CE34-45E0-9802-26A1F77F75AD}" dt="2024-04-26T10:09:54.537" v="890" actId="1076"/>
+        <pc:sldMkLst>
+          <pc:docMk/>
+          <pc:sldMk cId="1347230408" sldId="268"/>
+        </pc:sldMkLst>
+        <pc:spChg chg="del">
+          <ac:chgData name="Jirayut Phothawilkiat" userId="377d1d9b-678a-47d3-abab-d54cd61b47aa" providerId="ADAL" clId="{9C11F69D-CE34-45E0-9802-26A1F77F75AD}" dt="2024-04-26T09:38:59.588" v="543" actId="478"/>
+          <ac:spMkLst>
+            <pc:docMk/>
+            <pc:sldMk cId="1347230408" sldId="268"/>
+            <ac:spMk id="2" creationId="{96990A02-228E-59F8-3BAD-6F6AFCC4CE34}"/>
+          </ac:spMkLst>
+        </pc:spChg>
+        <pc:spChg chg="del">
+          <ac:chgData name="Jirayut Phothawilkiat" userId="377d1d9b-678a-47d3-abab-d54cd61b47aa" providerId="ADAL" clId="{9C11F69D-CE34-45E0-9802-26A1F77F75AD}" dt="2024-04-26T09:39:00.608" v="544" actId="478"/>
+          <ac:spMkLst>
+            <pc:docMk/>
+            <pc:sldMk cId="1347230408" sldId="268"/>
+            <ac:spMk id="3" creationId="{FE2EAF27-630E-7922-0A08-FBB6B9B1FBCC}"/>
+          </ac:spMkLst>
+        </pc:spChg>
+        <pc:spChg chg="add del">
+          <ac:chgData name="Jirayut Phothawilkiat" userId="377d1d9b-678a-47d3-abab-d54cd61b47aa" providerId="ADAL" clId="{9C11F69D-CE34-45E0-9802-26A1F77F75AD}" dt="2024-04-26T09:39:49.742" v="546" actId="22"/>
+          <ac:spMkLst>
+            <pc:docMk/>
+            <pc:sldMk cId="1347230408" sldId="268"/>
+            <ac:spMk id="5" creationId="{E2B037D3-97A1-1A9B-359D-E107E19C3E43}"/>
+          </ac:spMkLst>
+        </pc:spChg>
+        <pc:spChg chg="add del">
+          <ac:chgData name="Jirayut Phothawilkiat" userId="377d1d9b-678a-47d3-abab-d54cd61b47aa" providerId="ADAL" clId="{9C11F69D-CE34-45E0-9802-26A1F77F75AD}" dt="2024-04-26T09:39:55.208" v="548" actId="22"/>
+          <ac:spMkLst>
+            <pc:docMk/>
+            <pc:sldMk cId="1347230408" sldId="268"/>
+            <ac:spMk id="7" creationId="{FD3ABE0C-BE01-B854-1E52-7DE5D50467A0}"/>
+          </ac:spMkLst>
+        </pc:spChg>
+        <pc:spChg chg="add mod">
+          <ac:chgData name="Jirayut Phothawilkiat" userId="377d1d9b-678a-47d3-abab-d54cd61b47aa" providerId="ADAL" clId="{9C11F69D-CE34-45E0-9802-26A1F77F75AD}" dt="2024-04-26T09:41:53.033" v="625" actId="1076"/>
+          <ac:spMkLst>
+            <pc:docMk/>
+            <pc:sldMk cId="1347230408" sldId="268"/>
+            <ac:spMk id="9" creationId="{6DE1B5AD-F647-9A4F-C945-06891F0E1F84}"/>
+          </ac:spMkLst>
+        </pc:spChg>
+        <pc:spChg chg="add mod">
+          <ac:chgData name="Jirayut Phothawilkiat" userId="377d1d9b-678a-47d3-abab-d54cd61b47aa" providerId="ADAL" clId="{9C11F69D-CE34-45E0-9802-26A1F77F75AD}" dt="2024-04-26T09:41:55.275" v="626" actId="1076"/>
+          <ac:spMkLst>
+            <pc:docMk/>
+            <pc:sldMk cId="1347230408" sldId="268"/>
+            <ac:spMk id="11" creationId="{A158FA35-250A-2271-E42C-9558C8278CE0}"/>
+          </ac:spMkLst>
+        </pc:spChg>
+        <pc:spChg chg="add del mod">
+          <ac:chgData name="Jirayut Phothawilkiat" userId="377d1d9b-678a-47d3-abab-d54cd61b47aa" providerId="ADAL" clId="{9C11F69D-CE34-45E0-9802-26A1F77F75AD}" dt="2024-04-26T09:40:47.314" v="568" actId="22"/>
+          <ac:spMkLst>
+            <pc:docMk/>
+            <pc:sldMk cId="1347230408" sldId="268"/>
+            <ac:spMk id="13" creationId="{97DC2375-CDE4-0394-EBF1-A9E81B9D3147}"/>
+          </ac:spMkLst>
+        </pc:spChg>
+        <pc:spChg chg="add mod">
+          <ac:chgData name="Jirayut Phothawilkiat" userId="377d1d9b-678a-47d3-abab-d54cd61b47aa" providerId="ADAL" clId="{9C11F69D-CE34-45E0-9802-26A1F77F75AD}" dt="2024-04-26T10:08:09.722" v="840" actId="20577"/>
+          <ac:spMkLst>
+            <pc:docMk/>
+            <pc:sldMk cId="1347230408" sldId="268"/>
+            <ac:spMk id="15" creationId="{583CFE00-FF08-7D6B-0646-17D1C3C1D527}"/>
+          </ac:spMkLst>
+        </pc:spChg>
+        <pc:spChg chg="add mod">
+          <ac:chgData name="Jirayut Phothawilkiat" userId="377d1d9b-678a-47d3-abab-d54cd61b47aa" providerId="ADAL" clId="{9C11F69D-CE34-45E0-9802-26A1F77F75AD}" dt="2024-04-26T10:09:54.537" v="890" actId="1076"/>
+          <ac:spMkLst>
+            <pc:docMk/>
+            <pc:sldMk cId="1347230408" sldId="268"/>
+            <ac:spMk id="16" creationId="{04FF8C62-B4AB-C2B1-7F18-492375D4E7FF}"/>
+          </ac:spMkLst>
+        </pc:spChg>
+        <pc:spChg chg="add mod">
+          <ac:chgData name="Jirayut Phothawilkiat" userId="377d1d9b-678a-47d3-abab-d54cd61b47aa" providerId="ADAL" clId="{9C11F69D-CE34-45E0-9802-26A1F77F75AD}" dt="2024-04-26T10:09:54.537" v="890" actId="1076"/>
+          <ac:spMkLst>
+            <pc:docMk/>
+            <pc:sldMk cId="1347230408" sldId="268"/>
+            <ac:spMk id="17" creationId="{A865F9C9-C45A-26BE-8807-49D1F5D1F2AB}"/>
+          </ac:spMkLst>
+        </pc:spChg>
+      </pc:sldChg>
+      <pc:sldChg chg="addSp delSp modSp new mod">
+        <pc:chgData name="Jirayut Phothawilkiat" userId="377d1d9b-678a-47d3-abab-d54cd61b47aa" providerId="ADAL" clId="{9C11F69D-CE34-45E0-9802-26A1F77F75AD}" dt="2024-04-26T10:08:15.192" v="842" actId="20577"/>
+        <pc:sldMkLst>
+          <pc:docMk/>
+          <pc:sldMk cId="1728549680" sldId="269"/>
+        </pc:sldMkLst>
+        <pc:spChg chg="del">
+          <ac:chgData name="Jirayut Phothawilkiat" userId="377d1d9b-678a-47d3-abab-d54cd61b47aa" providerId="ADAL" clId="{9C11F69D-CE34-45E0-9802-26A1F77F75AD}" dt="2024-04-26T09:53:45.340" v="684" actId="478"/>
+          <ac:spMkLst>
+            <pc:docMk/>
+            <pc:sldMk cId="1728549680" sldId="269"/>
+            <ac:spMk id="2" creationId="{A68016A9-B27B-CE67-9A99-65605F6D02AA}"/>
+          </ac:spMkLst>
+        </pc:spChg>
+        <pc:spChg chg="del">
+          <ac:chgData name="Jirayut Phothawilkiat" userId="377d1d9b-678a-47d3-abab-d54cd61b47aa" providerId="ADAL" clId="{9C11F69D-CE34-45E0-9802-26A1F77F75AD}" dt="2024-04-26T09:53:46.871" v="685" actId="478"/>
+          <ac:spMkLst>
+            <pc:docMk/>
+            <pc:sldMk cId="1728549680" sldId="269"/>
+            <ac:spMk id="3" creationId="{7079208F-1D3E-9682-A260-22B283FE1FC7}"/>
+          </ac:spMkLst>
+        </pc:spChg>
+        <pc:spChg chg="add mod">
+          <ac:chgData name="Jirayut Phothawilkiat" userId="377d1d9b-678a-47d3-abab-d54cd61b47aa" providerId="ADAL" clId="{9C11F69D-CE34-45E0-9802-26A1F77F75AD}" dt="2024-04-26T09:59:55.759" v="753" actId="20577"/>
+          <ac:spMkLst>
+            <pc:docMk/>
+            <pc:sldMk cId="1728549680" sldId="269"/>
+            <ac:spMk id="8" creationId="{C85C1662-391F-503B-67A6-F79737A40D40}"/>
+          </ac:spMkLst>
+        </pc:spChg>
+        <pc:spChg chg="add mod">
+          <ac:chgData name="Jirayut Phothawilkiat" userId="377d1d9b-678a-47d3-abab-d54cd61b47aa" providerId="ADAL" clId="{9C11F69D-CE34-45E0-9802-26A1F77F75AD}" dt="2024-04-26T10:08:15.192" v="842" actId="20577"/>
+          <ac:spMkLst>
+            <pc:docMk/>
+            <pc:sldMk cId="1728549680" sldId="269"/>
+            <ac:spMk id="10" creationId="{D3FC9FDA-8EAE-C39F-D67A-DC7498A5F9A4}"/>
+          </ac:spMkLst>
+        </pc:spChg>
+        <pc:picChg chg="add mod">
+          <ac:chgData name="Jirayut Phothawilkiat" userId="377d1d9b-678a-47d3-abab-d54cd61b47aa" providerId="ADAL" clId="{9C11F69D-CE34-45E0-9802-26A1F77F75AD}" dt="2024-04-26T09:57:12.185" v="723" actId="1076"/>
+          <ac:picMkLst>
+            <pc:docMk/>
+            <pc:sldMk cId="1728549680" sldId="269"/>
+            <ac:picMk id="5" creationId="{BB84E79B-F3A2-1AC0-5A1D-4E5ABFBB490B}"/>
+          </ac:picMkLst>
+        </pc:picChg>
+        <pc:picChg chg="add del mod">
+          <ac:chgData name="Jirayut Phothawilkiat" userId="377d1d9b-678a-47d3-abab-d54cd61b47aa" providerId="ADAL" clId="{9C11F69D-CE34-45E0-9802-26A1F77F75AD}" dt="2024-04-26T09:55:52.445" v="693" actId="22"/>
+          <ac:picMkLst>
+            <pc:docMk/>
+            <pc:sldMk cId="1728549680" sldId="269"/>
+            <ac:picMk id="7" creationId="{A6FCA38C-291C-011D-4732-DE571ADF2D25}"/>
+          </ac:picMkLst>
+        </pc:picChg>
+      </pc:sldChg>
+      <pc:sldChg chg="addSp delSp modSp add mod">
+        <pc:chgData name="Jirayut Phothawilkiat" userId="377d1d9b-678a-47d3-abab-d54cd61b47aa" providerId="ADAL" clId="{9C11F69D-CE34-45E0-9802-26A1F77F75AD}" dt="2024-04-26T10:08:26.038" v="845" actId="14100"/>
+        <pc:sldMkLst>
+          <pc:docMk/>
+          <pc:sldMk cId="1369642856" sldId="270"/>
+        </pc:sldMkLst>
+        <pc:spChg chg="add mod">
+          <ac:chgData name="Jirayut Phothawilkiat" userId="377d1d9b-678a-47d3-abab-d54cd61b47aa" providerId="ADAL" clId="{9C11F69D-CE34-45E0-9802-26A1F77F75AD}" dt="2024-04-26T10:08:19.453" v="844" actId="20577"/>
+          <ac:spMkLst>
+            <pc:docMk/>
+            <pc:sldMk cId="1369642856" sldId="270"/>
+            <ac:spMk id="6" creationId="{98C5DD8E-1665-059A-2215-6381522307CB}"/>
+          </ac:spMkLst>
+        </pc:spChg>
+        <pc:spChg chg="mod">
+          <ac:chgData name="Jirayut Phothawilkiat" userId="377d1d9b-678a-47d3-abab-d54cd61b47aa" providerId="ADAL" clId="{9C11F69D-CE34-45E0-9802-26A1F77F75AD}" dt="2024-04-26T10:00:00.666" v="755" actId="20577"/>
+          <ac:spMkLst>
+            <pc:docMk/>
+            <pc:sldMk cId="1369642856" sldId="270"/>
+            <ac:spMk id="8" creationId="{C85C1662-391F-503B-67A6-F79737A40D40}"/>
+          </ac:spMkLst>
+        </pc:spChg>
+        <pc:picChg chg="add mod">
+          <ac:chgData name="Jirayut Phothawilkiat" userId="377d1d9b-678a-47d3-abab-d54cd61b47aa" providerId="ADAL" clId="{9C11F69D-CE34-45E0-9802-26A1F77F75AD}" dt="2024-04-26T10:08:26.038" v="845" actId="14100"/>
+          <ac:picMkLst>
+            <pc:docMk/>
+            <pc:sldMk cId="1369642856" sldId="270"/>
+            <ac:picMk id="3" creationId="{710AA9D6-3EE8-4C61-091D-D1D0C3694CBD}"/>
+          </ac:picMkLst>
+        </pc:picChg>
+        <pc:picChg chg="del">
+          <ac:chgData name="Jirayut Phothawilkiat" userId="377d1d9b-678a-47d3-abab-d54cd61b47aa" providerId="ADAL" clId="{9C11F69D-CE34-45E0-9802-26A1F77F75AD}" dt="2024-04-26T09:58:09.069" v="735" actId="478"/>
+          <ac:picMkLst>
+            <pc:docMk/>
+            <pc:sldMk cId="1369642856" sldId="270"/>
+            <ac:picMk id="5" creationId="{BB84E79B-F3A2-1AC0-5A1D-4E5ABFBB490B}"/>
+          </ac:picMkLst>
+        </pc:picChg>
+      </pc:sldChg>
+      <pc:sldChg chg="delSp new del mod">
+        <pc:chgData name="Jirayut Phothawilkiat" userId="377d1d9b-678a-47d3-abab-d54cd61b47aa" providerId="ADAL" clId="{9C11F69D-CE34-45E0-9802-26A1F77F75AD}" dt="2024-04-26T09:57:36.905" v="724" actId="47"/>
+        <pc:sldMkLst>
+          <pc:docMk/>
+          <pc:sldMk cId="4052629170" sldId="270"/>
+        </pc:sldMkLst>
+        <pc:spChg chg="del">
+          <ac:chgData name="Jirayut Phothawilkiat" userId="377d1d9b-678a-47d3-abab-d54cd61b47aa" providerId="ADAL" clId="{9C11F69D-CE34-45E0-9802-26A1F77F75AD}" dt="2024-04-26T09:48:46.197" v="682" actId="478"/>
+          <ac:spMkLst>
+            <pc:docMk/>
+            <pc:sldMk cId="4052629170" sldId="270"/>
+            <ac:spMk id="2" creationId="{E15C1857-CB1B-23E1-E2D9-7181373CEB7B}"/>
+          </ac:spMkLst>
+        </pc:spChg>
+        <pc:spChg chg="del">
+          <ac:chgData name="Jirayut Phothawilkiat" userId="377d1d9b-678a-47d3-abab-d54cd61b47aa" providerId="ADAL" clId="{9C11F69D-CE34-45E0-9802-26A1F77F75AD}" dt="2024-04-26T09:48:47.276" v="683" actId="478"/>
+          <ac:spMkLst>
+            <pc:docMk/>
+            <pc:sldMk cId="4052629170" sldId="270"/>
+            <ac:spMk id="3" creationId="{2E92B8A6-A695-0C15-C82E-D582484EB305}"/>
+          </ac:spMkLst>
+        </pc:spChg>
+      </pc:sldChg>
+      <pc:sldChg chg="addSp delSp modSp add mod">
+        <pc:chgData name="Jirayut Phothawilkiat" userId="377d1d9b-678a-47d3-abab-d54cd61b47aa" providerId="ADAL" clId="{9C11F69D-CE34-45E0-9802-26A1F77F75AD}" dt="2024-04-26T10:08:30.131" v="847" actId="20577"/>
+        <pc:sldMkLst>
+          <pc:docMk/>
+          <pc:sldMk cId="1021164863" sldId="271"/>
+        </pc:sldMkLst>
+        <pc:spChg chg="add mod">
+          <ac:chgData name="Jirayut Phothawilkiat" userId="377d1d9b-678a-47d3-abab-d54cd61b47aa" providerId="ADAL" clId="{9C11F69D-CE34-45E0-9802-26A1F77F75AD}" dt="2024-04-26T10:08:30.131" v="847" actId="20577"/>
+          <ac:spMkLst>
+            <pc:docMk/>
+            <pc:sldMk cId="1021164863" sldId="271"/>
+            <ac:spMk id="6" creationId="{EAF8FBF1-86A1-9B82-8159-EF49916C04BF}"/>
+          </ac:spMkLst>
+        </pc:spChg>
+        <pc:spChg chg="mod">
+          <ac:chgData name="Jirayut Phothawilkiat" userId="377d1d9b-678a-47d3-abab-d54cd61b47aa" providerId="ADAL" clId="{9C11F69D-CE34-45E0-9802-26A1F77F75AD}" dt="2024-04-26T10:00:04.246" v="757" actId="20577"/>
+          <ac:spMkLst>
+            <pc:docMk/>
+            <pc:sldMk cId="1021164863" sldId="271"/>
+            <ac:spMk id="8" creationId="{C85C1662-391F-503B-67A6-F79737A40D40}"/>
+          </ac:spMkLst>
+        </pc:spChg>
+        <pc:picChg chg="add mod">
+          <ac:chgData name="Jirayut Phothawilkiat" userId="377d1d9b-678a-47d3-abab-d54cd61b47aa" providerId="ADAL" clId="{9C11F69D-CE34-45E0-9802-26A1F77F75AD}" dt="2024-04-26T09:59:06.743" v="746" actId="1076"/>
+          <ac:picMkLst>
+            <pc:docMk/>
+            <pc:sldMk cId="1021164863" sldId="271"/>
+            <ac:picMk id="3" creationId="{2D87AC22-2618-38BC-93D1-2C2E39CB9E4B}"/>
+          </ac:picMkLst>
+        </pc:picChg>
+        <pc:picChg chg="del">
+          <ac:chgData name="Jirayut Phothawilkiat" userId="377d1d9b-678a-47d3-abab-d54cd61b47aa" providerId="ADAL" clId="{9C11F69D-CE34-45E0-9802-26A1F77F75AD}" dt="2024-04-26T09:58:58.310" v="744" actId="478"/>
+          <ac:picMkLst>
+            <pc:docMk/>
+            <pc:sldMk cId="1021164863" sldId="271"/>
+            <ac:picMk id="5" creationId="{BB84E79B-F3A2-1AC0-5A1D-4E5ABFBB490B}"/>
+          </ac:picMkLst>
+        </pc:picChg>
+      </pc:sldChg>
+      <pc:sldChg chg="add del">
+        <pc:chgData name="Jirayut Phothawilkiat" userId="377d1d9b-678a-47d3-abab-d54cd61b47aa" providerId="ADAL" clId="{9C11F69D-CE34-45E0-9802-26A1F77F75AD}" dt="2024-04-26T09:57:37.739" v="725" actId="47"/>
+        <pc:sldMkLst>
+          <pc:docMk/>
+          <pc:sldMk cId="2847764517" sldId="271"/>
+        </pc:sldMkLst>
+      </pc:sldChg>
+      <pc:sldChg chg="addSp delSp modSp add mod">
+        <pc:chgData name="Jirayut Phothawilkiat" userId="377d1d9b-678a-47d3-abab-d54cd61b47aa" providerId="ADAL" clId="{9C11F69D-CE34-45E0-9802-26A1F77F75AD}" dt="2024-04-26T10:08:33.536" v="849" actId="20577"/>
+        <pc:sldMkLst>
+          <pc:docMk/>
+          <pc:sldMk cId="3952794961" sldId="272"/>
+        </pc:sldMkLst>
+        <pc:spChg chg="add mod">
+          <ac:chgData name="Jirayut Phothawilkiat" userId="377d1d9b-678a-47d3-abab-d54cd61b47aa" providerId="ADAL" clId="{9C11F69D-CE34-45E0-9802-26A1F77F75AD}" dt="2024-04-26T10:08:33.536" v="849" actId="20577"/>
+          <ac:spMkLst>
+            <pc:docMk/>
+            <pc:sldMk cId="3952794961" sldId="272"/>
+            <ac:spMk id="6" creationId="{9B4F09BF-B878-1184-264E-90BD388F0691}"/>
+          </ac:spMkLst>
+        </pc:spChg>
+        <pc:spChg chg="mod">
+          <ac:chgData name="Jirayut Phothawilkiat" userId="377d1d9b-678a-47d3-abab-d54cd61b47aa" providerId="ADAL" clId="{9C11F69D-CE34-45E0-9802-26A1F77F75AD}" dt="2024-04-26T10:00:42.586" v="773" actId="20577"/>
+          <ac:spMkLst>
+            <pc:docMk/>
+            <pc:sldMk cId="3952794961" sldId="272"/>
+            <ac:spMk id="8" creationId="{C85C1662-391F-503B-67A6-F79737A40D40}"/>
+          </ac:spMkLst>
+        </pc:spChg>
+        <pc:picChg chg="del">
+          <ac:chgData name="Jirayut Phothawilkiat" userId="377d1d9b-678a-47d3-abab-d54cd61b47aa" providerId="ADAL" clId="{9C11F69D-CE34-45E0-9802-26A1F77F75AD}" dt="2024-04-26T10:01:00.292" v="774" actId="478"/>
+          <ac:picMkLst>
+            <pc:docMk/>
+            <pc:sldMk cId="3952794961" sldId="272"/>
+            <ac:picMk id="3" creationId="{2D87AC22-2618-38BC-93D1-2C2E39CB9E4B}"/>
+          </ac:picMkLst>
+        </pc:picChg>
+        <pc:picChg chg="add mod">
+          <ac:chgData name="Jirayut Phothawilkiat" userId="377d1d9b-678a-47d3-abab-d54cd61b47aa" providerId="ADAL" clId="{9C11F69D-CE34-45E0-9802-26A1F77F75AD}" dt="2024-04-26T10:01:05.665" v="778" actId="1076"/>
+          <ac:picMkLst>
+            <pc:docMk/>
+            <pc:sldMk cId="3952794961" sldId="272"/>
+            <ac:picMk id="4" creationId="{6BB5A498-C3A0-CC90-A93E-47DDDAD681D8}"/>
+          </ac:picMkLst>
+        </pc:picChg>
+      </pc:sldChg>
+      <pc:sldChg chg="addSp delSp modSp add mod">
+        <pc:chgData name="Jirayut Phothawilkiat" userId="377d1d9b-678a-47d3-abab-d54cd61b47aa" providerId="ADAL" clId="{9C11F69D-CE34-45E0-9802-26A1F77F75AD}" dt="2024-04-26T10:08:37.640" v="851" actId="20577"/>
+        <pc:sldMkLst>
+          <pc:docMk/>
+          <pc:sldMk cId="2600109406" sldId="273"/>
+        </pc:sldMkLst>
+        <pc:spChg chg="add mod">
+          <ac:chgData name="Jirayut Phothawilkiat" userId="377d1d9b-678a-47d3-abab-d54cd61b47aa" providerId="ADAL" clId="{9C11F69D-CE34-45E0-9802-26A1F77F75AD}" dt="2024-04-26T10:08:37.640" v="851" actId="20577"/>
+          <ac:spMkLst>
+            <pc:docMk/>
+            <pc:sldMk cId="2600109406" sldId="273"/>
+            <ac:spMk id="6" creationId="{9D850990-0072-BA3A-DFFA-19E015CB8543}"/>
+          </ac:spMkLst>
+        </pc:spChg>
+        <pc:spChg chg="mod">
+          <ac:chgData name="Jirayut Phothawilkiat" userId="377d1d9b-678a-47d3-abab-d54cd61b47aa" providerId="ADAL" clId="{9C11F69D-CE34-45E0-9802-26A1F77F75AD}" dt="2024-04-26T10:01:41.383" v="790" actId="20577"/>
+          <ac:spMkLst>
+            <pc:docMk/>
+            <pc:sldMk cId="2600109406" sldId="273"/>
+            <ac:spMk id="8" creationId="{C85C1662-391F-503B-67A6-F79737A40D40}"/>
+          </ac:spMkLst>
+        </pc:spChg>
+        <pc:picChg chg="add mod">
+          <ac:chgData name="Jirayut Phothawilkiat" userId="377d1d9b-678a-47d3-abab-d54cd61b47aa" providerId="ADAL" clId="{9C11F69D-CE34-45E0-9802-26A1F77F75AD}" dt="2024-04-26T10:02:52.432" v="794" actId="1076"/>
+          <ac:picMkLst>
+            <pc:docMk/>
+            <pc:sldMk cId="2600109406" sldId="273"/>
+            <ac:picMk id="3" creationId="{F8B371DE-10CE-BA5F-EF92-C404A973EC25}"/>
+          </ac:picMkLst>
+        </pc:picChg>
+        <pc:picChg chg="del">
+          <ac:chgData name="Jirayut Phothawilkiat" userId="377d1d9b-678a-47d3-abab-d54cd61b47aa" providerId="ADAL" clId="{9C11F69D-CE34-45E0-9802-26A1F77F75AD}" dt="2024-04-26T10:02:43.662" v="791" actId="478"/>
+          <ac:picMkLst>
+            <pc:docMk/>
+            <pc:sldMk cId="2600109406" sldId="273"/>
+            <ac:picMk id="4" creationId="{6BB5A498-C3A0-CC90-A93E-47DDDAD681D8}"/>
+          </ac:picMkLst>
+        </pc:picChg>
+      </pc:sldChg>
+      <pc:sldChg chg="addSp delSp modSp add mod">
+        <pc:chgData name="Jirayut Phothawilkiat" userId="377d1d9b-678a-47d3-abab-d54cd61b47aa" providerId="ADAL" clId="{9C11F69D-CE34-45E0-9802-26A1F77F75AD}" dt="2024-04-26T10:08:41.332" v="853" actId="20577"/>
+        <pc:sldMkLst>
+          <pc:docMk/>
+          <pc:sldMk cId="3474914528" sldId="274"/>
+        </pc:sldMkLst>
+        <pc:spChg chg="mod">
+          <ac:chgData name="Jirayut Phothawilkiat" userId="377d1d9b-678a-47d3-abab-d54cd61b47aa" providerId="ADAL" clId="{9C11F69D-CE34-45E0-9802-26A1F77F75AD}" dt="2024-04-26T10:03:42.972" v="801" actId="20577"/>
+          <ac:spMkLst>
+            <pc:docMk/>
+            <pc:sldMk cId="3474914528" sldId="274"/>
+            <ac:spMk id="8" creationId="{C85C1662-391F-503B-67A6-F79737A40D40}"/>
+          </ac:spMkLst>
+        </pc:spChg>
+        <pc:spChg chg="add mod">
+          <ac:chgData name="Jirayut Phothawilkiat" userId="377d1d9b-678a-47d3-abab-d54cd61b47aa" providerId="ADAL" clId="{9C11F69D-CE34-45E0-9802-26A1F77F75AD}" dt="2024-04-26T10:08:41.332" v="853" actId="20577"/>
+          <ac:spMkLst>
+            <pc:docMk/>
+            <pc:sldMk cId="3474914528" sldId="274"/>
+            <ac:spMk id="9" creationId="{658B592B-2E55-1F88-034B-7ABAFF307E8E}"/>
+          </ac:spMkLst>
+        </pc:spChg>
+        <pc:picChg chg="add mod">
+          <ac:chgData name="Jirayut Phothawilkiat" userId="377d1d9b-678a-47d3-abab-d54cd61b47aa" providerId="ADAL" clId="{9C11F69D-CE34-45E0-9802-26A1F77F75AD}" dt="2024-04-26T10:04:34.621" v="813" actId="14100"/>
+          <ac:picMkLst>
+            <pc:docMk/>
+            <pc:sldMk cId="3474914528" sldId="274"/>
+            <ac:picMk id="3" creationId="{AFB9C135-63F7-1158-1025-4D440B8A19C4}"/>
+          </ac:picMkLst>
+        </pc:picChg>
+        <pc:picChg chg="del">
+          <ac:chgData name="Jirayut Phothawilkiat" userId="377d1d9b-678a-47d3-abab-d54cd61b47aa" providerId="ADAL" clId="{9C11F69D-CE34-45E0-9802-26A1F77F75AD}" dt="2024-04-26T10:03:46.294" v="802" actId="478"/>
+          <ac:picMkLst>
+            <pc:docMk/>
+            <pc:sldMk cId="3474914528" sldId="274"/>
+            <ac:picMk id="4" creationId="{6BB5A498-C3A0-CC90-A93E-47DDDAD681D8}"/>
+          </ac:picMkLst>
+        </pc:picChg>
+        <pc:picChg chg="add mod">
+          <ac:chgData name="Jirayut Phothawilkiat" userId="377d1d9b-678a-47d3-abab-d54cd61b47aa" providerId="ADAL" clId="{9C11F69D-CE34-45E0-9802-26A1F77F75AD}" dt="2024-04-26T10:04:40.815" v="815" actId="1076"/>
+          <ac:picMkLst>
+            <pc:docMk/>
+            <pc:sldMk cId="3474914528" sldId="274"/>
+            <ac:picMk id="6" creationId="{3FFFAB6B-3F23-A328-C6A4-C55351A68C8F}"/>
+          </ac:picMkLst>
+        </pc:picChg>
+      </pc:sldChg>
+      <pc:sldChg chg="addSp delSp modSp add mod">
+        <pc:chgData name="Jirayut Phothawilkiat" userId="377d1d9b-678a-47d3-abab-d54cd61b47aa" providerId="ADAL" clId="{9C11F69D-CE34-45E0-9802-26A1F77F75AD}" dt="2024-04-26T10:08:44.033" v="855" actId="20577"/>
+        <pc:sldMkLst>
+          <pc:docMk/>
+          <pc:sldMk cId="2732559403" sldId="275"/>
+        </pc:sldMkLst>
+        <pc:spChg chg="add mod">
+          <ac:chgData name="Jirayut Phothawilkiat" userId="377d1d9b-678a-47d3-abab-d54cd61b47aa" providerId="ADAL" clId="{9C11F69D-CE34-45E0-9802-26A1F77F75AD}" dt="2024-04-26T10:08:44.033" v="855" actId="20577"/>
+          <ac:spMkLst>
+            <pc:docMk/>
+            <pc:sldMk cId="2732559403" sldId="275"/>
+            <ac:spMk id="7" creationId="{5385D3F6-6360-7603-4688-9926EA7914BE}"/>
+          </ac:spMkLst>
+        </pc:spChg>
+        <pc:spChg chg="mod">
+          <ac:chgData name="Jirayut Phothawilkiat" userId="377d1d9b-678a-47d3-abab-d54cd61b47aa" providerId="ADAL" clId="{9C11F69D-CE34-45E0-9802-26A1F77F75AD}" dt="2024-04-26T10:04:59.262" v="824" actId="20577"/>
+          <ac:spMkLst>
+            <pc:docMk/>
+            <pc:sldMk cId="2732559403" sldId="275"/>
+            <ac:spMk id="8" creationId="{C85C1662-391F-503B-67A6-F79737A40D40}"/>
+          </ac:spMkLst>
+        </pc:spChg>
+        <pc:picChg chg="del">
+          <ac:chgData name="Jirayut Phothawilkiat" userId="377d1d9b-678a-47d3-abab-d54cd61b47aa" providerId="ADAL" clId="{9C11F69D-CE34-45E0-9802-26A1F77F75AD}" dt="2024-04-26T10:04:49.325" v="817" actId="478"/>
+          <ac:picMkLst>
+            <pc:docMk/>
+            <pc:sldMk cId="2732559403" sldId="275"/>
+            <ac:picMk id="3" creationId="{AFB9C135-63F7-1158-1025-4D440B8A19C4}"/>
+          </ac:picMkLst>
+        </pc:picChg>
+        <pc:picChg chg="add mod">
+          <ac:chgData name="Jirayut Phothawilkiat" userId="377d1d9b-678a-47d3-abab-d54cd61b47aa" providerId="ADAL" clId="{9C11F69D-CE34-45E0-9802-26A1F77F75AD}" dt="2024-04-26T10:05:55.930" v="828" actId="1076"/>
+          <ac:picMkLst>
+            <pc:docMk/>
+            <pc:sldMk cId="2732559403" sldId="275"/>
+            <ac:picMk id="4" creationId="{CC09C06D-86C0-BE40-D4B4-0230A1DDC534}"/>
+          </ac:picMkLst>
+        </pc:picChg>
+        <pc:picChg chg="del">
+          <ac:chgData name="Jirayut Phothawilkiat" userId="377d1d9b-678a-47d3-abab-d54cd61b47aa" providerId="ADAL" clId="{9C11F69D-CE34-45E0-9802-26A1F77F75AD}" dt="2024-04-26T10:04:50.193" v="818" actId="478"/>
+          <ac:picMkLst>
+            <pc:docMk/>
+            <pc:sldMk cId="2732559403" sldId="275"/>
+            <ac:picMk id="6" creationId="{3FFFAB6B-3F23-A328-C6A4-C55351A68C8F}"/>
+          </ac:picMkLst>
+        </pc:picChg>
       </pc:sldChg>
     </pc:docChg>
   </pc:docChgLst>
 </pc:chgInfo>
+</file>
+
+<file path=ppt/notesMasters/notesMaster1.xml><?xml version="1.0" encoding="utf-8"?>
+<p:notesMaster xmlns:a="http://schemas.openxmlformats.org/drawingml/2006/main" xmlns:r="http://schemas.openxmlformats.org/officeDocument/2006/relationships" xmlns:p="http://schemas.openxmlformats.org/presentationml/2006/main">
+  <p:cSld>
+    <p:bg>
+      <p:bgRef idx="1001">
+        <a:schemeClr val="bg1"/>
+      </p:bgRef>
+    </p:bg>
+    <p:spTree>
+      <p:nvGrpSpPr>
+        <p:cNvPr id="1" name=""/>
+        <p:cNvGrpSpPr/>
+        <p:nvPr/>
+      </p:nvGrpSpPr>
+      <p:grpSpPr>
+        <a:xfrm>
+          <a:off x="0" y="0"/>
+          <a:ext cx="0" cy="0"/>
+          <a:chOff x="0" y="0"/>
+          <a:chExt cx="0" cy="0"/>
+        </a:xfrm>
+      </p:grpSpPr>
+      <p:sp>
+        <p:nvSpPr>
+          <p:cNvPr id="2" name="ตัวแทนหัวกระดาษ 1"/>
+          <p:cNvSpPr>
+            <a:spLocks noGrp="1"/>
+          </p:cNvSpPr>
+          <p:nvPr>
+            <p:ph type="hdr" sz="quarter"/>
+          </p:nvPr>
+        </p:nvSpPr>
+        <p:spPr>
+          <a:xfrm>
+            <a:off x="0" y="0"/>
+            <a:ext cx="2971800" cy="458788"/>
+          </a:xfrm>
+          <a:prstGeom prst="rect">
+            <a:avLst/>
+          </a:prstGeom>
+        </p:spPr>
+        <p:txBody>
+          <a:bodyPr vert="horz" lIns="91440" tIns="45720" rIns="91440" bIns="45720" rtlCol="0"/>
+          <a:lstStyle>
+            <a:lvl1pPr algn="l">
+              <a:defRPr sz="1200"/>
+            </a:lvl1pPr>
+          </a:lstStyle>
+          <a:p>
+            <a:endParaRPr lang="en-US"/>
+          </a:p>
+        </p:txBody>
+      </p:sp>
+      <p:sp>
+        <p:nvSpPr>
+          <p:cNvPr id="3" name="ตัวแทนวันที่ 2"/>
+          <p:cNvSpPr>
+            <a:spLocks noGrp="1"/>
+          </p:cNvSpPr>
+          <p:nvPr>
+            <p:ph type="dt" idx="1"/>
+          </p:nvPr>
+        </p:nvSpPr>
+        <p:spPr>
+          <a:xfrm>
+            <a:off x="3884613" y="0"/>
+            <a:ext cx="2971800" cy="458788"/>
+          </a:xfrm>
+          <a:prstGeom prst="rect">
+            <a:avLst/>
+          </a:prstGeom>
+        </p:spPr>
+        <p:txBody>
+          <a:bodyPr vert="horz" lIns="91440" tIns="45720" rIns="91440" bIns="45720" rtlCol="0"/>
+          <a:lstStyle>
+            <a:lvl1pPr algn="r">
+              <a:defRPr sz="1200"/>
+            </a:lvl1pPr>
+          </a:lstStyle>
+          <a:p>
+            <a:fld id="{C5CA224D-F160-461F-9BF7-606C1C14F3CE}" type="datetimeFigureOut">
+              <a:rPr lang="en-US" smtClean="0"/>
+              <a:t>4/26/2024</a:t>
+            </a:fld>
+            <a:endParaRPr lang="en-US"/>
+          </a:p>
+        </p:txBody>
+      </p:sp>
+      <p:sp>
+        <p:nvSpPr>
+          <p:cNvPr id="4" name="ตัวแทนรูปบนสไลด์ 3"/>
+          <p:cNvSpPr>
+            <a:spLocks noGrp="1" noRot="1" noChangeAspect="1"/>
+          </p:cNvSpPr>
+          <p:nvPr>
+            <p:ph type="sldImg" idx="2"/>
+          </p:nvPr>
+        </p:nvSpPr>
+        <p:spPr>
+          <a:xfrm>
+            <a:off x="685800" y="1143000"/>
+            <a:ext cx="5486400" cy="3086100"/>
+          </a:xfrm>
+          <a:prstGeom prst="rect">
+            <a:avLst/>
+          </a:prstGeom>
+          <a:noFill/>
+          <a:ln w="12700">
+            <a:solidFill>
+              <a:prstClr val="black"/>
+            </a:solidFill>
+          </a:ln>
+        </p:spPr>
+        <p:txBody>
+          <a:bodyPr vert="horz" lIns="91440" tIns="45720" rIns="91440" bIns="45720" rtlCol="0" anchor="ctr"/>
+          <a:lstStyle/>
+          <a:p>
+            <a:endParaRPr lang="en-US"/>
+          </a:p>
+        </p:txBody>
+      </p:sp>
+      <p:sp>
+        <p:nvSpPr>
+          <p:cNvPr id="5" name="ตัวแทนบันทึกย่อ 4"/>
+          <p:cNvSpPr>
+            <a:spLocks noGrp="1"/>
+          </p:cNvSpPr>
+          <p:nvPr>
+            <p:ph type="body" sz="quarter" idx="3"/>
+          </p:nvPr>
+        </p:nvSpPr>
+        <p:spPr>
+          <a:xfrm>
+            <a:off x="685800" y="4400550"/>
+            <a:ext cx="5486400" cy="3600450"/>
+          </a:xfrm>
+          <a:prstGeom prst="rect">
+            <a:avLst/>
+          </a:prstGeom>
+        </p:spPr>
+        <p:txBody>
+          <a:bodyPr vert="horz" lIns="91440" tIns="45720" rIns="91440" bIns="45720" rtlCol="0"/>
+          <a:lstStyle/>
+          <a:p>
+            <a:pPr lvl="0"/>
+            <a:r>
+              <a:rPr lang="th-TH"/>
+              <a:t>คลิกเพื่อแก้ไขสไตล์ของข้อความต้นแบบ</a:t>
+            </a:r>
+          </a:p>
+          <a:p>
+            <a:pPr lvl="1"/>
+            <a:r>
+              <a:rPr lang="th-TH"/>
+              <a:t>ระดับที่สอง</a:t>
+            </a:r>
+          </a:p>
+          <a:p>
+            <a:pPr lvl="2"/>
+            <a:r>
+              <a:rPr lang="th-TH"/>
+              <a:t>ระดับที่สาม</a:t>
+            </a:r>
+          </a:p>
+          <a:p>
+            <a:pPr lvl="3"/>
+            <a:r>
+              <a:rPr lang="th-TH"/>
+              <a:t>ระดับที่สี่</a:t>
+            </a:r>
+          </a:p>
+          <a:p>
+            <a:pPr lvl="4"/>
+            <a:r>
+              <a:rPr lang="th-TH"/>
+              <a:t>ระดับที่ห้า</a:t>
+            </a:r>
+            <a:endParaRPr lang="en-US"/>
+          </a:p>
+        </p:txBody>
+      </p:sp>
+      <p:sp>
+        <p:nvSpPr>
+          <p:cNvPr id="6" name="ตัวแทนท้ายกระดาษ 5"/>
+          <p:cNvSpPr>
+            <a:spLocks noGrp="1"/>
+          </p:cNvSpPr>
+          <p:nvPr>
+            <p:ph type="ftr" sz="quarter" idx="4"/>
+          </p:nvPr>
+        </p:nvSpPr>
+        <p:spPr>
+          <a:xfrm>
+            <a:off x="0" y="8685213"/>
+            <a:ext cx="2971800" cy="458787"/>
+          </a:xfrm>
+          <a:prstGeom prst="rect">
+            <a:avLst/>
+          </a:prstGeom>
+        </p:spPr>
+        <p:txBody>
+          <a:bodyPr vert="horz" lIns="91440" tIns="45720" rIns="91440" bIns="45720" rtlCol="0" anchor="b"/>
+          <a:lstStyle>
+            <a:lvl1pPr algn="l">
+              <a:defRPr sz="1200"/>
+            </a:lvl1pPr>
+          </a:lstStyle>
+          <a:p>
+            <a:endParaRPr lang="en-US"/>
+          </a:p>
+        </p:txBody>
+      </p:sp>
+      <p:sp>
+        <p:nvSpPr>
+          <p:cNvPr id="7" name="ตัวแทนหมายเลขสไลด์ 6"/>
+          <p:cNvSpPr>
+            <a:spLocks noGrp="1"/>
+          </p:cNvSpPr>
+          <p:nvPr>
+            <p:ph type="sldNum" sz="quarter" idx="5"/>
+          </p:nvPr>
+        </p:nvSpPr>
+        <p:spPr>
+          <a:xfrm>
+            <a:off x="3884613" y="8685213"/>
+            <a:ext cx="2971800" cy="458787"/>
+          </a:xfrm>
+          <a:prstGeom prst="rect">
+            <a:avLst/>
+          </a:prstGeom>
+        </p:spPr>
+        <p:txBody>
+          <a:bodyPr vert="horz" lIns="91440" tIns="45720" rIns="91440" bIns="45720" rtlCol="0" anchor="b"/>
+          <a:lstStyle>
+            <a:lvl1pPr algn="r">
+              <a:defRPr sz="1200"/>
+            </a:lvl1pPr>
+          </a:lstStyle>
+          <a:p>
+            <a:fld id="{AAA2F34E-BB44-40E1-A238-9804D7D123A4}" type="slidenum">
+              <a:rPr lang="en-US" smtClean="0"/>
+              <a:t>‹#›</a:t>
+            </a:fld>
+            <a:endParaRPr lang="en-US"/>
+          </a:p>
+        </p:txBody>
+      </p:sp>
+    </p:spTree>
+    <p:extLst>
+      <p:ext uri="{BB962C8B-B14F-4D97-AF65-F5344CB8AC3E}">
+        <p14:creationId xmlns:p14="http://schemas.microsoft.com/office/powerpoint/2010/main" val="4186595895"/>
+      </p:ext>
+    </p:extLst>
+  </p:cSld>
+  <p:clrMap bg1="lt1" tx1="dk1" bg2="lt2" tx2="dk2" accent1="accent1" accent2="accent2" accent3="accent3" accent4="accent4" accent5="accent5" accent6="accent6" hlink="hlink" folHlink="folHlink"/>
+  <p:notesStyle>
+    <a:lvl1pPr marL="0" algn="l" defTabSz="914400" rtl="0" eaLnBrk="1" latinLnBrk="0" hangingPunct="1">
+      <a:defRPr sz="1200" kern="1200">
+        <a:solidFill>
+          <a:schemeClr val="tx1"/>
+        </a:solidFill>
+        <a:latin typeface="+mn-lt"/>
+        <a:ea typeface="+mn-ea"/>
+        <a:cs typeface="+mn-cs"/>
+      </a:defRPr>
+    </a:lvl1pPr>
+    <a:lvl2pPr marL="457200" algn="l" defTabSz="914400" rtl="0" eaLnBrk="1" latinLnBrk="0" hangingPunct="1">
+      <a:defRPr sz="1200" kern="1200">
+        <a:solidFill>
+          <a:schemeClr val="tx1"/>
+        </a:solidFill>
+        <a:latin typeface="+mn-lt"/>
+        <a:ea typeface="+mn-ea"/>
+        <a:cs typeface="+mn-cs"/>
+      </a:defRPr>
+    </a:lvl2pPr>
+    <a:lvl3pPr marL="914400" algn="l" defTabSz="914400" rtl="0" eaLnBrk="1" latinLnBrk="0" hangingPunct="1">
+      <a:defRPr sz="1200" kern="1200">
+        <a:solidFill>
+          <a:schemeClr val="tx1"/>
+        </a:solidFill>
+        <a:latin typeface="+mn-lt"/>
+        <a:ea typeface="+mn-ea"/>
+        <a:cs typeface="+mn-cs"/>
+      </a:defRPr>
+    </a:lvl3pPr>
+    <a:lvl4pPr marL="1371600" algn="l" defTabSz="914400" rtl="0" eaLnBrk="1" latinLnBrk="0" hangingPunct="1">
+      <a:defRPr sz="1200" kern="1200">
+        <a:solidFill>
+          <a:schemeClr val="tx1"/>
+        </a:solidFill>
+        <a:latin typeface="+mn-lt"/>
+        <a:ea typeface="+mn-ea"/>
+        <a:cs typeface="+mn-cs"/>
+      </a:defRPr>
+    </a:lvl4pPr>
+    <a:lvl5pPr marL="1828800" algn="l" defTabSz="914400" rtl="0" eaLnBrk="1" latinLnBrk="0" hangingPunct="1">
+      <a:defRPr sz="1200" kern="1200">
+        <a:solidFill>
+          <a:schemeClr val="tx1"/>
+        </a:solidFill>
+        <a:latin typeface="+mn-lt"/>
+        <a:ea typeface="+mn-ea"/>
+        <a:cs typeface="+mn-cs"/>
+      </a:defRPr>
+    </a:lvl5pPr>
+    <a:lvl6pPr marL="2286000" algn="l" defTabSz="914400" rtl="0" eaLnBrk="1" latinLnBrk="0" hangingPunct="1">
+      <a:defRPr sz="1200" kern="1200">
+        <a:solidFill>
+          <a:schemeClr val="tx1"/>
+        </a:solidFill>
+        <a:latin typeface="+mn-lt"/>
+        <a:ea typeface="+mn-ea"/>
+        <a:cs typeface="+mn-cs"/>
+      </a:defRPr>
+    </a:lvl6pPr>
+    <a:lvl7pPr marL="2743200" algn="l" defTabSz="914400" rtl="0" eaLnBrk="1" latinLnBrk="0" hangingPunct="1">
+      <a:defRPr sz="1200" kern="1200">
+        <a:solidFill>
+          <a:schemeClr val="tx1"/>
+        </a:solidFill>
+        <a:latin typeface="+mn-lt"/>
+        <a:ea typeface="+mn-ea"/>
+        <a:cs typeface="+mn-cs"/>
+      </a:defRPr>
+    </a:lvl7pPr>
+    <a:lvl8pPr marL="3200400" algn="l" defTabSz="914400" rtl="0" eaLnBrk="1" latinLnBrk="0" hangingPunct="1">
+      <a:defRPr sz="1200" kern="1200">
+        <a:solidFill>
+          <a:schemeClr val="tx1"/>
+        </a:solidFill>
+        <a:latin typeface="+mn-lt"/>
+        <a:ea typeface="+mn-ea"/>
+        <a:cs typeface="+mn-cs"/>
+      </a:defRPr>
+    </a:lvl8pPr>
+    <a:lvl9pPr marL="3657600" algn="l" defTabSz="914400" rtl="0" eaLnBrk="1" latinLnBrk="0" hangingPunct="1">
+      <a:defRPr sz="1200" kern="1200">
+        <a:solidFill>
+          <a:schemeClr val="tx1"/>
+        </a:solidFill>
+        <a:latin typeface="+mn-lt"/>
+        <a:ea typeface="+mn-ea"/>
+        <a:cs typeface="+mn-cs"/>
+      </a:defRPr>
+    </a:lvl9pPr>
+  </p:notesStyle>
+</p:notesMaster>
 </file>
 
 <file path=ppt/slideLayouts/slideLayout1.xml><?xml version="1.0" encoding="utf-8"?>
@@ -842,7 +1665,7 @@
           <a:p>
             <a:fld id="{A77C4F52-99CA-43D9-ABD8-A32D60373E0F}" type="datetimeFigureOut">
               <a:rPr lang="en-US" smtClean="0"/>
-              <a:t>4/20/2024</a:t>
+              <a:t>4/26/2024</a:t>
             </a:fld>
             <a:endParaRPr lang="en-US"/>
           </a:p>
@@ -1042,7 +1865,7 @@
           <a:p>
             <a:fld id="{A77C4F52-99CA-43D9-ABD8-A32D60373E0F}" type="datetimeFigureOut">
               <a:rPr lang="en-US" smtClean="0"/>
-              <a:t>4/20/2024</a:t>
+              <a:t>4/26/2024</a:t>
             </a:fld>
             <a:endParaRPr lang="en-US"/>
           </a:p>
@@ -1252,7 +2075,7 @@
           <a:p>
             <a:fld id="{A77C4F52-99CA-43D9-ABD8-A32D60373E0F}" type="datetimeFigureOut">
               <a:rPr lang="en-US" smtClean="0"/>
-              <a:t>4/20/2024</a:t>
+              <a:t>4/26/2024</a:t>
             </a:fld>
             <a:endParaRPr lang="en-US"/>
           </a:p>
@@ -1452,7 +2275,7 @@
           <a:p>
             <a:fld id="{A77C4F52-99CA-43D9-ABD8-A32D60373E0F}" type="datetimeFigureOut">
               <a:rPr lang="en-US" smtClean="0"/>
-              <a:t>4/20/2024</a:t>
+              <a:t>4/26/2024</a:t>
             </a:fld>
             <a:endParaRPr lang="en-US"/>
           </a:p>
@@ -1728,7 +2551,7 @@
           <a:p>
             <a:fld id="{A77C4F52-99CA-43D9-ABD8-A32D60373E0F}" type="datetimeFigureOut">
               <a:rPr lang="en-US" smtClean="0"/>
-              <a:t>4/20/2024</a:t>
+              <a:t>4/26/2024</a:t>
             </a:fld>
             <a:endParaRPr lang="en-US"/>
           </a:p>
@@ -1996,7 +2819,7 @@
           <a:p>
             <a:fld id="{A77C4F52-99CA-43D9-ABD8-A32D60373E0F}" type="datetimeFigureOut">
               <a:rPr lang="en-US" smtClean="0"/>
-              <a:t>4/20/2024</a:t>
+              <a:t>4/26/2024</a:t>
             </a:fld>
             <a:endParaRPr lang="en-US"/>
           </a:p>
@@ -2411,7 +3234,7 @@
           <a:p>
             <a:fld id="{A77C4F52-99CA-43D9-ABD8-A32D60373E0F}" type="datetimeFigureOut">
               <a:rPr lang="en-US" smtClean="0"/>
-              <a:t>4/20/2024</a:t>
+              <a:t>4/26/2024</a:t>
             </a:fld>
             <a:endParaRPr lang="en-US"/>
           </a:p>
@@ -2553,7 +3376,7 @@
           <a:p>
             <a:fld id="{A77C4F52-99CA-43D9-ABD8-A32D60373E0F}" type="datetimeFigureOut">
               <a:rPr lang="en-US" smtClean="0"/>
-              <a:t>4/20/2024</a:t>
+              <a:t>4/26/2024</a:t>
             </a:fld>
             <a:endParaRPr lang="en-US"/>
           </a:p>
@@ -2666,7 +3489,7 @@
           <a:p>
             <a:fld id="{A77C4F52-99CA-43D9-ABD8-A32D60373E0F}" type="datetimeFigureOut">
               <a:rPr lang="en-US" smtClean="0"/>
-              <a:t>4/20/2024</a:t>
+              <a:t>4/26/2024</a:t>
             </a:fld>
             <a:endParaRPr lang="en-US"/>
           </a:p>
@@ -2979,7 +3802,7 @@
           <a:p>
             <a:fld id="{A77C4F52-99CA-43D9-ABD8-A32D60373E0F}" type="datetimeFigureOut">
               <a:rPr lang="en-US" smtClean="0"/>
-              <a:t>4/20/2024</a:t>
+              <a:t>4/26/2024</a:t>
             </a:fld>
             <a:endParaRPr lang="en-US"/>
           </a:p>
@@ -3268,7 +4091,7 @@
           <a:p>
             <a:fld id="{A77C4F52-99CA-43D9-ABD8-A32D60373E0F}" type="datetimeFigureOut">
               <a:rPr lang="en-US" smtClean="0"/>
-              <a:t>4/20/2024</a:t>
+              <a:t>4/26/2024</a:t>
             </a:fld>
             <a:endParaRPr lang="en-US"/>
           </a:p>
@@ -3511,7 +4334,7 @@
           <a:p>
             <a:fld id="{A77C4F52-99CA-43D9-ABD8-A32D60373E0F}" type="datetimeFigureOut">
               <a:rPr lang="en-US" smtClean="0"/>
-              <a:t>4/20/2024</a:t>
+              <a:t>4/26/2024</a:t>
             </a:fld>
             <a:endParaRPr lang="en-US"/>
           </a:p>
@@ -4047,6 +4870,76 @@
           </a:p>
         </p:txBody>
       </p:sp>
+      <p:sp>
+        <p:nvSpPr>
+          <p:cNvPr id="6" name="กล่องข้อความ 5">
+            <a:extLst>
+              <a:ext uri="{FF2B5EF4-FFF2-40B4-BE49-F238E27FC236}">
+                <a16:creationId xmlns:a16="http://schemas.microsoft.com/office/drawing/2014/main" id="{BA5FB7F9-D609-BE13-E6CB-3A86A84EF991}"/>
+              </a:ext>
+            </a:extLst>
+          </p:cNvPr>
+          <p:cNvSpPr txBox="1"/>
+          <p:nvPr/>
+        </p:nvSpPr>
+        <p:spPr>
+          <a:xfrm>
+            <a:off x="5210077" y="4313440"/>
+            <a:ext cx="6094070" cy="369332"/>
+          </a:xfrm>
+          <a:prstGeom prst="rect">
+            <a:avLst/>
+          </a:prstGeom>
+          <a:noFill/>
+        </p:spPr>
+        <p:txBody>
+          <a:bodyPr wrap="square">
+            <a:spAutoFit/>
+          </a:bodyPr>
+          <a:lstStyle/>
+          <a:p>
+            <a:r>
+              <a:rPr lang="en-US" dirty="0"/>
+              <a:t>https://github.com/JirayutP/Dentist</a:t>
+            </a:r>
+          </a:p>
+        </p:txBody>
+      </p:sp>
+      <p:sp>
+        <p:nvSpPr>
+          <p:cNvPr id="7" name="กล่องข้อความ 6">
+            <a:extLst>
+              <a:ext uri="{FF2B5EF4-FFF2-40B4-BE49-F238E27FC236}">
+                <a16:creationId xmlns:a16="http://schemas.microsoft.com/office/drawing/2014/main" id="{2F4F2964-A748-3A04-D2E6-DDA09F31AC64}"/>
+              </a:ext>
+            </a:extLst>
+          </p:cNvPr>
+          <p:cNvSpPr txBox="1"/>
+          <p:nvPr/>
+        </p:nvSpPr>
+        <p:spPr>
+          <a:xfrm>
+            <a:off x="3489734" y="4267274"/>
+            <a:ext cx="1720343" cy="461665"/>
+          </a:xfrm>
+          <a:prstGeom prst="rect">
+            <a:avLst/>
+          </a:prstGeom>
+          <a:noFill/>
+        </p:spPr>
+        <p:txBody>
+          <a:bodyPr wrap="none" rtlCol="0">
+            <a:spAutoFit/>
+          </a:bodyPr>
+          <a:lstStyle/>
+          <a:p>
+            <a:r>
+              <a:rPr lang="en-US" sz="2400" dirty="0"/>
+              <a:t>GitHub Link:</a:t>
+            </a:r>
+          </a:p>
+        </p:txBody>
+      </p:sp>
     </p:spTree>
     <p:extLst>
       <p:ext uri="{BB962C8B-B14F-4D97-AF65-F5344CB8AC3E}">
@@ -4079,10 +4972,10 @@
       </p:grpSpPr>
       <p:pic>
         <p:nvPicPr>
-          <p:cNvPr id="3" name="รูปภาพ 2">
-            <a:extLst>
-              <a:ext uri="{FF2B5EF4-FFF2-40B4-BE49-F238E27FC236}">
-                <a16:creationId xmlns:a16="http://schemas.microsoft.com/office/drawing/2014/main" id="{04F1CCB9-EE5D-ACCE-F300-42D612C8F001}"/>
+          <p:cNvPr id="9" name="รูปภาพ 8">
+            <a:extLst>
+              <a:ext uri="{FF2B5EF4-FFF2-40B4-BE49-F238E27FC236}">
+                <a16:creationId xmlns:a16="http://schemas.microsoft.com/office/drawing/2014/main" id="{A9A1D08D-39FE-183C-41C2-072FE489060E}"/>
               </a:ext>
             </a:extLst>
           </p:cNvPr>
@@ -4105,8 +4998,8 @@
         </p:blipFill>
         <p:spPr>
           <a:xfrm>
-            <a:off x="804862" y="1075026"/>
-            <a:ext cx="10582275" cy="5495925"/>
+            <a:off x="9151490" y="0"/>
+            <a:ext cx="2249248" cy="6858000"/>
           </a:xfrm>
           <a:prstGeom prst="rect">
             <a:avLst/>
@@ -4115,10 +5008,10 @@
       </p:pic>
       <p:sp>
         <p:nvSpPr>
-          <p:cNvPr id="4" name="กล่องข้อความ 3">
-            <a:extLst>
-              <a:ext uri="{FF2B5EF4-FFF2-40B4-BE49-F238E27FC236}">
-                <a16:creationId xmlns:a16="http://schemas.microsoft.com/office/drawing/2014/main" id="{7BDA6D5C-ADFF-87D4-C40E-604C87916817}"/>
+          <p:cNvPr id="10" name="กล่องข้อความ 9">
+            <a:extLst>
+              <a:ext uri="{FF2B5EF4-FFF2-40B4-BE49-F238E27FC236}">
+                <a16:creationId xmlns:a16="http://schemas.microsoft.com/office/drawing/2014/main" id="{196DFD2C-8546-0EDD-42C8-CA552B84EFDB}"/>
               </a:ext>
             </a:extLst>
           </p:cNvPr>
@@ -4150,10 +5043,10 @@
       </p:sp>
       <p:sp>
         <p:nvSpPr>
-          <p:cNvPr id="5" name="กล่องข้อความ 4">
-            <a:extLst>
-              <a:ext uri="{FF2B5EF4-FFF2-40B4-BE49-F238E27FC236}">
-                <a16:creationId xmlns:a16="http://schemas.microsoft.com/office/drawing/2014/main" id="{BF1916FA-C8FC-529D-D2B5-CBBEED64DE9D}"/>
+          <p:cNvPr id="11" name="กล่องข้อความ 10">
+            <a:extLst>
+              <a:ext uri="{FF2B5EF4-FFF2-40B4-BE49-F238E27FC236}">
+                <a16:creationId xmlns:a16="http://schemas.microsoft.com/office/drawing/2014/main" id="{7ECF3C75-9B72-18FD-0C80-D04338AA9745}"/>
               </a:ext>
             </a:extLst>
           </p:cNvPr>
@@ -4163,7 +5056,7 @@
         <p:spPr>
           <a:xfrm>
             <a:off x="363894" y="223935"/>
-            <a:ext cx="7602787" cy="584775"/>
+            <a:ext cx="4057136" cy="584775"/>
           </a:xfrm>
           <a:prstGeom prst="rect">
             <a:avLst/>
@@ -4178,15 +5071,135 @@
           <a:p>
             <a:r>
               <a:rPr lang="en-US" sz="3200" dirty="0"/>
-              <a:t>Sequence Diagram: Delete Booking (DELETE)</a:t>
-            </a:r>
-          </a:p>
-        </p:txBody>
-      </p:sp>
+              <a:t>UML Use Case Diagram</a:t>
+            </a:r>
+          </a:p>
+        </p:txBody>
+      </p:sp>
+      <p:pic>
+        <p:nvPicPr>
+          <p:cNvPr id="19" name="รูปภาพ 18">
+            <a:extLst>
+              <a:ext uri="{FF2B5EF4-FFF2-40B4-BE49-F238E27FC236}">
+                <a16:creationId xmlns:a16="http://schemas.microsoft.com/office/drawing/2014/main" id="{F8E47781-33E9-61E9-32CC-8F68FEF257C1}"/>
+              </a:ext>
+            </a:extLst>
+          </p:cNvPr>
+          <p:cNvPicPr>
+            <a:picLocks noChangeAspect="1"/>
+          </p:cNvPicPr>
+          <p:nvPr/>
+        </p:nvPicPr>
+        <p:blipFill>
+          <a:blip r:embed="rId3"/>
+          <a:stretch>
+            <a:fillRect/>
+          </a:stretch>
+        </p:blipFill>
+        <p:spPr>
+          <a:xfrm>
+            <a:off x="1194999" y="1439217"/>
+            <a:ext cx="1943100" cy="1914525"/>
+          </a:xfrm>
+          <a:prstGeom prst="rect">
+            <a:avLst/>
+          </a:prstGeom>
+        </p:spPr>
+      </p:pic>
+      <p:pic>
+        <p:nvPicPr>
+          <p:cNvPr id="21" name="รูปภาพ 20">
+            <a:extLst>
+              <a:ext uri="{FF2B5EF4-FFF2-40B4-BE49-F238E27FC236}">
+                <a16:creationId xmlns:a16="http://schemas.microsoft.com/office/drawing/2014/main" id="{3FF93946-C582-3210-4B19-012FBBA0E93C}"/>
+              </a:ext>
+            </a:extLst>
+          </p:cNvPr>
+          <p:cNvPicPr>
+            <a:picLocks noChangeAspect="1"/>
+          </p:cNvPicPr>
+          <p:nvPr/>
+        </p:nvPicPr>
+        <p:blipFill>
+          <a:blip r:embed="rId4"/>
+          <a:stretch>
+            <a:fillRect/>
+          </a:stretch>
+        </p:blipFill>
+        <p:spPr>
+          <a:xfrm>
+            <a:off x="5452674" y="525995"/>
+            <a:ext cx="3152775" cy="1552575"/>
+          </a:xfrm>
+          <a:prstGeom prst="rect">
+            <a:avLst/>
+          </a:prstGeom>
+        </p:spPr>
+      </p:pic>
+      <p:pic>
+        <p:nvPicPr>
+          <p:cNvPr id="23" name="รูปภาพ 22">
+            <a:extLst>
+              <a:ext uri="{FF2B5EF4-FFF2-40B4-BE49-F238E27FC236}">
+                <a16:creationId xmlns:a16="http://schemas.microsoft.com/office/drawing/2014/main" id="{45A8CE52-EC0A-2BAC-E26D-2C23F69817F7}"/>
+              </a:ext>
+            </a:extLst>
+          </p:cNvPr>
+          <p:cNvPicPr>
+            <a:picLocks noChangeAspect="1"/>
+          </p:cNvPicPr>
+          <p:nvPr/>
+        </p:nvPicPr>
+        <p:blipFill>
+          <a:blip r:embed="rId5"/>
+          <a:stretch>
+            <a:fillRect/>
+          </a:stretch>
+        </p:blipFill>
+        <p:spPr>
+          <a:xfrm>
+            <a:off x="4557324" y="2078570"/>
+            <a:ext cx="4048125" cy="2381250"/>
+          </a:xfrm>
+          <a:prstGeom prst="rect">
+            <a:avLst/>
+          </a:prstGeom>
+        </p:spPr>
+      </p:pic>
+      <p:pic>
+        <p:nvPicPr>
+          <p:cNvPr id="25" name="รูปภาพ 24">
+            <a:extLst>
+              <a:ext uri="{FF2B5EF4-FFF2-40B4-BE49-F238E27FC236}">
+                <a16:creationId xmlns:a16="http://schemas.microsoft.com/office/drawing/2014/main" id="{5C44E818-E588-39E4-B3CE-3D25830E8F26}"/>
+              </a:ext>
+            </a:extLst>
+          </p:cNvPr>
+          <p:cNvPicPr>
+            <a:picLocks noChangeAspect="1"/>
+          </p:cNvPicPr>
+          <p:nvPr/>
+        </p:nvPicPr>
+        <p:blipFill>
+          <a:blip r:embed="rId6"/>
+          <a:stretch>
+            <a:fillRect/>
+          </a:stretch>
+        </p:blipFill>
+        <p:spPr>
+          <a:xfrm>
+            <a:off x="2328474" y="4461520"/>
+            <a:ext cx="6276975" cy="2133600"/>
+          </a:xfrm>
+          <a:prstGeom prst="rect">
+            <a:avLst/>
+          </a:prstGeom>
+        </p:spPr>
+      </p:pic>
     </p:spTree>
     <p:extLst>
       <p:ext uri="{BB962C8B-B14F-4D97-AF65-F5344CB8AC3E}">
-        <p14:creationId xmlns:p14="http://schemas.microsoft.com/office/powerpoint/2010/main" val="1492219135"/>
+        <p14:creationId xmlns:p14="http://schemas.microsoft.com/office/powerpoint/2010/main" val="1301947537"/>
       </p:ext>
     </p:extLst>
   </p:cSld>
@@ -4213,12 +5226,47 @@
           <a:chExt cx="0" cy="0"/>
         </a:xfrm>
       </p:grpSpPr>
+      <p:sp>
+        <p:nvSpPr>
+          <p:cNvPr id="6" name="กล่องข้อความ 5">
+            <a:extLst>
+              <a:ext uri="{FF2B5EF4-FFF2-40B4-BE49-F238E27FC236}">
+                <a16:creationId xmlns:a16="http://schemas.microsoft.com/office/drawing/2014/main" id="{5814265F-9213-9980-D41D-3AFEF2F8A3C4}"/>
+              </a:ext>
+            </a:extLst>
+          </p:cNvPr>
+          <p:cNvSpPr txBox="1"/>
+          <p:nvPr/>
+        </p:nvSpPr>
+        <p:spPr>
+          <a:xfrm>
+            <a:off x="11492889" y="6201619"/>
+            <a:ext cx="418704" cy="369332"/>
+          </a:xfrm>
+          <a:prstGeom prst="rect">
+            <a:avLst/>
+          </a:prstGeom>
+          <a:noFill/>
+        </p:spPr>
+        <p:txBody>
+          <a:bodyPr wrap="none" rtlCol="0">
+            <a:spAutoFit/>
+          </a:bodyPr>
+          <a:lstStyle/>
+          <a:p>
+            <a:r>
+              <a:rPr lang="en-US" dirty="0"/>
+              <a:t>11</a:t>
+            </a:r>
+          </a:p>
+        </p:txBody>
+      </p:sp>
       <p:pic>
         <p:nvPicPr>
-          <p:cNvPr id="3" name="รูปภาพ 2">
-            <a:extLst>
-              <a:ext uri="{FF2B5EF4-FFF2-40B4-BE49-F238E27FC236}">
-                <a16:creationId xmlns:a16="http://schemas.microsoft.com/office/drawing/2014/main" id="{D56411B1-E6A3-047B-A076-F4CE7186A209}"/>
+          <p:cNvPr id="10" name="รูปภาพ 9">
+            <a:extLst>
+              <a:ext uri="{FF2B5EF4-FFF2-40B4-BE49-F238E27FC236}">
+                <a16:creationId xmlns:a16="http://schemas.microsoft.com/office/drawing/2014/main" id="{D3B175ED-FBF8-E871-57C6-672E38C9EC06}"/>
               </a:ext>
             </a:extLst>
           </p:cNvPr>
@@ -4241,8 +5289,8 @@
         </p:blipFill>
         <p:spPr>
           <a:xfrm>
-            <a:off x="2226080" y="1104900"/>
-            <a:ext cx="7739839" cy="5466051"/>
+            <a:off x="3016633" y="734065"/>
+            <a:ext cx="6158734" cy="6056174"/>
           </a:xfrm>
           <a:prstGeom prst="rect">
             <a:avLst/>
@@ -4251,10 +5299,10 @@
       </p:pic>
       <p:sp>
         <p:nvSpPr>
-          <p:cNvPr id="4" name="กล่องข้อความ 3">
-            <a:extLst>
-              <a:ext uri="{FF2B5EF4-FFF2-40B4-BE49-F238E27FC236}">
-                <a16:creationId xmlns:a16="http://schemas.microsoft.com/office/drawing/2014/main" id="{5E6FF9F6-7D52-BEC2-65C3-9A2A2CAF8FA3}"/>
+          <p:cNvPr id="11" name="กล่องข้อความ 10">
+            <a:extLst>
+              <a:ext uri="{FF2B5EF4-FFF2-40B4-BE49-F238E27FC236}">
+                <a16:creationId xmlns:a16="http://schemas.microsoft.com/office/drawing/2014/main" id="{0EC2B9A7-E775-9D08-9A1B-36FEA749F938}"/>
               </a:ext>
             </a:extLst>
           </p:cNvPr>
@@ -4263,8 +5311,8 @@
         </p:nvSpPr>
         <p:spPr>
           <a:xfrm>
-            <a:off x="11492889" y="6201619"/>
-            <a:ext cx="418704" cy="369332"/>
+            <a:off x="363894" y="223935"/>
+            <a:ext cx="4674100" cy="584775"/>
           </a:xfrm>
           <a:prstGeom prst="rect">
             <a:avLst/>
@@ -4278,43 +5326,8 @@
           <a:lstStyle/>
           <a:p>
             <a:r>
-              <a:rPr lang="en-US" dirty="0"/>
-              <a:t>11</a:t>
-            </a:r>
-          </a:p>
-        </p:txBody>
-      </p:sp>
-      <p:sp>
-        <p:nvSpPr>
-          <p:cNvPr id="5" name="กล่องข้อความ 4">
-            <a:extLst>
-              <a:ext uri="{FF2B5EF4-FFF2-40B4-BE49-F238E27FC236}">
-                <a16:creationId xmlns:a16="http://schemas.microsoft.com/office/drawing/2014/main" id="{78673105-673B-F836-B9EC-AF9FCC952889}"/>
-              </a:ext>
-            </a:extLst>
-          </p:cNvPr>
-          <p:cNvSpPr txBox="1"/>
-          <p:nvPr/>
-        </p:nvSpPr>
-        <p:spPr>
-          <a:xfrm>
-            <a:off x="363894" y="223935"/>
-            <a:ext cx="7063793" cy="584775"/>
-          </a:xfrm>
-          <a:prstGeom prst="rect">
-            <a:avLst/>
-          </a:prstGeom>
-          <a:noFill/>
-        </p:spPr>
-        <p:txBody>
-          <a:bodyPr wrap="none" rtlCol="0">
-            <a:spAutoFit/>
-          </a:bodyPr>
-          <a:lstStyle/>
-          <a:p>
-            <a:r>
               <a:rPr lang="en-US" sz="3200" dirty="0"/>
-              <a:t>Sequence Diagram: Get All Booking (GET)</a:t>
+              <a:t>Class Diagram: UML Profile</a:t>
             </a:r>
           </a:p>
         </p:txBody>
@@ -4322,7 +5335,7 @@
     </p:spTree>
     <p:extLst>
       <p:ext uri="{BB962C8B-B14F-4D97-AF65-F5344CB8AC3E}">
-        <p14:creationId xmlns:p14="http://schemas.microsoft.com/office/powerpoint/2010/main" val="2936513065"/>
+        <p14:creationId xmlns:p14="http://schemas.microsoft.com/office/powerpoint/2010/main" val="942632483"/>
       </p:ext>
     </p:extLst>
   </p:cSld>
@@ -4349,12 +5362,48 @@
           <a:chExt cx="0" cy="0"/>
         </a:xfrm>
       </p:grpSpPr>
-      <p:sp>
-        <p:nvSpPr>
-          <p:cNvPr id="3" name="กล่องข้อความ 2">
-            <a:extLst>
-              <a:ext uri="{FF2B5EF4-FFF2-40B4-BE49-F238E27FC236}">
-                <a16:creationId xmlns:a16="http://schemas.microsoft.com/office/drawing/2014/main" id="{2148CAA8-1820-CF0C-6B28-5A425086A716}"/>
+      <p:pic>
+        <p:nvPicPr>
+          <p:cNvPr id="3" name="รูปภาพ 2">
+            <a:extLst>
+              <a:ext uri="{FF2B5EF4-FFF2-40B4-BE49-F238E27FC236}">
+                <a16:creationId xmlns:a16="http://schemas.microsoft.com/office/drawing/2014/main" id="{DFF97EEE-DA73-FB31-560C-A5317F6EC972}"/>
+              </a:ext>
+            </a:extLst>
+          </p:cNvPr>
+          <p:cNvPicPr>
+            <a:picLocks noChangeAspect="1"/>
+          </p:cNvPicPr>
+          <p:nvPr/>
+        </p:nvPicPr>
+        <p:blipFill>
+          <a:blip r:embed="rId2">
+            <a:extLst>
+              <a:ext uri="{28A0092B-C50C-407E-A947-70E740481C1C}">
+                <a14:useLocalDpi xmlns:a14="http://schemas.microsoft.com/office/drawing/2010/main" val="0"/>
+              </a:ext>
+            </a:extLst>
+          </a:blip>
+          <a:stretch>
+            <a:fillRect/>
+          </a:stretch>
+        </p:blipFill>
+        <p:spPr>
+          <a:xfrm>
+            <a:off x="1990861" y="1168014"/>
+            <a:ext cx="8210277" cy="5466051"/>
+          </a:xfrm>
+          <a:prstGeom prst="rect">
+            <a:avLst/>
+          </a:prstGeom>
+        </p:spPr>
+      </p:pic>
+      <p:sp>
+        <p:nvSpPr>
+          <p:cNvPr id="4" name="กล่องข้อความ 3">
+            <a:extLst>
+              <a:ext uri="{FF2B5EF4-FFF2-40B4-BE49-F238E27FC236}">
+                <a16:creationId xmlns:a16="http://schemas.microsoft.com/office/drawing/2014/main" id="{38B2058E-006D-9E43-B676-A457D3E69AC0}"/>
               </a:ext>
             </a:extLst>
           </p:cNvPr>
@@ -4363,8 +5412,8 @@
         </p:nvSpPr>
         <p:spPr>
           <a:xfrm>
-            <a:off x="3468842" y="1927796"/>
-            <a:ext cx="6094070" cy="461665"/>
+            <a:off x="11492889" y="6201619"/>
+            <a:ext cx="418704" cy="369332"/>
           </a:xfrm>
           <a:prstGeom prst="rect">
             <a:avLst/>
@@ -4372,24 +5421,24 @@
           <a:noFill/>
         </p:spPr>
         <p:txBody>
-          <a:bodyPr wrap="square">
+          <a:bodyPr wrap="none" rtlCol="0">
             <a:spAutoFit/>
           </a:bodyPr>
           <a:lstStyle/>
           <a:p>
             <a:r>
-              <a:rPr lang="en-US" sz="2400" dirty="0"/>
-              <a:t>https://github.com/JirayutP/Dentist</a:t>
-            </a:r>
-          </a:p>
-        </p:txBody>
-      </p:sp>
-      <p:sp>
-        <p:nvSpPr>
-          <p:cNvPr id="4" name="กล่องข้อความ 3">
-            <a:extLst>
-              <a:ext uri="{FF2B5EF4-FFF2-40B4-BE49-F238E27FC236}">
-                <a16:creationId xmlns:a16="http://schemas.microsoft.com/office/drawing/2014/main" id="{567A2A72-6EC4-7021-8792-E3F47E5D7F89}"/>
+              <a:rPr lang="en-US" dirty="0"/>
+              <a:t>12</a:t>
+            </a:r>
+          </a:p>
+        </p:txBody>
+      </p:sp>
+      <p:sp>
+        <p:nvSpPr>
+          <p:cNvPr id="6" name="กล่องข้อความ 5">
+            <a:extLst>
+              <a:ext uri="{FF2B5EF4-FFF2-40B4-BE49-F238E27FC236}">
+                <a16:creationId xmlns:a16="http://schemas.microsoft.com/office/drawing/2014/main" id="{D63FB832-B3D8-D48D-E432-AE51E29C4773}"/>
               </a:ext>
             </a:extLst>
           </p:cNvPr>
@@ -4398,8 +5447,8 @@
         </p:nvSpPr>
         <p:spPr>
           <a:xfrm>
-            <a:off x="11492889" y="6201619"/>
-            <a:ext cx="418704" cy="369332"/>
+            <a:off x="363894" y="223935"/>
+            <a:ext cx="6059416" cy="584775"/>
           </a:xfrm>
           <a:prstGeom prst="rect">
             <a:avLst/>
@@ -4413,18 +5462,84 @@
           <a:lstStyle/>
           <a:p>
             <a:r>
-              <a:rPr lang="en-US" dirty="0"/>
-              <a:t>12</a:t>
-            </a:r>
-          </a:p>
-        </p:txBody>
-      </p:sp>
-      <p:sp>
-        <p:nvSpPr>
-          <p:cNvPr id="5" name="กล่องข้อความ 4">
-            <a:extLst>
-              <a:ext uri="{FF2B5EF4-FFF2-40B4-BE49-F238E27FC236}">
-                <a16:creationId xmlns:a16="http://schemas.microsoft.com/office/drawing/2014/main" id="{2AE3B0FE-9AAE-6521-220C-838A31A59E0D}"/>
+              <a:rPr lang="en-US" sz="3200" dirty="0"/>
+              <a:t>Sequence Diagram: Register (POST)</a:t>
+            </a:r>
+          </a:p>
+        </p:txBody>
+      </p:sp>
+    </p:spTree>
+    <p:extLst>
+      <p:ext uri="{BB962C8B-B14F-4D97-AF65-F5344CB8AC3E}">
+        <p14:creationId xmlns:p14="http://schemas.microsoft.com/office/powerpoint/2010/main" val="1978481048"/>
+      </p:ext>
+    </p:extLst>
+  </p:cSld>
+  <p:clrMapOvr>
+    <a:masterClrMapping/>
+  </p:clrMapOvr>
+</p:sld>
+</file>
+
+<file path=ppt/slides/slide13.xml><?xml version="1.0" encoding="utf-8"?>
+<p:sld xmlns:a="http://schemas.openxmlformats.org/drawingml/2006/main" xmlns:r="http://schemas.openxmlformats.org/officeDocument/2006/relationships" xmlns:p="http://schemas.openxmlformats.org/presentationml/2006/main">
+  <p:cSld>
+    <p:spTree>
+      <p:nvGrpSpPr>
+        <p:cNvPr id="1" name=""/>
+        <p:cNvGrpSpPr/>
+        <p:nvPr/>
+      </p:nvGrpSpPr>
+      <p:grpSpPr>
+        <a:xfrm>
+          <a:off x="0" y="0"/>
+          <a:ext cx="0" cy="0"/>
+          <a:chOff x="0" y="0"/>
+          <a:chExt cx="0" cy="0"/>
+        </a:xfrm>
+      </p:grpSpPr>
+      <p:pic>
+        <p:nvPicPr>
+          <p:cNvPr id="3" name="รูปภาพ 2">
+            <a:extLst>
+              <a:ext uri="{FF2B5EF4-FFF2-40B4-BE49-F238E27FC236}">
+                <a16:creationId xmlns:a16="http://schemas.microsoft.com/office/drawing/2014/main" id="{131F4C2F-8347-68E3-66AA-782E4D4C8C4F}"/>
+              </a:ext>
+            </a:extLst>
+          </p:cNvPr>
+          <p:cNvPicPr>
+            <a:picLocks noChangeAspect="1"/>
+          </p:cNvPicPr>
+          <p:nvPr/>
+        </p:nvPicPr>
+        <p:blipFill>
+          <a:blip r:embed="rId2">
+            <a:extLst>
+              <a:ext uri="{28A0092B-C50C-407E-A947-70E740481C1C}">
+                <a14:useLocalDpi xmlns:a14="http://schemas.microsoft.com/office/drawing/2010/main" val="0"/>
+              </a:ext>
+            </a:extLst>
+          </a:blip>
+          <a:stretch>
+            <a:fillRect/>
+          </a:stretch>
+        </p:blipFill>
+        <p:spPr>
+          <a:xfrm>
+            <a:off x="1878852" y="1100822"/>
+            <a:ext cx="8434296" cy="5466051"/>
+          </a:xfrm>
+          <a:prstGeom prst="rect">
+            <a:avLst/>
+          </a:prstGeom>
+        </p:spPr>
+      </p:pic>
+      <p:sp>
+        <p:nvSpPr>
+          <p:cNvPr id="4" name="กล่องข้อความ 3">
+            <a:extLst>
+              <a:ext uri="{FF2B5EF4-FFF2-40B4-BE49-F238E27FC236}">
+                <a16:creationId xmlns:a16="http://schemas.microsoft.com/office/drawing/2014/main" id="{4F138B03-FF5E-43AF-E1FF-19AA629F1B09}"/>
               </a:ext>
             </a:extLst>
           </p:cNvPr>
@@ -4433,8 +5548,8 @@
         </p:nvSpPr>
         <p:spPr>
           <a:xfrm>
-            <a:off x="1227197" y="1830045"/>
-            <a:ext cx="2239716" cy="584775"/>
+            <a:off x="11492889" y="6201619"/>
+            <a:ext cx="418704" cy="369332"/>
           </a:xfrm>
           <a:prstGeom prst="rect">
             <a:avLst/>
@@ -4448,18 +5563,18 @@
           <a:lstStyle/>
           <a:p>
             <a:r>
-              <a:rPr lang="en-US" sz="3200" dirty="0"/>
-              <a:t>GitHub Link:</a:t>
-            </a:r>
-          </a:p>
-        </p:txBody>
-      </p:sp>
-      <p:sp>
-        <p:nvSpPr>
-          <p:cNvPr id="6" name="กล่องข้อความ 5">
-            <a:extLst>
-              <a:ext uri="{FF2B5EF4-FFF2-40B4-BE49-F238E27FC236}">
-                <a16:creationId xmlns:a16="http://schemas.microsoft.com/office/drawing/2014/main" id="{4C72DB4C-5DAE-4C1D-71DE-53DB52BF9F8C}"/>
+              <a:rPr lang="en-US" dirty="0"/>
+              <a:t>13</a:t>
+            </a:r>
+          </a:p>
+        </p:txBody>
+      </p:sp>
+      <p:sp>
+        <p:nvSpPr>
+          <p:cNvPr id="5" name="กล่องข้อความ 4">
+            <a:extLst>
+              <a:ext uri="{FF2B5EF4-FFF2-40B4-BE49-F238E27FC236}">
+                <a16:creationId xmlns:a16="http://schemas.microsoft.com/office/drawing/2014/main" id="{0F5A74A2-CA70-B673-FEAD-88D6453F4AB0}"/>
               </a:ext>
             </a:extLst>
           </p:cNvPr>
@@ -4468,8 +5583,8 @@
         </p:nvSpPr>
         <p:spPr>
           <a:xfrm>
-            <a:off x="3248904" y="3527104"/>
-            <a:ext cx="8150616" cy="2677656"/>
+            <a:off x="363894" y="223935"/>
+            <a:ext cx="5610831" cy="584775"/>
           </a:xfrm>
           <a:prstGeom prst="rect">
             <a:avLst/>
@@ -4477,24 +5592,90 @@
           <a:noFill/>
         </p:spPr>
         <p:txBody>
-          <a:bodyPr wrap="square">
+          <a:bodyPr wrap="none" rtlCol="0">
             <a:spAutoFit/>
           </a:bodyPr>
           <a:lstStyle/>
           <a:p>
             <a:r>
-              <a:rPr lang="en-US" sz="2400" dirty="0"/>
-              <a:t>https://chula-my.sharepoint.com/:v:/g/personal/6432022721_student_chula_ac_th/EV4lBv_M9wxIssOnYs14QoIBTVD-ZUKo-b-w3333oMlDig?nav=eyJyZWZlcnJhbEluZm8iOnsicmVmZXJyYWxBcHAiOiJPbmVEcml2ZUZvckJ1c2luZXNzIiwicmVmZXJyYWxBcHBQbGF0Zm9ybSI6IldlYiIsInJlZmVycmFsTW9kZSI6InZpZXciLCJyZWZlcnJhbFZpZXciOiJNeUZpbGVzTGlua0NvcHkifX0&amp;e=CSVfYY</a:t>
-            </a:r>
-          </a:p>
-        </p:txBody>
-      </p:sp>
-      <p:sp>
-        <p:nvSpPr>
-          <p:cNvPr id="7" name="กล่องข้อความ 6">
-            <a:extLst>
-              <a:ext uri="{FF2B5EF4-FFF2-40B4-BE49-F238E27FC236}">
-                <a16:creationId xmlns:a16="http://schemas.microsoft.com/office/drawing/2014/main" id="{CE8301A5-723D-0340-6341-A08FF3EF5B13}"/>
+              <a:rPr lang="en-US" sz="3200" dirty="0"/>
+              <a:t>Sequence Diagram: Login (POST)</a:t>
+            </a:r>
+          </a:p>
+        </p:txBody>
+      </p:sp>
+    </p:spTree>
+    <p:extLst>
+      <p:ext uri="{BB962C8B-B14F-4D97-AF65-F5344CB8AC3E}">
+        <p14:creationId xmlns:p14="http://schemas.microsoft.com/office/powerpoint/2010/main" val="367910129"/>
+      </p:ext>
+    </p:extLst>
+  </p:cSld>
+  <p:clrMapOvr>
+    <a:masterClrMapping/>
+  </p:clrMapOvr>
+</p:sld>
+</file>
+
+<file path=ppt/slides/slide14.xml><?xml version="1.0" encoding="utf-8"?>
+<p:sld xmlns:a="http://schemas.openxmlformats.org/drawingml/2006/main" xmlns:r="http://schemas.openxmlformats.org/officeDocument/2006/relationships" xmlns:p="http://schemas.openxmlformats.org/presentationml/2006/main">
+  <p:cSld>
+    <p:spTree>
+      <p:nvGrpSpPr>
+        <p:cNvPr id="1" name=""/>
+        <p:cNvGrpSpPr/>
+        <p:nvPr/>
+      </p:nvGrpSpPr>
+      <p:grpSpPr>
+        <a:xfrm>
+          <a:off x="0" y="0"/>
+          <a:ext cx="0" cy="0"/>
+          <a:chOff x="0" y="0"/>
+          <a:chExt cx="0" cy="0"/>
+        </a:xfrm>
+      </p:grpSpPr>
+      <p:pic>
+        <p:nvPicPr>
+          <p:cNvPr id="3" name="รูปภาพ 2">
+            <a:extLst>
+              <a:ext uri="{FF2B5EF4-FFF2-40B4-BE49-F238E27FC236}">
+                <a16:creationId xmlns:a16="http://schemas.microsoft.com/office/drawing/2014/main" id="{2EF2972F-4163-563D-792E-80D3C634BC00}"/>
+              </a:ext>
+            </a:extLst>
+          </p:cNvPr>
+          <p:cNvPicPr>
+            <a:picLocks noChangeAspect="1"/>
+          </p:cNvPicPr>
+          <p:nvPr/>
+        </p:nvPicPr>
+        <p:blipFill>
+          <a:blip r:embed="rId2">
+            <a:extLst>
+              <a:ext uri="{28A0092B-C50C-407E-A947-70E740481C1C}">
+                <a14:useLocalDpi xmlns:a14="http://schemas.microsoft.com/office/drawing/2010/main" val="0"/>
+              </a:ext>
+            </a:extLst>
+          </a:blip>
+          <a:stretch>
+            <a:fillRect/>
+          </a:stretch>
+        </p:blipFill>
+        <p:spPr>
+          <a:xfrm>
+            <a:off x="1738310" y="1092282"/>
+            <a:ext cx="8715379" cy="5289856"/>
+          </a:xfrm>
+          <a:prstGeom prst="rect">
+            <a:avLst/>
+          </a:prstGeom>
+        </p:spPr>
+      </p:pic>
+      <p:sp>
+        <p:nvSpPr>
+          <p:cNvPr id="4" name="กล่องข้อความ 3">
+            <a:extLst>
+              <a:ext uri="{FF2B5EF4-FFF2-40B4-BE49-F238E27FC236}">
+                <a16:creationId xmlns:a16="http://schemas.microsoft.com/office/drawing/2014/main" id="{13D8FFD8-E114-535F-6D7F-7602F2E5E483}"/>
               </a:ext>
             </a:extLst>
           </p:cNvPr>
@@ -4503,8 +5684,8 @@
         </p:nvSpPr>
         <p:spPr>
           <a:xfrm>
-            <a:off x="1227197" y="2880775"/>
-            <a:ext cx="2021707" cy="584775"/>
+            <a:off x="11492889" y="6201619"/>
+            <a:ext cx="418704" cy="369332"/>
           </a:xfrm>
           <a:prstGeom prst="rect">
             <a:avLst/>
@@ -4518,18 +5699,18 @@
           <a:lstStyle/>
           <a:p>
             <a:r>
-              <a:rPr lang="en-US" sz="3200" dirty="0"/>
-              <a:t>Video Link:</a:t>
-            </a:r>
-          </a:p>
-        </p:txBody>
-      </p:sp>
-      <p:sp>
-        <p:nvSpPr>
-          <p:cNvPr id="8" name="กล่องข้อความ 7">
-            <a:extLst>
-              <a:ext uri="{FF2B5EF4-FFF2-40B4-BE49-F238E27FC236}">
-                <a16:creationId xmlns:a16="http://schemas.microsoft.com/office/drawing/2014/main" id="{E09FFAAA-7C14-0569-8D4E-0234266654A2}"/>
+              <a:rPr lang="en-US" dirty="0"/>
+              <a:t>14</a:t>
+            </a:r>
+          </a:p>
+        </p:txBody>
+      </p:sp>
+      <p:sp>
+        <p:nvSpPr>
+          <p:cNvPr id="5" name="กล่องข้อความ 4">
+            <a:extLst>
+              <a:ext uri="{FF2B5EF4-FFF2-40B4-BE49-F238E27FC236}">
+                <a16:creationId xmlns:a16="http://schemas.microsoft.com/office/drawing/2014/main" id="{6521C9A2-4542-BCAB-2212-5DD0226AA3D6}"/>
               </a:ext>
             </a:extLst>
           </p:cNvPr>
@@ -4538,8 +5719,8 @@
         </p:nvSpPr>
         <p:spPr>
           <a:xfrm>
-            <a:off x="3248904" y="2942329"/>
-            <a:ext cx="6094070" cy="461665"/>
+            <a:off x="363894" y="223935"/>
+            <a:ext cx="5657318" cy="584775"/>
           </a:xfrm>
           <a:prstGeom prst="rect">
             <a:avLst/>
@@ -4547,24 +5728,90 @@
           <a:noFill/>
         </p:spPr>
         <p:txBody>
-          <a:bodyPr wrap="square">
+          <a:bodyPr wrap="none" rtlCol="0">
             <a:spAutoFit/>
           </a:bodyPr>
           <a:lstStyle/>
           <a:p>
             <a:r>
-              <a:rPr lang="en-US" sz="2400" dirty="0"/>
-              <a:t>(Describe additional requirement)</a:t>
-            </a:r>
-          </a:p>
-        </p:txBody>
-      </p:sp>
-      <p:sp>
-        <p:nvSpPr>
-          <p:cNvPr id="9" name="กล่องข้อความ 8">
-            <a:extLst>
-              <a:ext uri="{FF2B5EF4-FFF2-40B4-BE49-F238E27FC236}">
-                <a16:creationId xmlns:a16="http://schemas.microsoft.com/office/drawing/2014/main" id="{3C752C78-CA56-EE55-3275-A6741C1F56B7}"/>
+              <a:rPr lang="en-US" sz="3200" dirty="0"/>
+              <a:t>Sequence Diagram: Logout (GET)</a:t>
+            </a:r>
+          </a:p>
+        </p:txBody>
+      </p:sp>
+    </p:spTree>
+    <p:extLst>
+      <p:ext uri="{BB962C8B-B14F-4D97-AF65-F5344CB8AC3E}">
+        <p14:creationId xmlns:p14="http://schemas.microsoft.com/office/powerpoint/2010/main" val="2050740203"/>
+      </p:ext>
+    </p:extLst>
+  </p:cSld>
+  <p:clrMapOvr>
+    <a:masterClrMapping/>
+  </p:clrMapOvr>
+</p:sld>
+</file>
+
+<file path=ppt/slides/slide15.xml><?xml version="1.0" encoding="utf-8"?>
+<p:sld xmlns:a="http://schemas.openxmlformats.org/drawingml/2006/main" xmlns:r="http://schemas.openxmlformats.org/officeDocument/2006/relationships" xmlns:p="http://schemas.openxmlformats.org/presentationml/2006/main">
+  <p:cSld>
+    <p:spTree>
+      <p:nvGrpSpPr>
+        <p:cNvPr id="1" name=""/>
+        <p:cNvGrpSpPr/>
+        <p:nvPr/>
+      </p:nvGrpSpPr>
+      <p:grpSpPr>
+        <a:xfrm>
+          <a:off x="0" y="0"/>
+          <a:ext cx="0" cy="0"/>
+          <a:chOff x="0" y="0"/>
+          <a:chExt cx="0" cy="0"/>
+        </a:xfrm>
+      </p:grpSpPr>
+      <p:pic>
+        <p:nvPicPr>
+          <p:cNvPr id="3" name="รูปภาพ 2">
+            <a:extLst>
+              <a:ext uri="{FF2B5EF4-FFF2-40B4-BE49-F238E27FC236}">
+                <a16:creationId xmlns:a16="http://schemas.microsoft.com/office/drawing/2014/main" id="{C6B85D5C-ED72-99DB-0167-32F558A920D9}"/>
+              </a:ext>
+            </a:extLst>
+          </p:cNvPr>
+          <p:cNvPicPr>
+            <a:picLocks noChangeAspect="1"/>
+          </p:cNvPicPr>
+          <p:nvPr/>
+        </p:nvPicPr>
+        <p:blipFill>
+          <a:blip r:embed="rId2">
+            <a:extLst>
+              <a:ext uri="{28A0092B-C50C-407E-A947-70E740481C1C}">
+                <a14:useLocalDpi xmlns:a14="http://schemas.microsoft.com/office/drawing/2010/main" val="0"/>
+              </a:ext>
+            </a:extLst>
+          </a:blip>
+          <a:stretch>
+            <a:fillRect/>
+          </a:stretch>
+        </p:blipFill>
+        <p:spPr>
+          <a:xfrm>
+            <a:off x="2370267" y="1111018"/>
+            <a:ext cx="7451466" cy="5459933"/>
+          </a:xfrm>
+          <a:prstGeom prst="rect">
+            <a:avLst/>
+          </a:prstGeom>
+        </p:spPr>
+      </p:pic>
+      <p:sp>
+        <p:nvSpPr>
+          <p:cNvPr id="4" name="กล่องข้อความ 3">
+            <a:extLst>
+              <a:ext uri="{FF2B5EF4-FFF2-40B4-BE49-F238E27FC236}">
+                <a16:creationId xmlns:a16="http://schemas.microsoft.com/office/drawing/2014/main" id="{BA557FDB-BE10-1B1A-7185-10478A19091F}"/>
               </a:ext>
             </a:extLst>
           </p:cNvPr>
@@ -4573,8 +5820,8 @@
         </p:nvSpPr>
         <p:spPr>
           <a:xfrm>
-            <a:off x="835311" y="741732"/>
-            <a:ext cx="5978496" cy="830997"/>
+            <a:off x="11492889" y="6201619"/>
+            <a:ext cx="418704" cy="369332"/>
           </a:xfrm>
           <a:prstGeom prst="rect">
             <a:avLst/>
@@ -4588,8 +5835,43 @@
           <a:lstStyle/>
           <a:p>
             <a:r>
-              <a:rPr lang="en-US" sz="4800" dirty="0"/>
-              <a:t>Source Code and Video</a:t>
+              <a:rPr lang="en-US" dirty="0"/>
+              <a:t>15</a:t>
+            </a:r>
+          </a:p>
+        </p:txBody>
+      </p:sp>
+      <p:sp>
+        <p:nvSpPr>
+          <p:cNvPr id="5" name="กล่องข้อความ 4">
+            <a:extLst>
+              <a:ext uri="{FF2B5EF4-FFF2-40B4-BE49-F238E27FC236}">
+                <a16:creationId xmlns:a16="http://schemas.microsoft.com/office/drawing/2014/main" id="{27CD6C53-A106-8186-676D-6B055A5C3CAD}"/>
+              </a:ext>
+            </a:extLst>
+          </p:cNvPr>
+          <p:cNvSpPr txBox="1"/>
+          <p:nvPr/>
+        </p:nvSpPr>
+        <p:spPr>
+          <a:xfrm>
+            <a:off x="363894" y="223935"/>
+            <a:ext cx="6912726" cy="584775"/>
+          </a:xfrm>
+          <a:prstGeom prst="rect">
+            <a:avLst/>
+          </a:prstGeom>
+          <a:noFill/>
+        </p:spPr>
+        <p:txBody>
+          <a:bodyPr wrap="none" rtlCol="0">
+            <a:spAutoFit/>
+          </a:bodyPr>
+          <a:lstStyle/>
+          <a:p>
+            <a:r>
+              <a:rPr lang="en-US" sz="3200" dirty="0"/>
+              <a:t>Sequence Diagram: Get All Dentist (GET)</a:t>
             </a:r>
           </a:p>
         </p:txBody>
@@ -4597,7 +5879,551 @@
     </p:spTree>
     <p:extLst>
       <p:ext uri="{BB962C8B-B14F-4D97-AF65-F5344CB8AC3E}">
-        <p14:creationId xmlns:p14="http://schemas.microsoft.com/office/powerpoint/2010/main" val="9958844"/>
+        <p14:creationId xmlns:p14="http://schemas.microsoft.com/office/powerpoint/2010/main" val="489752955"/>
+      </p:ext>
+    </p:extLst>
+  </p:cSld>
+  <p:clrMapOvr>
+    <a:masterClrMapping/>
+  </p:clrMapOvr>
+</p:sld>
+</file>
+
+<file path=ppt/slides/slide16.xml><?xml version="1.0" encoding="utf-8"?>
+<p:sld xmlns:a="http://schemas.openxmlformats.org/drawingml/2006/main" xmlns:r="http://schemas.openxmlformats.org/officeDocument/2006/relationships" xmlns:p="http://schemas.openxmlformats.org/presentationml/2006/main">
+  <p:cSld>
+    <p:spTree>
+      <p:nvGrpSpPr>
+        <p:cNvPr id="1" name=""/>
+        <p:cNvGrpSpPr/>
+        <p:nvPr/>
+      </p:nvGrpSpPr>
+      <p:grpSpPr>
+        <a:xfrm>
+          <a:off x="0" y="0"/>
+          <a:ext cx="0" cy="0"/>
+          <a:chOff x="0" y="0"/>
+          <a:chExt cx="0" cy="0"/>
+        </a:xfrm>
+      </p:grpSpPr>
+      <p:pic>
+        <p:nvPicPr>
+          <p:cNvPr id="3" name="รูปภาพ 2">
+            <a:extLst>
+              <a:ext uri="{FF2B5EF4-FFF2-40B4-BE49-F238E27FC236}">
+                <a16:creationId xmlns:a16="http://schemas.microsoft.com/office/drawing/2014/main" id="{C046A252-6070-74EC-C5E0-DD7753A77896}"/>
+              </a:ext>
+            </a:extLst>
+          </p:cNvPr>
+          <p:cNvPicPr>
+            <a:picLocks noChangeAspect="1"/>
+          </p:cNvPicPr>
+          <p:nvPr/>
+        </p:nvPicPr>
+        <p:blipFill>
+          <a:blip r:embed="rId2">
+            <a:extLst>
+              <a:ext uri="{28A0092B-C50C-407E-A947-70E740481C1C}">
+                <a14:useLocalDpi xmlns:a14="http://schemas.microsoft.com/office/drawing/2010/main" val="0"/>
+              </a:ext>
+            </a:extLst>
+          </a:blip>
+          <a:stretch>
+            <a:fillRect/>
+          </a:stretch>
+        </p:blipFill>
+        <p:spPr>
+          <a:xfrm>
+            <a:off x="1662112" y="890360"/>
+            <a:ext cx="8867775" cy="5495925"/>
+          </a:xfrm>
+          <a:prstGeom prst="rect">
+            <a:avLst/>
+          </a:prstGeom>
+        </p:spPr>
+      </p:pic>
+      <p:sp>
+        <p:nvSpPr>
+          <p:cNvPr id="4" name="กล่องข้อความ 3">
+            <a:extLst>
+              <a:ext uri="{FF2B5EF4-FFF2-40B4-BE49-F238E27FC236}">
+                <a16:creationId xmlns:a16="http://schemas.microsoft.com/office/drawing/2014/main" id="{E4B60041-ACC5-974D-D243-6C385A5529AF}"/>
+              </a:ext>
+            </a:extLst>
+          </p:cNvPr>
+          <p:cNvSpPr txBox="1"/>
+          <p:nvPr/>
+        </p:nvSpPr>
+        <p:spPr>
+          <a:xfrm>
+            <a:off x="11492889" y="6201619"/>
+            <a:ext cx="418704" cy="369332"/>
+          </a:xfrm>
+          <a:prstGeom prst="rect">
+            <a:avLst/>
+          </a:prstGeom>
+          <a:noFill/>
+        </p:spPr>
+        <p:txBody>
+          <a:bodyPr wrap="none" rtlCol="0">
+            <a:spAutoFit/>
+          </a:bodyPr>
+          <a:lstStyle/>
+          <a:p>
+            <a:r>
+              <a:rPr lang="en-US" dirty="0"/>
+              <a:t>16</a:t>
+            </a:r>
+          </a:p>
+        </p:txBody>
+      </p:sp>
+      <p:sp>
+        <p:nvSpPr>
+          <p:cNvPr id="5" name="กล่องข้อความ 4">
+            <a:extLst>
+              <a:ext uri="{FF2B5EF4-FFF2-40B4-BE49-F238E27FC236}">
+                <a16:creationId xmlns:a16="http://schemas.microsoft.com/office/drawing/2014/main" id="{AEE70E60-98BC-72AC-9929-72CA6D927AE2}"/>
+              </a:ext>
+            </a:extLst>
+          </p:cNvPr>
+          <p:cNvSpPr txBox="1"/>
+          <p:nvPr/>
+        </p:nvSpPr>
+        <p:spPr>
+          <a:xfrm>
+            <a:off x="363894" y="223935"/>
+            <a:ext cx="7246727" cy="584775"/>
+          </a:xfrm>
+          <a:prstGeom prst="rect">
+            <a:avLst/>
+          </a:prstGeom>
+          <a:noFill/>
+        </p:spPr>
+        <p:txBody>
+          <a:bodyPr wrap="none" rtlCol="0">
+            <a:spAutoFit/>
+          </a:bodyPr>
+          <a:lstStyle/>
+          <a:p>
+            <a:r>
+              <a:rPr lang="en-US" sz="3200" dirty="0"/>
+              <a:t>Sequence Diagram: Create Booking (POST)</a:t>
+            </a:r>
+          </a:p>
+        </p:txBody>
+      </p:sp>
+    </p:spTree>
+    <p:extLst>
+      <p:ext uri="{BB962C8B-B14F-4D97-AF65-F5344CB8AC3E}">
+        <p14:creationId xmlns:p14="http://schemas.microsoft.com/office/powerpoint/2010/main" val="667543355"/>
+      </p:ext>
+    </p:extLst>
+  </p:cSld>
+  <p:clrMapOvr>
+    <a:masterClrMapping/>
+  </p:clrMapOvr>
+</p:sld>
+</file>
+
+<file path=ppt/slides/slide17.xml><?xml version="1.0" encoding="utf-8"?>
+<p:sld xmlns:a="http://schemas.openxmlformats.org/drawingml/2006/main" xmlns:r="http://schemas.openxmlformats.org/officeDocument/2006/relationships" xmlns:p="http://schemas.openxmlformats.org/presentationml/2006/main">
+  <p:cSld>
+    <p:spTree>
+      <p:nvGrpSpPr>
+        <p:cNvPr id="1" name=""/>
+        <p:cNvGrpSpPr/>
+        <p:nvPr/>
+      </p:nvGrpSpPr>
+      <p:grpSpPr>
+        <a:xfrm>
+          <a:off x="0" y="0"/>
+          <a:ext cx="0" cy="0"/>
+          <a:chOff x="0" y="0"/>
+          <a:chExt cx="0" cy="0"/>
+        </a:xfrm>
+      </p:grpSpPr>
+      <p:pic>
+        <p:nvPicPr>
+          <p:cNvPr id="3" name="รูปภาพ 2">
+            <a:extLst>
+              <a:ext uri="{FF2B5EF4-FFF2-40B4-BE49-F238E27FC236}">
+                <a16:creationId xmlns:a16="http://schemas.microsoft.com/office/drawing/2014/main" id="{6F2142F9-CECC-2E56-7FB2-A7BDB71BD21F}"/>
+              </a:ext>
+            </a:extLst>
+          </p:cNvPr>
+          <p:cNvPicPr>
+            <a:picLocks noChangeAspect="1"/>
+          </p:cNvPicPr>
+          <p:nvPr/>
+        </p:nvPicPr>
+        <p:blipFill>
+          <a:blip r:embed="rId2">
+            <a:extLst>
+              <a:ext uri="{28A0092B-C50C-407E-A947-70E740481C1C}">
+                <a14:useLocalDpi xmlns:a14="http://schemas.microsoft.com/office/drawing/2010/main" val="0"/>
+              </a:ext>
+            </a:extLst>
+          </a:blip>
+          <a:stretch>
+            <a:fillRect/>
+          </a:stretch>
+        </p:blipFill>
+        <p:spPr>
+          <a:xfrm>
+            <a:off x="295275" y="890360"/>
+            <a:ext cx="11601450" cy="5495925"/>
+          </a:xfrm>
+          <a:prstGeom prst="rect">
+            <a:avLst/>
+          </a:prstGeom>
+        </p:spPr>
+      </p:pic>
+      <p:sp>
+        <p:nvSpPr>
+          <p:cNvPr id="4" name="กล่องข้อความ 3">
+            <a:extLst>
+              <a:ext uri="{FF2B5EF4-FFF2-40B4-BE49-F238E27FC236}">
+                <a16:creationId xmlns:a16="http://schemas.microsoft.com/office/drawing/2014/main" id="{6F568353-C51D-FB3E-383B-41629AAB2277}"/>
+              </a:ext>
+            </a:extLst>
+          </p:cNvPr>
+          <p:cNvSpPr txBox="1"/>
+          <p:nvPr/>
+        </p:nvSpPr>
+        <p:spPr>
+          <a:xfrm>
+            <a:off x="11492889" y="6201619"/>
+            <a:ext cx="418704" cy="369332"/>
+          </a:xfrm>
+          <a:prstGeom prst="rect">
+            <a:avLst/>
+          </a:prstGeom>
+          <a:noFill/>
+        </p:spPr>
+        <p:txBody>
+          <a:bodyPr wrap="none" rtlCol="0">
+            <a:spAutoFit/>
+          </a:bodyPr>
+          <a:lstStyle/>
+          <a:p>
+            <a:r>
+              <a:rPr lang="en-US" dirty="0"/>
+              <a:t>17</a:t>
+            </a:r>
+          </a:p>
+        </p:txBody>
+      </p:sp>
+      <p:sp>
+        <p:nvSpPr>
+          <p:cNvPr id="5" name="กล่องข้อความ 4">
+            <a:extLst>
+              <a:ext uri="{FF2B5EF4-FFF2-40B4-BE49-F238E27FC236}">
+                <a16:creationId xmlns:a16="http://schemas.microsoft.com/office/drawing/2014/main" id="{3003A8B6-A8A0-7D2F-4A0C-F3C04FBE2274}"/>
+              </a:ext>
+            </a:extLst>
+          </p:cNvPr>
+          <p:cNvSpPr txBox="1"/>
+          <p:nvPr/>
+        </p:nvSpPr>
+        <p:spPr>
+          <a:xfrm>
+            <a:off x="363894" y="223935"/>
+            <a:ext cx="7186006" cy="584775"/>
+          </a:xfrm>
+          <a:prstGeom prst="rect">
+            <a:avLst/>
+          </a:prstGeom>
+          <a:noFill/>
+        </p:spPr>
+        <p:txBody>
+          <a:bodyPr wrap="none" rtlCol="0">
+            <a:spAutoFit/>
+          </a:bodyPr>
+          <a:lstStyle/>
+          <a:p>
+            <a:r>
+              <a:rPr lang="en-US" sz="3200" dirty="0"/>
+              <a:t>Sequence Diagram: Update Booking (PUT)</a:t>
+            </a:r>
+          </a:p>
+        </p:txBody>
+      </p:sp>
+    </p:spTree>
+    <p:extLst>
+      <p:ext uri="{BB962C8B-B14F-4D97-AF65-F5344CB8AC3E}">
+        <p14:creationId xmlns:p14="http://schemas.microsoft.com/office/powerpoint/2010/main" val="982277753"/>
+      </p:ext>
+    </p:extLst>
+  </p:cSld>
+  <p:clrMapOvr>
+    <a:masterClrMapping/>
+  </p:clrMapOvr>
+</p:sld>
+</file>
+
+<file path=ppt/slides/slide18.xml><?xml version="1.0" encoding="utf-8"?>
+<p:sld xmlns:a="http://schemas.openxmlformats.org/drawingml/2006/main" xmlns:r="http://schemas.openxmlformats.org/officeDocument/2006/relationships" xmlns:p="http://schemas.openxmlformats.org/presentationml/2006/main">
+  <p:cSld>
+    <p:spTree>
+      <p:nvGrpSpPr>
+        <p:cNvPr id="1" name=""/>
+        <p:cNvGrpSpPr/>
+        <p:nvPr/>
+      </p:nvGrpSpPr>
+      <p:grpSpPr>
+        <a:xfrm>
+          <a:off x="0" y="0"/>
+          <a:ext cx="0" cy="0"/>
+          <a:chOff x="0" y="0"/>
+          <a:chExt cx="0" cy="0"/>
+        </a:xfrm>
+      </p:grpSpPr>
+      <p:pic>
+        <p:nvPicPr>
+          <p:cNvPr id="3" name="รูปภาพ 2">
+            <a:extLst>
+              <a:ext uri="{FF2B5EF4-FFF2-40B4-BE49-F238E27FC236}">
+                <a16:creationId xmlns:a16="http://schemas.microsoft.com/office/drawing/2014/main" id="{04F1CCB9-EE5D-ACCE-F300-42D612C8F001}"/>
+              </a:ext>
+            </a:extLst>
+          </p:cNvPr>
+          <p:cNvPicPr>
+            <a:picLocks noChangeAspect="1"/>
+          </p:cNvPicPr>
+          <p:nvPr/>
+        </p:nvPicPr>
+        <p:blipFill>
+          <a:blip r:embed="rId2">
+            <a:extLst>
+              <a:ext uri="{28A0092B-C50C-407E-A947-70E740481C1C}">
+                <a14:useLocalDpi xmlns:a14="http://schemas.microsoft.com/office/drawing/2010/main" val="0"/>
+              </a:ext>
+            </a:extLst>
+          </a:blip>
+          <a:stretch>
+            <a:fillRect/>
+          </a:stretch>
+        </p:blipFill>
+        <p:spPr>
+          <a:xfrm>
+            <a:off x="804862" y="1075026"/>
+            <a:ext cx="10582275" cy="5495925"/>
+          </a:xfrm>
+          <a:prstGeom prst="rect">
+            <a:avLst/>
+          </a:prstGeom>
+        </p:spPr>
+      </p:pic>
+      <p:sp>
+        <p:nvSpPr>
+          <p:cNvPr id="4" name="กล่องข้อความ 3">
+            <a:extLst>
+              <a:ext uri="{FF2B5EF4-FFF2-40B4-BE49-F238E27FC236}">
+                <a16:creationId xmlns:a16="http://schemas.microsoft.com/office/drawing/2014/main" id="{7BDA6D5C-ADFF-87D4-C40E-604C87916817}"/>
+              </a:ext>
+            </a:extLst>
+          </p:cNvPr>
+          <p:cNvSpPr txBox="1"/>
+          <p:nvPr/>
+        </p:nvSpPr>
+        <p:spPr>
+          <a:xfrm>
+            <a:off x="11492889" y="6201619"/>
+            <a:ext cx="418704" cy="369332"/>
+          </a:xfrm>
+          <a:prstGeom prst="rect">
+            <a:avLst/>
+          </a:prstGeom>
+          <a:noFill/>
+        </p:spPr>
+        <p:txBody>
+          <a:bodyPr wrap="none" rtlCol="0">
+            <a:spAutoFit/>
+          </a:bodyPr>
+          <a:lstStyle/>
+          <a:p>
+            <a:r>
+              <a:rPr lang="en-US" dirty="0"/>
+              <a:t>18</a:t>
+            </a:r>
+          </a:p>
+        </p:txBody>
+      </p:sp>
+      <p:sp>
+        <p:nvSpPr>
+          <p:cNvPr id="5" name="กล่องข้อความ 4">
+            <a:extLst>
+              <a:ext uri="{FF2B5EF4-FFF2-40B4-BE49-F238E27FC236}">
+                <a16:creationId xmlns:a16="http://schemas.microsoft.com/office/drawing/2014/main" id="{BF1916FA-C8FC-529D-D2B5-CBBEED64DE9D}"/>
+              </a:ext>
+            </a:extLst>
+          </p:cNvPr>
+          <p:cNvSpPr txBox="1"/>
+          <p:nvPr/>
+        </p:nvSpPr>
+        <p:spPr>
+          <a:xfrm>
+            <a:off x="363894" y="223935"/>
+            <a:ext cx="7602787" cy="584775"/>
+          </a:xfrm>
+          <a:prstGeom prst="rect">
+            <a:avLst/>
+          </a:prstGeom>
+          <a:noFill/>
+        </p:spPr>
+        <p:txBody>
+          <a:bodyPr wrap="none" rtlCol="0">
+            <a:spAutoFit/>
+          </a:bodyPr>
+          <a:lstStyle/>
+          <a:p>
+            <a:r>
+              <a:rPr lang="en-US" sz="3200" dirty="0"/>
+              <a:t>Sequence Diagram: Delete Booking (DELETE)</a:t>
+            </a:r>
+          </a:p>
+        </p:txBody>
+      </p:sp>
+    </p:spTree>
+    <p:extLst>
+      <p:ext uri="{BB962C8B-B14F-4D97-AF65-F5344CB8AC3E}">
+        <p14:creationId xmlns:p14="http://schemas.microsoft.com/office/powerpoint/2010/main" val="1492219135"/>
+      </p:ext>
+    </p:extLst>
+  </p:cSld>
+  <p:clrMapOvr>
+    <a:masterClrMapping/>
+  </p:clrMapOvr>
+</p:sld>
+</file>
+
+<file path=ppt/slides/slide19.xml><?xml version="1.0" encoding="utf-8"?>
+<p:sld xmlns:a="http://schemas.openxmlformats.org/drawingml/2006/main" xmlns:r="http://schemas.openxmlformats.org/officeDocument/2006/relationships" xmlns:p="http://schemas.openxmlformats.org/presentationml/2006/main">
+  <p:cSld>
+    <p:spTree>
+      <p:nvGrpSpPr>
+        <p:cNvPr id="1" name=""/>
+        <p:cNvGrpSpPr/>
+        <p:nvPr/>
+      </p:nvGrpSpPr>
+      <p:grpSpPr>
+        <a:xfrm>
+          <a:off x="0" y="0"/>
+          <a:ext cx="0" cy="0"/>
+          <a:chOff x="0" y="0"/>
+          <a:chExt cx="0" cy="0"/>
+        </a:xfrm>
+      </p:grpSpPr>
+      <p:pic>
+        <p:nvPicPr>
+          <p:cNvPr id="3" name="รูปภาพ 2">
+            <a:extLst>
+              <a:ext uri="{FF2B5EF4-FFF2-40B4-BE49-F238E27FC236}">
+                <a16:creationId xmlns:a16="http://schemas.microsoft.com/office/drawing/2014/main" id="{D56411B1-E6A3-047B-A076-F4CE7186A209}"/>
+              </a:ext>
+            </a:extLst>
+          </p:cNvPr>
+          <p:cNvPicPr>
+            <a:picLocks noChangeAspect="1"/>
+          </p:cNvPicPr>
+          <p:nvPr/>
+        </p:nvPicPr>
+        <p:blipFill>
+          <a:blip r:embed="rId2">
+            <a:extLst>
+              <a:ext uri="{28A0092B-C50C-407E-A947-70E740481C1C}">
+                <a14:useLocalDpi xmlns:a14="http://schemas.microsoft.com/office/drawing/2010/main" val="0"/>
+              </a:ext>
+            </a:extLst>
+          </a:blip>
+          <a:stretch>
+            <a:fillRect/>
+          </a:stretch>
+        </p:blipFill>
+        <p:spPr>
+          <a:xfrm>
+            <a:off x="2226080" y="1104900"/>
+            <a:ext cx="7739839" cy="5466051"/>
+          </a:xfrm>
+          <a:prstGeom prst="rect">
+            <a:avLst/>
+          </a:prstGeom>
+        </p:spPr>
+      </p:pic>
+      <p:sp>
+        <p:nvSpPr>
+          <p:cNvPr id="4" name="กล่องข้อความ 3">
+            <a:extLst>
+              <a:ext uri="{FF2B5EF4-FFF2-40B4-BE49-F238E27FC236}">
+                <a16:creationId xmlns:a16="http://schemas.microsoft.com/office/drawing/2014/main" id="{5E6FF9F6-7D52-BEC2-65C3-9A2A2CAF8FA3}"/>
+              </a:ext>
+            </a:extLst>
+          </p:cNvPr>
+          <p:cNvSpPr txBox="1"/>
+          <p:nvPr/>
+        </p:nvSpPr>
+        <p:spPr>
+          <a:xfrm>
+            <a:off x="11492889" y="6201619"/>
+            <a:ext cx="418704" cy="369332"/>
+          </a:xfrm>
+          <a:prstGeom prst="rect">
+            <a:avLst/>
+          </a:prstGeom>
+          <a:noFill/>
+        </p:spPr>
+        <p:txBody>
+          <a:bodyPr wrap="none" rtlCol="0">
+            <a:spAutoFit/>
+          </a:bodyPr>
+          <a:lstStyle/>
+          <a:p>
+            <a:r>
+              <a:rPr lang="en-US" dirty="0"/>
+              <a:t>19</a:t>
+            </a:r>
+          </a:p>
+        </p:txBody>
+      </p:sp>
+      <p:sp>
+        <p:nvSpPr>
+          <p:cNvPr id="5" name="กล่องข้อความ 4">
+            <a:extLst>
+              <a:ext uri="{FF2B5EF4-FFF2-40B4-BE49-F238E27FC236}">
+                <a16:creationId xmlns:a16="http://schemas.microsoft.com/office/drawing/2014/main" id="{78673105-673B-F836-B9EC-AF9FCC952889}"/>
+              </a:ext>
+            </a:extLst>
+          </p:cNvPr>
+          <p:cNvSpPr txBox="1"/>
+          <p:nvPr/>
+        </p:nvSpPr>
+        <p:spPr>
+          <a:xfrm>
+            <a:off x="363894" y="223935"/>
+            <a:ext cx="7063793" cy="584775"/>
+          </a:xfrm>
+          <a:prstGeom prst="rect">
+            <a:avLst/>
+          </a:prstGeom>
+          <a:noFill/>
+        </p:spPr>
+        <p:txBody>
+          <a:bodyPr wrap="none" rtlCol="0">
+            <a:spAutoFit/>
+          </a:bodyPr>
+          <a:lstStyle/>
+          <a:p>
+            <a:r>
+              <a:rPr lang="en-US" sz="3200" dirty="0"/>
+              <a:t>Sequence Diagram: Get All Booking (GET)</a:t>
+            </a:r>
+          </a:p>
+        </p:txBody>
+      </p:sp>
+    </p:spTree>
+    <p:extLst>
+      <p:ext uri="{BB962C8B-B14F-4D97-AF65-F5344CB8AC3E}">
+        <p14:creationId xmlns:p14="http://schemas.microsoft.com/office/powerpoint/2010/main" val="2936513065"/>
       </p:ext>
     </p:extLst>
   </p:cSld>
@@ -4624,48 +6450,12 @@
           <a:chExt cx="0" cy="0"/>
         </a:xfrm>
       </p:grpSpPr>
-      <p:pic>
-        <p:nvPicPr>
-          <p:cNvPr id="9" name="รูปภาพ 8">
-            <a:extLst>
-              <a:ext uri="{FF2B5EF4-FFF2-40B4-BE49-F238E27FC236}">
-                <a16:creationId xmlns:a16="http://schemas.microsoft.com/office/drawing/2014/main" id="{A9A1D08D-39FE-183C-41C2-072FE489060E}"/>
-              </a:ext>
-            </a:extLst>
-          </p:cNvPr>
-          <p:cNvPicPr>
-            <a:picLocks noChangeAspect="1"/>
-          </p:cNvPicPr>
-          <p:nvPr/>
-        </p:nvPicPr>
-        <p:blipFill>
-          <a:blip r:embed="rId2">
-            <a:extLst>
-              <a:ext uri="{28A0092B-C50C-407E-A947-70E740481C1C}">
-                <a14:useLocalDpi xmlns:a14="http://schemas.microsoft.com/office/drawing/2010/main" val="0"/>
-              </a:ext>
-            </a:extLst>
-          </a:blip>
-          <a:stretch>
-            <a:fillRect/>
-          </a:stretch>
-        </p:blipFill>
-        <p:spPr>
-          <a:xfrm>
-            <a:off x="9151490" y="0"/>
-            <a:ext cx="2249248" cy="6858000"/>
-          </a:xfrm>
-          <a:prstGeom prst="rect">
-            <a:avLst/>
-          </a:prstGeom>
-        </p:spPr>
-      </p:pic>
-      <p:sp>
-        <p:nvSpPr>
-          <p:cNvPr id="10" name="กล่องข้อความ 9">
-            <a:extLst>
-              <a:ext uri="{FF2B5EF4-FFF2-40B4-BE49-F238E27FC236}">
-                <a16:creationId xmlns:a16="http://schemas.microsoft.com/office/drawing/2014/main" id="{196DFD2C-8546-0EDD-42C8-CA552B84EFDB}"/>
+      <p:sp>
+        <p:nvSpPr>
+          <p:cNvPr id="9" name="กล่องข้อความ 8">
+            <a:extLst>
+              <a:ext uri="{FF2B5EF4-FFF2-40B4-BE49-F238E27FC236}">
+                <a16:creationId xmlns:a16="http://schemas.microsoft.com/office/drawing/2014/main" id="{6DE1B5AD-F647-9A4F-C945-06891F0E1F84}"/>
               </a:ext>
             </a:extLst>
           </p:cNvPr>
@@ -4674,8 +6464,8 @@
         </p:nvSpPr>
         <p:spPr>
           <a:xfrm>
-            <a:off x="11492889" y="6201619"/>
-            <a:ext cx="301686" cy="369332"/>
+            <a:off x="712433" y="1753157"/>
+            <a:ext cx="10484528" cy="4401205"/>
           </a:xfrm>
           <a:prstGeom prst="rect">
             <a:avLst/>
@@ -4683,14 +6473,98 @@
           <a:noFill/>
         </p:spPr>
         <p:txBody>
-          <a:bodyPr wrap="none" rtlCol="0">
+          <a:bodyPr wrap="square">
             <a:spAutoFit/>
           </a:bodyPr>
           <a:lstStyle/>
           <a:p>
-            <a:r>
-              <a:rPr lang="en-US" dirty="0"/>
-              <a:t>2</a:t>
+            <a:pPr marL="342900" indent="-342900">
+              <a:buFont typeface="+mj-lt"/>
+              <a:buAutoNum type="arabicPeriod"/>
+            </a:pPr>
+            <a:r>
+              <a:rPr lang="en-US" sz="2000" dirty="0"/>
+              <a:t>The system shall allow a user to register by specifying the name, telephone number, email, and password.</a:t>
+            </a:r>
+          </a:p>
+          <a:p>
+            <a:pPr marL="342900" indent="-342900">
+              <a:buFont typeface="+mj-lt"/>
+              <a:buAutoNum type="arabicPeriod"/>
+            </a:pPr>
+            <a:r>
+              <a:rPr lang="en-US" sz="2000" dirty="0"/>
+              <a:t>After registration, the user becomes a registered user, and the system shall allow the user to log in to use the system by specifying the email and password. The system shall allow a registered user to logout.</a:t>
+            </a:r>
+          </a:p>
+          <a:p>
+            <a:pPr marL="342900" indent="-342900">
+              <a:buFont typeface="+mj-lt"/>
+              <a:buAutoNum type="arabicPeriod"/>
+            </a:pPr>
+            <a:r>
+              <a:rPr lang="en-US" sz="2000" dirty="0"/>
+              <a:t>After login, the system shall allow the registered user to book only ONE session by specifying the date and the preferred dentist. The dentist list is also provided to the user. A dentist information includes the dentist’s name, years of experience, and area of expertise.</a:t>
+            </a:r>
+          </a:p>
+          <a:p>
+            <a:pPr marL="342900" indent="-342900">
+              <a:buFont typeface="+mj-lt"/>
+              <a:buAutoNum type="arabicPeriod"/>
+            </a:pPr>
+            <a:r>
+              <a:rPr lang="en-US" sz="2000" dirty="0"/>
+              <a:t>The system shall allow the registered user to view his booking.</a:t>
+            </a:r>
+          </a:p>
+          <a:p>
+            <a:pPr marL="342900" indent="-342900">
+              <a:buFont typeface="+mj-lt"/>
+              <a:buAutoNum type="arabicPeriod"/>
+            </a:pPr>
+            <a:r>
+              <a:rPr lang="en-US" sz="2000" dirty="0"/>
+              <a:t>The system shall allow the registered user to edit his booking.</a:t>
+            </a:r>
+          </a:p>
+          <a:p>
+            <a:pPr marL="342900" indent="-342900">
+              <a:buFont typeface="+mj-lt"/>
+              <a:buAutoNum type="arabicPeriod"/>
+            </a:pPr>
+            <a:r>
+              <a:rPr lang="en-US" sz="2000" dirty="0"/>
+              <a:t>The system shall allow the registered user to delete his booking.</a:t>
+            </a:r>
+          </a:p>
+          <a:p>
+            <a:pPr marL="342900" indent="-342900">
+              <a:buFont typeface="+mj-lt"/>
+              <a:buAutoNum type="arabicPeriod"/>
+            </a:pPr>
+            <a:r>
+              <a:rPr lang="en-US" sz="2000" dirty="0"/>
+              <a:t>The system shall allow the admin to view any bookings.</a:t>
+            </a:r>
+          </a:p>
+          <a:p>
+            <a:pPr marL="342900" indent="-342900">
+              <a:buFont typeface="+mj-lt"/>
+              <a:buAutoNum type="arabicPeriod"/>
+            </a:pPr>
+            <a:r>
+              <a:rPr lang="en-US" sz="2000" dirty="0"/>
+              <a:t>The system shall allow the admin to edit any bookings.</a:t>
+            </a:r>
+          </a:p>
+          <a:p>
+            <a:pPr marL="342900" indent="-342900">
+              <a:buFont typeface="+mj-lt"/>
+              <a:buAutoNum type="arabicPeriod"/>
+            </a:pPr>
+            <a:r>
+              <a:rPr lang="en-US" sz="2000" dirty="0"/>
+              <a:t>The system shall allow the admin to delete any bookings</a:t>
             </a:r>
           </a:p>
         </p:txBody>
@@ -4700,7 +6574,7 @@
           <p:cNvPr id="11" name="กล่องข้อความ 10">
             <a:extLst>
               <a:ext uri="{FF2B5EF4-FFF2-40B4-BE49-F238E27FC236}">
-                <a16:creationId xmlns:a16="http://schemas.microsoft.com/office/drawing/2014/main" id="{7ECF3C75-9B72-18FD-0C80-D04338AA9745}"/>
+                <a16:creationId xmlns:a16="http://schemas.microsoft.com/office/drawing/2014/main" id="{A158FA35-250A-2271-E42C-9558C8278CE0}"/>
               </a:ext>
             </a:extLst>
           </p:cNvPr>
@@ -4709,8 +6583,8 @@
         </p:nvSpPr>
         <p:spPr>
           <a:xfrm>
-            <a:off x="363894" y="223935"/>
-            <a:ext cx="4057136" cy="584775"/>
+            <a:off x="712433" y="601006"/>
+            <a:ext cx="6094520" cy="707886"/>
           </a:xfrm>
           <a:prstGeom prst="rect">
             <a:avLst/>
@@ -4718,142 +6592,407 @@
           <a:noFill/>
         </p:spPr>
         <p:txBody>
+          <a:bodyPr wrap="square">
+            <a:spAutoFit/>
+          </a:bodyPr>
+          <a:lstStyle/>
+          <a:p>
+            <a:r>
+              <a:rPr lang="en-US" sz="4000" b="1" dirty="0"/>
+              <a:t>Project#4: Dentist Booking</a:t>
+            </a:r>
+          </a:p>
+        </p:txBody>
+      </p:sp>
+      <p:sp>
+        <p:nvSpPr>
+          <p:cNvPr id="15" name="กล่องข้อความ 14">
+            <a:extLst>
+              <a:ext uri="{FF2B5EF4-FFF2-40B4-BE49-F238E27FC236}">
+                <a16:creationId xmlns:a16="http://schemas.microsoft.com/office/drawing/2014/main" id="{583CFE00-FF08-7D6B-0646-17D1C3C1D527}"/>
+              </a:ext>
+            </a:extLst>
+          </p:cNvPr>
+          <p:cNvSpPr txBox="1"/>
+          <p:nvPr/>
+        </p:nvSpPr>
+        <p:spPr>
+          <a:xfrm>
+            <a:off x="11492889" y="6213194"/>
+            <a:ext cx="301686" cy="369332"/>
+          </a:xfrm>
+          <a:prstGeom prst="rect">
+            <a:avLst/>
+          </a:prstGeom>
+          <a:noFill/>
+        </p:spPr>
+        <p:txBody>
           <a:bodyPr wrap="none" rtlCol="0">
             <a:spAutoFit/>
           </a:bodyPr>
           <a:lstStyle/>
           <a:p>
             <a:r>
-              <a:rPr lang="en-US" sz="3200" dirty="0"/>
-              <a:t>UML Use Case Diagram</a:t>
-            </a:r>
-          </a:p>
-        </p:txBody>
-      </p:sp>
-      <p:pic>
-        <p:nvPicPr>
-          <p:cNvPr id="19" name="รูปภาพ 18">
-            <a:extLst>
-              <a:ext uri="{FF2B5EF4-FFF2-40B4-BE49-F238E27FC236}">
-                <a16:creationId xmlns:a16="http://schemas.microsoft.com/office/drawing/2014/main" id="{F8E47781-33E9-61E9-32CC-8F68FEF257C1}"/>
-              </a:ext>
-            </a:extLst>
-          </p:cNvPr>
-          <p:cNvPicPr>
-            <a:picLocks noChangeAspect="1"/>
-          </p:cNvPicPr>
+              <a:rPr lang="en-US" dirty="0"/>
+              <a:t>2</a:t>
+            </a:r>
+          </a:p>
+        </p:txBody>
+      </p:sp>
+    </p:spTree>
+    <p:extLst>
+      <p:ext uri="{BB962C8B-B14F-4D97-AF65-F5344CB8AC3E}">
+        <p14:creationId xmlns:p14="http://schemas.microsoft.com/office/powerpoint/2010/main" val="1347230408"/>
+      </p:ext>
+    </p:extLst>
+  </p:cSld>
+  <p:clrMapOvr>
+    <a:masterClrMapping/>
+  </p:clrMapOvr>
+</p:sld>
+</file>
+
+<file path=ppt/slides/slide20.xml><?xml version="1.0" encoding="utf-8"?>
+<p:sld xmlns:a="http://schemas.openxmlformats.org/drawingml/2006/main" xmlns:r="http://schemas.openxmlformats.org/officeDocument/2006/relationships" xmlns:p="http://schemas.openxmlformats.org/presentationml/2006/main">
+  <p:cSld>
+    <p:spTree>
+      <p:nvGrpSpPr>
+        <p:cNvPr id="1" name=""/>
+        <p:cNvGrpSpPr/>
+        <p:nvPr/>
+      </p:nvGrpSpPr>
+      <p:grpSpPr>
+        <a:xfrm>
+          <a:off x="0" y="0"/>
+          <a:ext cx="0" cy="0"/>
+          <a:chOff x="0" y="0"/>
+          <a:chExt cx="0" cy="0"/>
+        </a:xfrm>
+      </p:grpSpPr>
+      <p:sp>
+        <p:nvSpPr>
+          <p:cNvPr id="3" name="กล่องข้อความ 2">
+            <a:extLst>
+              <a:ext uri="{FF2B5EF4-FFF2-40B4-BE49-F238E27FC236}">
+                <a16:creationId xmlns:a16="http://schemas.microsoft.com/office/drawing/2014/main" id="{2148CAA8-1820-CF0C-6B28-5A425086A716}"/>
+              </a:ext>
+            </a:extLst>
+          </p:cNvPr>
+          <p:cNvSpPr txBox="1"/>
           <p:nvPr/>
-        </p:nvPicPr>
-        <p:blipFill>
-          <a:blip r:embed="rId3"/>
-          <a:stretch>
-            <a:fillRect/>
-          </a:stretch>
-        </p:blipFill>
-        <p:spPr>
-          <a:xfrm>
-            <a:off x="1194999" y="1439217"/>
-            <a:ext cx="1943100" cy="1914525"/>
+        </p:nvSpPr>
+        <p:spPr>
+          <a:xfrm>
+            <a:off x="2484633" y="3185975"/>
+            <a:ext cx="6094070" cy="369332"/>
           </a:xfrm>
           <a:prstGeom prst="rect">
             <a:avLst/>
           </a:prstGeom>
-        </p:spPr>
-      </p:pic>
-      <p:pic>
-        <p:nvPicPr>
-          <p:cNvPr id="21" name="รูปภาพ 20">
-            <a:extLst>
-              <a:ext uri="{FF2B5EF4-FFF2-40B4-BE49-F238E27FC236}">
-                <a16:creationId xmlns:a16="http://schemas.microsoft.com/office/drawing/2014/main" id="{3FF93946-C582-3210-4B19-012FBBA0E93C}"/>
-              </a:ext>
-            </a:extLst>
-          </p:cNvPr>
-          <p:cNvPicPr>
-            <a:picLocks noChangeAspect="1"/>
-          </p:cNvPicPr>
+          <a:noFill/>
+        </p:spPr>
+        <p:txBody>
+          <a:bodyPr wrap="square">
+            <a:spAutoFit/>
+          </a:bodyPr>
+          <a:lstStyle/>
+          <a:p>
+            <a:r>
+              <a:rPr lang="en-US" dirty="0"/>
+              <a:t>https://github.com/JirayutP/Dentist</a:t>
+            </a:r>
+          </a:p>
+        </p:txBody>
+      </p:sp>
+      <p:sp>
+        <p:nvSpPr>
+          <p:cNvPr id="4" name="กล่องข้อความ 3">
+            <a:extLst>
+              <a:ext uri="{FF2B5EF4-FFF2-40B4-BE49-F238E27FC236}">
+                <a16:creationId xmlns:a16="http://schemas.microsoft.com/office/drawing/2014/main" id="{567A2A72-6EC4-7021-8792-E3F47E5D7F89}"/>
+              </a:ext>
+            </a:extLst>
+          </p:cNvPr>
+          <p:cNvSpPr txBox="1"/>
           <p:nvPr/>
-        </p:nvPicPr>
-        <p:blipFill>
-          <a:blip r:embed="rId4"/>
-          <a:stretch>
-            <a:fillRect/>
-          </a:stretch>
-        </p:blipFill>
-        <p:spPr>
-          <a:xfrm>
-            <a:off x="5452674" y="525995"/>
-            <a:ext cx="3152775" cy="1552575"/>
+        </p:nvSpPr>
+        <p:spPr>
+          <a:xfrm>
+            <a:off x="11492889" y="6201619"/>
+            <a:ext cx="418704" cy="369332"/>
           </a:xfrm>
           <a:prstGeom prst="rect">
             <a:avLst/>
           </a:prstGeom>
-        </p:spPr>
-      </p:pic>
-      <p:pic>
-        <p:nvPicPr>
-          <p:cNvPr id="23" name="รูปภาพ 22">
-            <a:extLst>
-              <a:ext uri="{FF2B5EF4-FFF2-40B4-BE49-F238E27FC236}">
-                <a16:creationId xmlns:a16="http://schemas.microsoft.com/office/drawing/2014/main" id="{45A8CE52-EC0A-2BAC-E26D-2C23F69817F7}"/>
-              </a:ext>
-            </a:extLst>
-          </p:cNvPr>
-          <p:cNvPicPr>
-            <a:picLocks noChangeAspect="1"/>
-          </p:cNvPicPr>
+          <a:noFill/>
+        </p:spPr>
+        <p:txBody>
+          <a:bodyPr wrap="none" rtlCol="0">
+            <a:spAutoFit/>
+          </a:bodyPr>
+          <a:lstStyle/>
+          <a:p>
+            <a:r>
+              <a:rPr lang="en-US" dirty="0"/>
+              <a:t>20</a:t>
+            </a:r>
+          </a:p>
+        </p:txBody>
+      </p:sp>
+      <p:sp>
+        <p:nvSpPr>
+          <p:cNvPr id="5" name="กล่องข้อความ 4">
+            <a:extLst>
+              <a:ext uri="{FF2B5EF4-FFF2-40B4-BE49-F238E27FC236}">
+                <a16:creationId xmlns:a16="http://schemas.microsoft.com/office/drawing/2014/main" id="{2AE3B0FE-9AAE-6521-220C-838A31A59E0D}"/>
+              </a:ext>
+            </a:extLst>
+          </p:cNvPr>
+          <p:cNvSpPr txBox="1"/>
           <p:nvPr/>
-        </p:nvPicPr>
-        <p:blipFill>
-          <a:blip r:embed="rId5"/>
-          <a:stretch>
-            <a:fillRect/>
-          </a:stretch>
-        </p:blipFill>
-        <p:spPr>
-          <a:xfrm>
-            <a:off x="4557324" y="2078570"/>
-            <a:ext cx="4048125" cy="2381250"/>
+        </p:nvSpPr>
+        <p:spPr>
+          <a:xfrm>
+            <a:off x="764290" y="3139809"/>
+            <a:ext cx="1720343" cy="461665"/>
           </a:xfrm>
           <a:prstGeom prst="rect">
             <a:avLst/>
           </a:prstGeom>
-        </p:spPr>
-      </p:pic>
-      <p:pic>
-        <p:nvPicPr>
-          <p:cNvPr id="25" name="รูปภาพ 24">
-            <a:extLst>
-              <a:ext uri="{FF2B5EF4-FFF2-40B4-BE49-F238E27FC236}">
-                <a16:creationId xmlns:a16="http://schemas.microsoft.com/office/drawing/2014/main" id="{5C44E818-E588-39E4-B3CE-3D25830E8F26}"/>
-              </a:ext>
-            </a:extLst>
-          </p:cNvPr>
-          <p:cNvPicPr>
-            <a:picLocks noChangeAspect="1"/>
-          </p:cNvPicPr>
+          <a:noFill/>
+        </p:spPr>
+        <p:txBody>
+          <a:bodyPr wrap="none" rtlCol="0">
+            <a:spAutoFit/>
+          </a:bodyPr>
+          <a:lstStyle/>
+          <a:p>
+            <a:r>
+              <a:rPr lang="en-US" sz="2400" dirty="0"/>
+              <a:t>GitHub Link:</a:t>
+            </a:r>
+          </a:p>
+        </p:txBody>
+      </p:sp>
+      <p:sp>
+        <p:nvSpPr>
+          <p:cNvPr id="6" name="กล่องข้อความ 5">
+            <a:extLst>
+              <a:ext uri="{FF2B5EF4-FFF2-40B4-BE49-F238E27FC236}">
+                <a16:creationId xmlns:a16="http://schemas.microsoft.com/office/drawing/2014/main" id="{4C72DB4C-5DAE-4C1D-71DE-53DB52BF9F8C}"/>
+              </a:ext>
+            </a:extLst>
+          </p:cNvPr>
+          <p:cNvSpPr txBox="1"/>
           <p:nvPr/>
-        </p:nvPicPr>
-        <p:blipFill>
-          <a:blip r:embed="rId6"/>
-          <a:stretch>
-            <a:fillRect/>
-          </a:stretch>
-        </p:blipFill>
-        <p:spPr>
-          <a:xfrm>
-            <a:off x="2328474" y="4461520"/>
-            <a:ext cx="6276975" cy="2133600"/>
+        </p:nvSpPr>
+        <p:spPr>
+          <a:xfrm>
+            <a:off x="2324332" y="4509131"/>
+            <a:ext cx="8150616" cy="1754326"/>
           </a:xfrm>
           <a:prstGeom prst="rect">
             <a:avLst/>
           </a:prstGeom>
-        </p:spPr>
-      </p:pic>
+          <a:noFill/>
+        </p:spPr>
+        <p:txBody>
+          <a:bodyPr wrap="square">
+            <a:spAutoFit/>
+          </a:bodyPr>
+          <a:lstStyle/>
+          <a:p>
+            <a:r>
+              <a:rPr lang="en-US" dirty="0"/>
+              <a:t>https://chula-my.sharepoint.com/:v:/g/personal/6432022721_student_chula_ac_th/EV4lBv_M9wxIssOnYs14QoIBTVD-ZUKo-b-w3333oMlDig?nav=eyJyZWZlcnJhbEluZm8iOnsicmVmZXJyYWxBcHAiOiJPbmVEcml2ZUZvckJ1c2luZXNzIiwicmVmZXJyYWxBcHBQbGF0Zm9ybSI6IldlYiIsInJlZmVycmFsTW9kZSI6InZpZXciLCJyZWZlcnJhbFZpZXciOiJNeUZpbGVzTGlua0NvcHkifX0&amp;e=CSVfYY</a:t>
+            </a:r>
+          </a:p>
+        </p:txBody>
+      </p:sp>
+      <p:sp>
+        <p:nvSpPr>
+          <p:cNvPr id="7" name="กล่องข้อความ 6">
+            <a:extLst>
+              <a:ext uri="{FF2B5EF4-FFF2-40B4-BE49-F238E27FC236}">
+                <a16:creationId xmlns:a16="http://schemas.microsoft.com/office/drawing/2014/main" id="{CE8301A5-723D-0340-6341-A08FF3EF5B13}"/>
+              </a:ext>
+            </a:extLst>
+          </p:cNvPr>
+          <p:cNvSpPr txBox="1"/>
+          <p:nvPr/>
+        </p:nvSpPr>
+        <p:spPr>
+          <a:xfrm>
+            <a:off x="764290" y="4001017"/>
+            <a:ext cx="1560042" cy="461665"/>
+          </a:xfrm>
+          <a:prstGeom prst="rect">
+            <a:avLst/>
+          </a:prstGeom>
+          <a:noFill/>
+        </p:spPr>
+        <p:txBody>
+          <a:bodyPr wrap="none" rtlCol="0">
+            <a:spAutoFit/>
+          </a:bodyPr>
+          <a:lstStyle/>
+          <a:p>
+            <a:r>
+              <a:rPr lang="en-US" sz="2400" dirty="0"/>
+              <a:t>Video Link:</a:t>
+            </a:r>
+          </a:p>
+        </p:txBody>
+      </p:sp>
+      <p:sp>
+        <p:nvSpPr>
+          <p:cNvPr id="8" name="กล่องข้อความ 7">
+            <a:extLst>
+              <a:ext uri="{FF2B5EF4-FFF2-40B4-BE49-F238E27FC236}">
+                <a16:creationId xmlns:a16="http://schemas.microsoft.com/office/drawing/2014/main" id="{E09FFAAA-7C14-0569-8D4E-0234266654A2}"/>
+              </a:ext>
+            </a:extLst>
+          </p:cNvPr>
+          <p:cNvSpPr txBox="1"/>
+          <p:nvPr/>
+        </p:nvSpPr>
+        <p:spPr>
+          <a:xfrm>
+            <a:off x="2302114" y="4047466"/>
+            <a:ext cx="6094070" cy="369332"/>
+          </a:xfrm>
+          <a:prstGeom prst="rect">
+            <a:avLst/>
+          </a:prstGeom>
+          <a:noFill/>
+        </p:spPr>
+        <p:txBody>
+          <a:bodyPr wrap="square">
+            <a:spAutoFit/>
+          </a:bodyPr>
+          <a:lstStyle/>
+          <a:p>
+            <a:r>
+              <a:rPr lang="en-US" dirty="0"/>
+              <a:t>(Describe additional requirement)</a:t>
+            </a:r>
+          </a:p>
+        </p:txBody>
+      </p:sp>
+      <p:sp>
+        <p:nvSpPr>
+          <p:cNvPr id="9" name="กล่องข้อความ 8">
+            <a:extLst>
+              <a:ext uri="{FF2B5EF4-FFF2-40B4-BE49-F238E27FC236}">
+                <a16:creationId xmlns:a16="http://schemas.microsoft.com/office/drawing/2014/main" id="{3C752C78-CA56-EE55-3275-A6741C1F56B7}"/>
+              </a:ext>
+            </a:extLst>
+          </p:cNvPr>
+          <p:cNvSpPr txBox="1"/>
+          <p:nvPr/>
+        </p:nvSpPr>
+        <p:spPr>
+          <a:xfrm>
+            <a:off x="675513" y="387205"/>
+            <a:ext cx="6156814" cy="830997"/>
+          </a:xfrm>
+          <a:prstGeom prst="rect">
+            <a:avLst/>
+          </a:prstGeom>
+          <a:noFill/>
+        </p:spPr>
+        <p:txBody>
+          <a:bodyPr wrap="none" rtlCol="0">
+            <a:spAutoFit/>
+          </a:bodyPr>
+          <a:lstStyle/>
+          <a:p>
+            <a:r>
+              <a:rPr lang="en-US" sz="4800" dirty="0"/>
+              <a:t>Additional Requirement</a:t>
+            </a:r>
+          </a:p>
+        </p:txBody>
+      </p:sp>
+      <p:sp>
+        <p:nvSpPr>
+          <p:cNvPr id="12" name="กล่องข้อความ 11">
+            <a:extLst>
+              <a:ext uri="{FF2B5EF4-FFF2-40B4-BE49-F238E27FC236}">
+                <a16:creationId xmlns:a16="http://schemas.microsoft.com/office/drawing/2014/main" id="{9483C7E3-4BCF-9B0F-7631-6F7189BA420B}"/>
+              </a:ext>
+            </a:extLst>
+          </p:cNvPr>
+          <p:cNvSpPr txBox="1"/>
+          <p:nvPr/>
+        </p:nvSpPr>
+        <p:spPr>
+          <a:xfrm>
+            <a:off x="764290" y="1181359"/>
+            <a:ext cx="10117193" cy="1631216"/>
+          </a:xfrm>
+          <a:prstGeom prst="rect">
+            <a:avLst/>
+          </a:prstGeom>
+          <a:noFill/>
+        </p:spPr>
+        <p:txBody>
+          <a:bodyPr wrap="square">
+            <a:spAutoFit/>
+          </a:bodyPr>
+          <a:lstStyle/>
+          <a:p>
+            <a:pPr marL="342900" indent="-342900">
+              <a:buFont typeface="Arial" panose="020B0604020202020204" pitchFamily="34" charset="0"/>
+              <a:buChar char="•"/>
+            </a:pPr>
+            <a:r>
+              <a:rPr lang="en-US" sz="2000" dirty="0"/>
+              <a:t>The system shall allow the admin to create dentist information.</a:t>
+            </a:r>
+          </a:p>
+          <a:p>
+            <a:pPr marL="342900" indent="-342900">
+              <a:buFont typeface="Arial" panose="020B0604020202020204" pitchFamily="34" charset="0"/>
+              <a:buChar char="•"/>
+            </a:pPr>
+            <a:r>
+              <a:rPr lang="en-US" sz="2000" dirty="0"/>
+              <a:t>The system shall allow the admin to delete any dentist information.</a:t>
+            </a:r>
+          </a:p>
+          <a:p>
+            <a:pPr marL="342900" indent="-342900">
+              <a:buFont typeface="Arial" panose="020B0604020202020204" pitchFamily="34" charset="0"/>
+              <a:buChar char="•"/>
+            </a:pPr>
+            <a:r>
+              <a:rPr lang="en-US" sz="2000" dirty="0"/>
+              <a:t>The system shall allow the registered user to search dentist information by area of expertise. (</a:t>
+            </a:r>
+            <a:r>
+              <a:rPr lang="en-US" sz="2000" dirty="0" err="1"/>
+              <a:t>getAreaOfExpertise</a:t>
+            </a:r>
+            <a:r>
+              <a:rPr lang="en-US" sz="2000" dirty="0"/>
+              <a:t> and </a:t>
+            </a:r>
+            <a:r>
+              <a:rPr lang="en-US" sz="2000" dirty="0" err="1"/>
+              <a:t>getByArea</a:t>
+            </a:r>
+            <a:r>
+              <a:rPr lang="en-US" sz="2000" dirty="0"/>
+              <a:t>: The area used to search must match an existing area only to be found.)</a:t>
+            </a:r>
+          </a:p>
+        </p:txBody>
+      </p:sp>
     </p:spTree>
     <p:extLst>
       <p:ext uri="{BB962C8B-B14F-4D97-AF65-F5344CB8AC3E}">
-        <p14:creationId xmlns:p14="http://schemas.microsoft.com/office/powerpoint/2010/main" val="1301947537"/>
+        <p14:creationId xmlns:p14="http://schemas.microsoft.com/office/powerpoint/2010/main" val="9958844"/>
       </p:ext>
     </p:extLst>
   </p:cSld>
@@ -4880,47 +7019,12 @@
           <a:chExt cx="0" cy="0"/>
         </a:xfrm>
       </p:grpSpPr>
-      <p:sp>
-        <p:nvSpPr>
-          <p:cNvPr id="6" name="กล่องข้อความ 5">
-            <a:extLst>
-              <a:ext uri="{FF2B5EF4-FFF2-40B4-BE49-F238E27FC236}">
-                <a16:creationId xmlns:a16="http://schemas.microsoft.com/office/drawing/2014/main" id="{5814265F-9213-9980-D41D-3AFEF2F8A3C4}"/>
-              </a:ext>
-            </a:extLst>
-          </p:cNvPr>
-          <p:cNvSpPr txBox="1"/>
-          <p:nvPr/>
-        </p:nvSpPr>
-        <p:spPr>
-          <a:xfrm>
-            <a:off x="11492889" y="6201619"/>
-            <a:ext cx="301686" cy="369332"/>
-          </a:xfrm>
-          <a:prstGeom prst="rect">
-            <a:avLst/>
-          </a:prstGeom>
-          <a:noFill/>
-        </p:spPr>
-        <p:txBody>
-          <a:bodyPr wrap="none" rtlCol="0">
-            <a:spAutoFit/>
-          </a:bodyPr>
-          <a:lstStyle/>
-          <a:p>
-            <a:r>
-              <a:rPr lang="en-US" dirty="0"/>
-              <a:t>3</a:t>
-            </a:r>
-          </a:p>
-        </p:txBody>
-      </p:sp>
       <p:pic>
         <p:nvPicPr>
-          <p:cNvPr id="10" name="รูปภาพ 9">
-            <a:extLst>
-              <a:ext uri="{FF2B5EF4-FFF2-40B4-BE49-F238E27FC236}">
-                <a16:creationId xmlns:a16="http://schemas.microsoft.com/office/drawing/2014/main" id="{D3B175ED-FBF8-E871-57C6-672E38C9EC06}"/>
+          <p:cNvPr id="5" name="รูปภาพ 4">
+            <a:extLst>
+              <a:ext uri="{FF2B5EF4-FFF2-40B4-BE49-F238E27FC236}">
+                <a16:creationId xmlns:a16="http://schemas.microsoft.com/office/drawing/2014/main" id="{BB84E79B-F3A2-1AC0-5A1D-4E5ABFBB490B}"/>
               </a:ext>
             </a:extLst>
           </p:cNvPr>
@@ -4930,21 +7034,15 @@
           <p:nvPr/>
         </p:nvPicPr>
         <p:blipFill>
-          <a:blip r:embed="rId2">
-            <a:extLst>
-              <a:ext uri="{28A0092B-C50C-407E-A947-70E740481C1C}">
-                <a14:useLocalDpi xmlns:a14="http://schemas.microsoft.com/office/drawing/2010/main" val="0"/>
-              </a:ext>
-            </a:extLst>
-          </a:blip>
+          <a:blip r:embed="rId2"/>
           <a:stretch>
             <a:fillRect/>
           </a:stretch>
         </p:blipFill>
         <p:spPr>
           <a:xfrm>
-            <a:off x="3016633" y="734065"/>
-            <a:ext cx="6158734" cy="6056174"/>
+            <a:off x="4108946" y="382667"/>
+            <a:ext cx="6863854" cy="6266997"/>
           </a:xfrm>
           <a:prstGeom prst="rect">
             <a:avLst/>
@@ -4953,10 +7051,10 @@
       </p:pic>
       <p:sp>
         <p:nvSpPr>
-          <p:cNvPr id="11" name="กล่องข้อความ 10">
-            <a:extLst>
-              <a:ext uri="{FF2B5EF4-FFF2-40B4-BE49-F238E27FC236}">
-                <a16:creationId xmlns:a16="http://schemas.microsoft.com/office/drawing/2014/main" id="{0EC2B9A7-E775-9D08-9A1B-36FEA749F938}"/>
+          <p:cNvPr id="8" name="กล่องข้อความ 7">
+            <a:extLst>
+              <a:ext uri="{FF2B5EF4-FFF2-40B4-BE49-F238E27FC236}">
+                <a16:creationId xmlns:a16="http://schemas.microsoft.com/office/drawing/2014/main" id="{C85C1662-391F-503B-67A6-F79737A40D40}"/>
               </a:ext>
             </a:extLst>
           </p:cNvPr>
@@ -4966,7 +7064,7 @@
         <p:spPr>
           <a:xfrm>
             <a:off x="363894" y="223935"/>
-            <a:ext cx="4674100" cy="584775"/>
+            <a:ext cx="3272050" cy="584775"/>
           </a:xfrm>
           <a:prstGeom prst="rect">
             <a:avLst/>
@@ -4981,7 +7079,42 @@
           <a:p>
             <a:r>
               <a:rPr lang="en-US" sz="3200" dirty="0"/>
-              <a:t>Class Diagram: UML Profile</a:t>
+              <a:t>models/Booking.js</a:t>
+            </a:r>
+          </a:p>
+        </p:txBody>
+      </p:sp>
+      <p:sp>
+        <p:nvSpPr>
+          <p:cNvPr id="10" name="กล่องข้อความ 9">
+            <a:extLst>
+              <a:ext uri="{FF2B5EF4-FFF2-40B4-BE49-F238E27FC236}">
+                <a16:creationId xmlns:a16="http://schemas.microsoft.com/office/drawing/2014/main" id="{D3FC9FDA-8EAE-C39F-D67A-DC7498A5F9A4}"/>
+              </a:ext>
+            </a:extLst>
+          </p:cNvPr>
+          <p:cNvSpPr txBox="1"/>
+          <p:nvPr/>
+        </p:nvSpPr>
+        <p:spPr>
+          <a:xfrm>
+            <a:off x="11492889" y="6213194"/>
+            <a:ext cx="301686" cy="369332"/>
+          </a:xfrm>
+          <a:prstGeom prst="rect">
+            <a:avLst/>
+          </a:prstGeom>
+          <a:noFill/>
+        </p:spPr>
+        <p:txBody>
+          <a:bodyPr wrap="none" rtlCol="0">
+            <a:spAutoFit/>
+          </a:bodyPr>
+          <a:lstStyle/>
+          <a:p>
+            <a:r>
+              <a:rPr lang="en-US" dirty="0"/>
+              <a:t>3</a:t>
             </a:r>
           </a:p>
         </p:txBody>
@@ -4989,7 +7122,7 @@
     </p:spTree>
     <p:extLst>
       <p:ext uri="{BB962C8B-B14F-4D97-AF65-F5344CB8AC3E}">
-        <p14:creationId xmlns:p14="http://schemas.microsoft.com/office/powerpoint/2010/main" val="942632483"/>
+        <p14:creationId xmlns:p14="http://schemas.microsoft.com/office/powerpoint/2010/main" val="1728549680"/>
       </p:ext>
     </p:extLst>
   </p:cSld>
@@ -5016,12 +7149,47 @@
           <a:chExt cx="0" cy="0"/>
         </a:xfrm>
       </p:grpSpPr>
+      <p:sp>
+        <p:nvSpPr>
+          <p:cNvPr id="8" name="กล่องข้อความ 7">
+            <a:extLst>
+              <a:ext uri="{FF2B5EF4-FFF2-40B4-BE49-F238E27FC236}">
+                <a16:creationId xmlns:a16="http://schemas.microsoft.com/office/drawing/2014/main" id="{C85C1662-391F-503B-67A6-F79737A40D40}"/>
+              </a:ext>
+            </a:extLst>
+          </p:cNvPr>
+          <p:cNvSpPr txBox="1"/>
+          <p:nvPr/>
+        </p:nvSpPr>
+        <p:spPr>
+          <a:xfrm>
+            <a:off x="363894" y="223935"/>
+            <a:ext cx="3120983" cy="584775"/>
+          </a:xfrm>
+          <a:prstGeom prst="rect">
+            <a:avLst/>
+          </a:prstGeom>
+          <a:noFill/>
+        </p:spPr>
+        <p:txBody>
+          <a:bodyPr wrap="none" rtlCol="0">
+            <a:spAutoFit/>
+          </a:bodyPr>
+          <a:lstStyle/>
+          <a:p>
+            <a:r>
+              <a:rPr lang="en-US" sz="3200" dirty="0"/>
+              <a:t>models/Dentist.js</a:t>
+            </a:r>
+          </a:p>
+        </p:txBody>
+      </p:sp>
       <p:pic>
         <p:nvPicPr>
           <p:cNvPr id="3" name="รูปภาพ 2">
             <a:extLst>
               <a:ext uri="{FF2B5EF4-FFF2-40B4-BE49-F238E27FC236}">
-                <a16:creationId xmlns:a16="http://schemas.microsoft.com/office/drawing/2014/main" id="{DFF97EEE-DA73-FB31-560C-A5317F6EC972}"/>
+                <a16:creationId xmlns:a16="http://schemas.microsoft.com/office/drawing/2014/main" id="{710AA9D6-3EE8-4C61-091D-D1D0C3694CBD}"/>
               </a:ext>
             </a:extLst>
           </p:cNvPr>
@@ -5031,21 +7199,15 @@
           <p:nvPr/>
         </p:nvPicPr>
         <p:blipFill>
-          <a:blip r:embed="rId2">
-            <a:extLst>
-              <a:ext uri="{28A0092B-C50C-407E-A947-70E740481C1C}">
-                <a14:useLocalDpi xmlns:a14="http://schemas.microsoft.com/office/drawing/2010/main" val="0"/>
-              </a:ext>
-            </a:extLst>
-          </a:blip>
+          <a:blip r:embed="rId2"/>
           <a:stretch>
             <a:fillRect/>
           </a:stretch>
         </p:blipFill>
         <p:spPr>
           <a:xfrm>
-            <a:off x="1990861" y="1168014"/>
-            <a:ext cx="8210277" cy="5466051"/>
+            <a:off x="3507319" y="391373"/>
+            <a:ext cx="8213106" cy="5821821"/>
           </a:xfrm>
           <a:prstGeom prst="rect">
             <a:avLst/>
@@ -5054,10 +7216,10 @@
       </p:pic>
       <p:sp>
         <p:nvSpPr>
-          <p:cNvPr id="4" name="กล่องข้อความ 3">
-            <a:extLst>
-              <a:ext uri="{FF2B5EF4-FFF2-40B4-BE49-F238E27FC236}">
-                <a16:creationId xmlns:a16="http://schemas.microsoft.com/office/drawing/2014/main" id="{38B2058E-006D-9E43-B676-A457D3E69AC0}"/>
+          <p:cNvPr id="6" name="กล่องข้อความ 5">
+            <a:extLst>
+              <a:ext uri="{FF2B5EF4-FFF2-40B4-BE49-F238E27FC236}">
+                <a16:creationId xmlns:a16="http://schemas.microsoft.com/office/drawing/2014/main" id="{98C5DD8E-1665-059A-2215-6381522307CB}"/>
               </a:ext>
             </a:extLst>
           </p:cNvPr>
@@ -5066,7 +7228,7 @@
         </p:nvSpPr>
         <p:spPr>
           <a:xfrm>
-            <a:off x="11492889" y="6201619"/>
+            <a:off x="11492889" y="6213194"/>
             <a:ext cx="301686" cy="369332"/>
           </a:xfrm>
           <a:prstGeom prst="rect">
@@ -5087,45 +7249,10 @@
           </a:p>
         </p:txBody>
       </p:sp>
-      <p:sp>
-        <p:nvSpPr>
-          <p:cNvPr id="6" name="กล่องข้อความ 5">
-            <a:extLst>
-              <a:ext uri="{FF2B5EF4-FFF2-40B4-BE49-F238E27FC236}">
-                <a16:creationId xmlns:a16="http://schemas.microsoft.com/office/drawing/2014/main" id="{D63FB832-B3D8-D48D-E432-AE51E29C4773}"/>
-              </a:ext>
-            </a:extLst>
-          </p:cNvPr>
-          <p:cNvSpPr txBox="1"/>
-          <p:nvPr/>
-        </p:nvSpPr>
-        <p:spPr>
-          <a:xfrm>
-            <a:off x="363894" y="223935"/>
-            <a:ext cx="6059416" cy="584775"/>
-          </a:xfrm>
-          <a:prstGeom prst="rect">
-            <a:avLst/>
-          </a:prstGeom>
-          <a:noFill/>
-        </p:spPr>
-        <p:txBody>
-          <a:bodyPr wrap="none" rtlCol="0">
-            <a:spAutoFit/>
-          </a:bodyPr>
-          <a:lstStyle/>
-          <a:p>
-            <a:r>
-              <a:rPr lang="en-US" sz="3200" dirty="0"/>
-              <a:t>Sequence Diagram: Register (POST)</a:t>
-            </a:r>
-          </a:p>
-        </p:txBody>
-      </p:sp>
     </p:spTree>
     <p:extLst>
       <p:ext uri="{BB962C8B-B14F-4D97-AF65-F5344CB8AC3E}">
-        <p14:creationId xmlns:p14="http://schemas.microsoft.com/office/powerpoint/2010/main" val="1978481048"/>
+        <p14:creationId xmlns:p14="http://schemas.microsoft.com/office/powerpoint/2010/main" val="1369642856"/>
       </p:ext>
     </p:extLst>
   </p:cSld>
@@ -5152,12 +7279,47 @@
           <a:chExt cx="0" cy="0"/>
         </a:xfrm>
       </p:grpSpPr>
+      <p:sp>
+        <p:nvSpPr>
+          <p:cNvPr id="8" name="กล่องข้อความ 7">
+            <a:extLst>
+              <a:ext uri="{FF2B5EF4-FFF2-40B4-BE49-F238E27FC236}">
+                <a16:creationId xmlns:a16="http://schemas.microsoft.com/office/drawing/2014/main" id="{C85C1662-391F-503B-67A6-F79737A40D40}"/>
+              </a:ext>
+            </a:extLst>
+          </p:cNvPr>
+          <p:cNvSpPr txBox="1"/>
+          <p:nvPr/>
+        </p:nvSpPr>
+        <p:spPr>
+          <a:xfrm>
+            <a:off x="363894" y="223935"/>
+            <a:ext cx="2653675" cy="584775"/>
+          </a:xfrm>
+          <a:prstGeom prst="rect">
+            <a:avLst/>
+          </a:prstGeom>
+          <a:noFill/>
+        </p:spPr>
+        <p:txBody>
+          <a:bodyPr wrap="none" rtlCol="0">
+            <a:spAutoFit/>
+          </a:bodyPr>
+          <a:lstStyle/>
+          <a:p>
+            <a:r>
+              <a:rPr lang="en-US" sz="3200" dirty="0"/>
+              <a:t>models/User.js</a:t>
+            </a:r>
+          </a:p>
+        </p:txBody>
+      </p:sp>
       <p:pic>
         <p:nvPicPr>
           <p:cNvPr id="3" name="รูปภาพ 2">
             <a:extLst>
               <a:ext uri="{FF2B5EF4-FFF2-40B4-BE49-F238E27FC236}">
-                <a16:creationId xmlns:a16="http://schemas.microsoft.com/office/drawing/2014/main" id="{131F4C2F-8347-68E3-66AA-782E4D4C8C4F}"/>
+                <a16:creationId xmlns:a16="http://schemas.microsoft.com/office/drawing/2014/main" id="{2D87AC22-2618-38BC-93D1-2C2E39CB9E4B}"/>
               </a:ext>
             </a:extLst>
           </p:cNvPr>
@@ -5167,21 +7329,15 @@
           <p:nvPr/>
         </p:nvPicPr>
         <p:blipFill>
-          <a:blip r:embed="rId2">
-            <a:extLst>
-              <a:ext uri="{28A0092B-C50C-407E-A947-70E740481C1C}">
-                <a14:useLocalDpi xmlns:a14="http://schemas.microsoft.com/office/drawing/2010/main" val="0"/>
-              </a:ext>
-            </a:extLst>
-          </a:blip>
+          <a:blip r:embed="rId2"/>
           <a:stretch>
             <a:fillRect/>
           </a:stretch>
         </p:blipFill>
         <p:spPr>
           <a:xfrm>
-            <a:off x="1878852" y="1100822"/>
-            <a:ext cx="8434296" cy="5466051"/>
+            <a:off x="4568658" y="109074"/>
+            <a:ext cx="5487166" cy="6639852"/>
           </a:xfrm>
           <a:prstGeom prst="rect">
             <a:avLst/>
@@ -5190,10 +7346,10 @@
       </p:pic>
       <p:sp>
         <p:nvSpPr>
-          <p:cNvPr id="4" name="กล่องข้อความ 3">
-            <a:extLst>
-              <a:ext uri="{FF2B5EF4-FFF2-40B4-BE49-F238E27FC236}">
-                <a16:creationId xmlns:a16="http://schemas.microsoft.com/office/drawing/2014/main" id="{4F138B03-FF5E-43AF-E1FF-19AA629F1B09}"/>
+          <p:cNvPr id="6" name="กล่องข้อความ 5">
+            <a:extLst>
+              <a:ext uri="{FF2B5EF4-FFF2-40B4-BE49-F238E27FC236}">
+                <a16:creationId xmlns:a16="http://schemas.microsoft.com/office/drawing/2014/main" id="{EAF8FBF1-86A1-9B82-8159-EF49916C04BF}"/>
               </a:ext>
             </a:extLst>
           </p:cNvPr>
@@ -5202,7 +7358,7 @@
         </p:nvSpPr>
         <p:spPr>
           <a:xfrm>
-            <a:off x="11492889" y="6201619"/>
+            <a:off x="11492889" y="6213194"/>
             <a:ext cx="301686" cy="369332"/>
           </a:xfrm>
           <a:prstGeom prst="rect">
@@ -5223,45 +7379,10 @@
           </a:p>
         </p:txBody>
       </p:sp>
-      <p:sp>
-        <p:nvSpPr>
-          <p:cNvPr id="5" name="กล่องข้อความ 4">
-            <a:extLst>
-              <a:ext uri="{FF2B5EF4-FFF2-40B4-BE49-F238E27FC236}">
-                <a16:creationId xmlns:a16="http://schemas.microsoft.com/office/drawing/2014/main" id="{0F5A74A2-CA70-B673-FEAD-88D6453F4AB0}"/>
-              </a:ext>
-            </a:extLst>
-          </p:cNvPr>
-          <p:cNvSpPr txBox="1"/>
-          <p:nvPr/>
-        </p:nvSpPr>
-        <p:spPr>
-          <a:xfrm>
-            <a:off x="363894" y="223935"/>
-            <a:ext cx="5610831" cy="584775"/>
-          </a:xfrm>
-          <a:prstGeom prst="rect">
-            <a:avLst/>
-          </a:prstGeom>
-          <a:noFill/>
-        </p:spPr>
-        <p:txBody>
-          <a:bodyPr wrap="none" rtlCol="0">
-            <a:spAutoFit/>
-          </a:bodyPr>
-          <a:lstStyle/>
-          <a:p>
-            <a:r>
-              <a:rPr lang="en-US" sz="3200" dirty="0"/>
-              <a:t>Sequence Diagram: Login (POST)</a:t>
-            </a:r>
-          </a:p>
-        </p:txBody>
-      </p:sp>
     </p:spTree>
     <p:extLst>
       <p:ext uri="{BB962C8B-B14F-4D97-AF65-F5344CB8AC3E}">
-        <p14:creationId xmlns:p14="http://schemas.microsoft.com/office/powerpoint/2010/main" val="367910129"/>
+        <p14:creationId xmlns:p14="http://schemas.microsoft.com/office/powerpoint/2010/main" val="1021164863"/>
       </p:ext>
     </p:extLst>
   </p:cSld>
@@ -5288,12 +7409,47 @@
           <a:chExt cx="0" cy="0"/>
         </a:xfrm>
       </p:grpSpPr>
+      <p:sp>
+        <p:nvSpPr>
+          <p:cNvPr id="8" name="กล่องข้อความ 7">
+            <a:extLst>
+              <a:ext uri="{FF2B5EF4-FFF2-40B4-BE49-F238E27FC236}">
+                <a16:creationId xmlns:a16="http://schemas.microsoft.com/office/drawing/2014/main" id="{C85C1662-391F-503B-67A6-F79737A40D40}"/>
+              </a:ext>
+            </a:extLst>
+          </p:cNvPr>
+          <p:cNvSpPr txBox="1"/>
+          <p:nvPr/>
+        </p:nvSpPr>
+        <p:spPr>
+          <a:xfrm>
+            <a:off x="363894" y="223935"/>
+            <a:ext cx="3090526" cy="584775"/>
+          </a:xfrm>
+          <a:prstGeom prst="rect">
+            <a:avLst/>
+          </a:prstGeom>
+          <a:noFill/>
+        </p:spPr>
+        <p:txBody>
+          <a:bodyPr wrap="none" rtlCol="0">
+            <a:spAutoFit/>
+          </a:bodyPr>
+          <a:lstStyle/>
+          <a:p>
+            <a:r>
+              <a:rPr lang="en-US" sz="3200" dirty="0"/>
+              <a:t>controller/auth.js</a:t>
+            </a:r>
+          </a:p>
+        </p:txBody>
+      </p:sp>
       <p:pic>
         <p:nvPicPr>
-          <p:cNvPr id="3" name="รูปภาพ 2">
-            <a:extLst>
-              <a:ext uri="{FF2B5EF4-FFF2-40B4-BE49-F238E27FC236}">
-                <a16:creationId xmlns:a16="http://schemas.microsoft.com/office/drawing/2014/main" id="{2EF2972F-4163-563D-792E-80D3C634BC00}"/>
+          <p:cNvPr id="4" name="รูปภาพ 3">
+            <a:extLst>
+              <a:ext uri="{FF2B5EF4-FFF2-40B4-BE49-F238E27FC236}">
+                <a16:creationId xmlns:a16="http://schemas.microsoft.com/office/drawing/2014/main" id="{6BB5A498-C3A0-CC90-A93E-47DDDAD681D8}"/>
               </a:ext>
             </a:extLst>
           </p:cNvPr>
@@ -5303,21 +7459,15 @@
           <p:nvPr/>
         </p:nvPicPr>
         <p:blipFill>
-          <a:blip r:embed="rId2">
-            <a:extLst>
-              <a:ext uri="{28A0092B-C50C-407E-A947-70E740481C1C}">
-                <a14:useLocalDpi xmlns:a14="http://schemas.microsoft.com/office/drawing/2010/main" val="0"/>
-              </a:ext>
-            </a:extLst>
-          </a:blip>
+          <a:blip r:embed="rId2"/>
           <a:stretch>
             <a:fillRect/>
           </a:stretch>
         </p:blipFill>
         <p:spPr>
           <a:xfrm>
-            <a:off x="1738310" y="1092282"/>
-            <a:ext cx="8715379" cy="5289856"/>
+            <a:off x="3991646" y="424335"/>
+            <a:ext cx="6759212" cy="6009330"/>
           </a:xfrm>
           <a:prstGeom prst="rect">
             <a:avLst/>
@@ -5326,10 +7476,10 @@
       </p:pic>
       <p:sp>
         <p:nvSpPr>
-          <p:cNvPr id="4" name="กล่องข้อความ 3">
-            <a:extLst>
-              <a:ext uri="{FF2B5EF4-FFF2-40B4-BE49-F238E27FC236}">
-                <a16:creationId xmlns:a16="http://schemas.microsoft.com/office/drawing/2014/main" id="{13D8FFD8-E114-535F-6D7F-7602F2E5E483}"/>
+          <p:cNvPr id="6" name="กล่องข้อความ 5">
+            <a:extLst>
+              <a:ext uri="{FF2B5EF4-FFF2-40B4-BE49-F238E27FC236}">
+                <a16:creationId xmlns:a16="http://schemas.microsoft.com/office/drawing/2014/main" id="{9B4F09BF-B878-1184-264E-90BD388F0691}"/>
               </a:ext>
             </a:extLst>
           </p:cNvPr>
@@ -5338,7 +7488,7 @@
         </p:nvSpPr>
         <p:spPr>
           <a:xfrm>
-            <a:off x="11492889" y="6201619"/>
+            <a:off x="11492889" y="6213194"/>
             <a:ext cx="301686" cy="369332"/>
           </a:xfrm>
           <a:prstGeom prst="rect">
@@ -5359,45 +7509,10 @@
           </a:p>
         </p:txBody>
       </p:sp>
-      <p:sp>
-        <p:nvSpPr>
-          <p:cNvPr id="5" name="กล่องข้อความ 4">
-            <a:extLst>
-              <a:ext uri="{FF2B5EF4-FFF2-40B4-BE49-F238E27FC236}">
-                <a16:creationId xmlns:a16="http://schemas.microsoft.com/office/drawing/2014/main" id="{6521C9A2-4542-BCAB-2212-5DD0226AA3D6}"/>
-              </a:ext>
-            </a:extLst>
-          </p:cNvPr>
-          <p:cNvSpPr txBox="1"/>
-          <p:nvPr/>
-        </p:nvSpPr>
-        <p:spPr>
-          <a:xfrm>
-            <a:off x="363894" y="223935"/>
-            <a:ext cx="5657318" cy="584775"/>
-          </a:xfrm>
-          <a:prstGeom prst="rect">
-            <a:avLst/>
-          </a:prstGeom>
-          <a:noFill/>
-        </p:spPr>
-        <p:txBody>
-          <a:bodyPr wrap="none" rtlCol="0">
-            <a:spAutoFit/>
-          </a:bodyPr>
-          <a:lstStyle/>
-          <a:p>
-            <a:r>
-              <a:rPr lang="en-US" sz="3200" dirty="0"/>
-              <a:t>Sequence Diagram: Logout (GET)</a:t>
-            </a:r>
-          </a:p>
-        </p:txBody>
-      </p:sp>
     </p:spTree>
     <p:extLst>
       <p:ext uri="{BB962C8B-B14F-4D97-AF65-F5344CB8AC3E}">
-        <p14:creationId xmlns:p14="http://schemas.microsoft.com/office/powerpoint/2010/main" val="2050740203"/>
+        <p14:creationId xmlns:p14="http://schemas.microsoft.com/office/powerpoint/2010/main" val="3952794961"/>
       </p:ext>
     </p:extLst>
   </p:cSld>
@@ -5424,12 +7539,47 @@
           <a:chExt cx="0" cy="0"/>
         </a:xfrm>
       </p:grpSpPr>
+      <p:sp>
+        <p:nvSpPr>
+          <p:cNvPr id="8" name="กล่องข้อความ 7">
+            <a:extLst>
+              <a:ext uri="{FF2B5EF4-FFF2-40B4-BE49-F238E27FC236}">
+                <a16:creationId xmlns:a16="http://schemas.microsoft.com/office/drawing/2014/main" id="{C85C1662-391F-503B-67A6-F79737A40D40}"/>
+              </a:ext>
+            </a:extLst>
+          </p:cNvPr>
+          <p:cNvSpPr txBox="1"/>
+          <p:nvPr/>
+        </p:nvSpPr>
+        <p:spPr>
+          <a:xfrm>
+            <a:off x="363894" y="223935"/>
+            <a:ext cx="3830536" cy="584775"/>
+          </a:xfrm>
+          <a:prstGeom prst="rect">
+            <a:avLst/>
+          </a:prstGeom>
+          <a:noFill/>
+        </p:spPr>
+        <p:txBody>
+          <a:bodyPr wrap="none" rtlCol="0">
+            <a:spAutoFit/>
+          </a:bodyPr>
+          <a:lstStyle/>
+          <a:p>
+            <a:r>
+              <a:rPr lang="en-US" sz="3200" dirty="0"/>
+              <a:t>controller/bookings.js</a:t>
+            </a:r>
+          </a:p>
+        </p:txBody>
+      </p:sp>
       <p:pic>
         <p:nvPicPr>
           <p:cNvPr id="3" name="รูปภาพ 2">
             <a:extLst>
               <a:ext uri="{FF2B5EF4-FFF2-40B4-BE49-F238E27FC236}">
-                <a16:creationId xmlns:a16="http://schemas.microsoft.com/office/drawing/2014/main" id="{C6B85D5C-ED72-99DB-0167-32F558A920D9}"/>
+                <a16:creationId xmlns:a16="http://schemas.microsoft.com/office/drawing/2014/main" id="{F8B371DE-10CE-BA5F-EF92-C404A973EC25}"/>
               </a:ext>
             </a:extLst>
           </p:cNvPr>
@@ -5439,21 +7589,15 @@
           <p:nvPr/>
         </p:nvPicPr>
         <p:blipFill>
-          <a:blip r:embed="rId2">
-            <a:extLst>
-              <a:ext uri="{28A0092B-C50C-407E-A947-70E740481C1C}">
-                <a14:useLocalDpi xmlns:a14="http://schemas.microsoft.com/office/drawing/2010/main" val="0"/>
-              </a:ext>
-            </a:extLst>
-          </a:blip>
+          <a:blip r:embed="rId2"/>
           <a:stretch>
             <a:fillRect/>
           </a:stretch>
         </p:blipFill>
         <p:spPr>
           <a:xfrm>
-            <a:off x="2370267" y="1111018"/>
-            <a:ext cx="7451466" cy="5459933"/>
+            <a:off x="1125895" y="897945"/>
+            <a:ext cx="9940209" cy="5881079"/>
           </a:xfrm>
           <a:prstGeom prst="rect">
             <a:avLst/>
@@ -5462,10 +7606,10 @@
       </p:pic>
       <p:sp>
         <p:nvSpPr>
-          <p:cNvPr id="4" name="กล่องข้อความ 3">
-            <a:extLst>
-              <a:ext uri="{FF2B5EF4-FFF2-40B4-BE49-F238E27FC236}">
-                <a16:creationId xmlns:a16="http://schemas.microsoft.com/office/drawing/2014/main" id="{BA557FDB-BE10-1B1A-7185-10478A19091F}"/>
+          <p:cNvPr id="6" name="กล่องข้อความ 5">
+            <a:extLst>
+              <a:ext uri="{FF2B5EF4-FFF2-40B4-BE49-F238E27FC236}">
+                <a16:creationId xmlns:a16="http://schemas.microsoft.com/office/drawing/2014/main" id="{9D850990-0072-BA3A-DFFA-19E015CB8543}"/>
               </a:ext>
             </a:extLst>
           </p:cNvPr>
@@ -5474,7 +7618,7 @@
         </p:nvSpPr>
         <p:spPr>
           <a:xfrm>
-            <a:off x="11492889" y="6201619"/>
+            <a:off x="11492889" y="6213194"/>
             <a:ext cx="301686" cy="369332"/>
           </a:xfrm>
           <a:prstGeom prst="rect">
@@ -5495,45 +7639,10 @@
           </a:p>
         </p:txBody>
       </p:sp>
-      <p:sp>
-        <p:nvSpPr>
-          <p:cNvPr id="5" name="กล่องข้อความ 4">
-            <a:extLst>
-              <a:ext uri="{FF2B5EF4-FFF2-40B4-BE49-F238E27FC236}">
-                <a16:creationId xmlns:a16="http://schemas.microsoft.com/office/drawing/2014/main" id="{27CD6C53-A106-8186-676D-6B055A5C3CAD}"/>
-              </a:ext>
-            </a:extLst>
-          </p:cNvPr>
-          <p:cNvSpPr txBox="1"/>
-          <p:nvPr/>
-        </p:nvSpPr>
-        <p:spPr>
-          <a:xfrm>
-            <a:off x="363894" y="223935"/>
-            <a:ext cx="6912726" cy="584775"/>
-          </a:xfrm>
-          <a:prstGeom prst="rect">
-            <a:avLst/>
-          </a:prstGeom>
-          <a:noFill/>
-        </p:spPr>
-        <p:txBody>
-          <a:bodyPr wrap="none" rtlCol="0">
-            <a:spAutoFit/>
-          </a:bodyPr>
-          <a:lstStyle/>
-          <a:p>
-            <a:r>
-              <a:rPr lang="en-US" sz="3200" dirty="0"/>
-              <a:t>Sequence Diagram: Get All Dentist (GET)</a:t>
-            </a:r>
-          </a:p>
-        </p:txBody>
-      </p:sp>
     </p:spTree>
     <p:extLst>
       <p:ext uri="{BB962C8B-B14F-4D97-AF65-F5344CB8AC3E}">
-        <p14:creationId xmlns:p14="http://schemas.microsoft.com/office/powerpoint/2010/main" val="489752955"/>
+        <p14:creationId xmlns:p14="http://schemas.microsoft.com/office/powerpoint/2010/main" val="2600109406"/>
       </p:ext>
     </p:extLst>
   </p:cSld>
@@ -5560,12 +7669,47 @@
           <a:chExt cx="0" cy="0"/>
         </a:xfrm>
       </p:grpSpPr>
+      <p:sp>
+        <p:nvSpPr>
+          <p:cNvPr id="8" name="กล่องข้อความ 7">
+            <a:extLst>
+              <a:ext uri="{FF2B5EF4-FFF2-40B4-BE49-F238E27FC236}">
+                <a16:creationId xmlns:a16="http://schemas.microsoft.com/office/drawing/2014/main" id="{C85C1662-391F-503B-67A6-F79737A40D40}"/>
+              </a:ext>
+            </a:extLst>
+          </p:cNvPr>
+          <p:cNvSpPr txBox="1"/>
+          <p:nvPr/>
+        </p:nvSpPr>
+        <p:spPr>
+          <a:xfrm>
+            <a:off x="363894" y="223935"/>
+            <a:ext cx="3488712" cy="584775"/>
+          </a:xfrm>
+          <a:prstGeom prst="rect">
+            <a:avLst/>
+          </a:prstGeom>
+          <a:noFill/>
+        </p:spPr>
+        <p:txBody>
+          <a:bodyPr wrap="none" rtlCol="0">
+            <a:spAutoFit/>
+          </a:bodyPr>
+          <a:lstStyle/>
+          <a:p>
+            <a:r>
+              <a:rPr lang="en-US" sz="3200" dirty="0"/>
+              <a:t>controller/dentist.js</a:t>
+            </a:r>
+          </a:p>
+        </p:txBody>
+      </p:sp>
       <p:pic>
         <p:nvPicPr>
           <p:cNvPr id="3" name="รูปภาพ 2">
             <a:extLst>
               <a:ext uri="{FF2B5EF4-FFF2-40B4-BE49-F238E27FC236}">
-                <a16:creationId xmlns:a16="http://schemas.microsoft.com/office/drawing/2014/main" id="{C046A252-6070-74EC-C5E0-DD7753A77896}"/>
+                <a16:creationId xmlns:a16="http://schemas.microsoft.com/office/drawing/2014/main" id="{AFB9C135-63F7-1158-1025-4D440B8A19C4}"/>
               </a:ext>
             </a:extLst>
           </p:cNvPr>
@@ -5575,33 +7719,57 @@
           <p:nvPr/>
         </p:nvPicPr>
         <p:blipFill>
-          <a:blip r:embed="rId2">
-            <a:extLst>
-              <a:ext uri="{28A0092B-C50C-407E-A947-70E740481C1C}">
-                <a14:useLocalDpi xmlns:a14="http://schemas.microsoft.com/office/drawing/2010/main" val="0"/>
-              </a:ext>
-            </a:extLst>
-          </a:blip>
+          <a:blip r:embed="rId2"/>
           <a:stretch>
             <a:fillRect/>
           </a:stretch>
         </p:blipFill>
         <p:spPr>
           <a:xfrm>
-            <a:off x="1662112" y="890360"/>
-            <a:ext cx="8867775" cy="5495925"/>
+            <a:off x="858980" y="1608912"/>
+            <a:ext cx="10474039" cy="1602426"/>
           </a:xfrm>
           <a:prstGeom prst="rect">
             <a:avLst/>
           </a:prstGeom>
         </p:spPr>
       </p:pic>
-      <p:sp>
-        <p:nvSpPr>
-          <p:cNvPr id="4" name="กล่องข้อความ 3">
-            <a:extLst>
-              <a:ext uri="{FF2B5EF4-FFF2-40B4-BE49-F238E27FC236}">
-                <a16:creationId xmlns:a16="http://schemas.microsoft.com/office/drawing/2014/main" id="{E4B60041-ACC5-974D-D243-6C385A5529AF}"/>
+      <p:pic>
+        <p:nvPicPr>
+          <p:cNvPr id="6" name="รูปภาพ 5">
+            <a:extLst>
+              <a:ext uri="{FF2B5EF4-FFF2-40B4-BE49-F238E27FC236}">
+                <a16:creationId xmlns:a16="http://schemas.microsoft.com/office/drawing/2014/main" id="{3FFFAB6B-3F23-A328-C6A4-C55351A68C8F}"/>
+              </a:ext>
+            </a:extLst>
+          </p:cNvPr>
+          <p:cNvPicPr>
+            <a:picLocks noChangeAspect="1"/>
+          </p:cNvPicPr>
+          <p:nvPr/>
+        </p:nvPicPr>
+        <p:blipFill>
+          <a:blip r:embed="rId3"/>
+          <a:stretch>
+            <a:fillRect/>
+          </a:stretch>
+        </p:blipFill>
+        <p:spPr>
+          <a:xfrm>
+            <a:off x="858979" y="3646663"/>
+            <a:ext cx="10474039" cy="2466981"/>
+          </a:xfrm>
+          <a:prstGeom prst="rect">
+            <a:avLst/>
+          </a:prstGeom>
+        </p:spPr>
+      </p:pic>
+      <p:sp>
+        <p:nvSpPr>
+          <p:cNvPr id="9" name="กล่องข้อความ 8">
+            <a:extLst>
+              <a:ext uri="{FF2B5EF4-FFF2-40B4-BE49-F238E27FC236}">
+                <a16:creationId xmlns:a16="http://schemas.microsoft.com/office/drawing/2014/main" id="{658B592B-2E55-1F88-034B-7ABAFF307E8E}"/>
               </a:ext>
             </a:extLst>
           </p:cNvPr>
@@ -5610,7 +7778,7 @@
         </p:nvSpPr>
         <p:spPr>
           <a:xfrm>
-            <a:off x="11492889" y="6201619"/>
+            <a:off x="11492889" y="6213194"/>
             <a:ext cx="301686" cy="369332"/>
           </a:xfrm>
           <a:prstGeom prst="rect">
@@ -5631,45 +7799,10 @@
           </a:p>
         </p:txBody>
       </p:sp>
-      <p:sp>
-        <p:nvSpPr>
-          <p:cNvPr id="5" name="กล่องข้อความ 4">
-            <a:extLst>
-              <a:ext uri="{FF2B5EF4-FFF2-40B4-BE49-F238E27FC236}">
-                <a16:creationId xmlns:a16="http://schemas.microsoft.com/office/drawing/2014/main" id="{AEE70E60-98BC-72AC-9929-72CA6D927AE2}"/>
-              </a:ext>
-            </a:extLst>
-          </p:cNvPr>
-          <p:cNvSpPr txBox="1"/>
-          <p:nvPr/>
-        </p:nvSpPr>
-        <p:spPr>
-          <a:xfrm>
-            <a:off x="363894" y="223935"/>
-            <a:ext cx="7246727" cy="584775"/>
-          </a:xfrm>
-          <a:prstGeom prst="rect">
-            <a:avLst/>
-          </a:prstGeom>
-          <a:noFill/>
-        </p:spPr>
-        <p:txBody>
-          <a:bodyPr wrap="none" rtlCol="0">
-            <a:spAutoFit/>
-          </a:bodyPr>
-          <a:lstStyle/>
-          <a:p>
-            <a:r>
-              <a:rPr lang="en-US" sz="3200" dirty="0"/>
-              <a:t>Sequence Diagram: Create Booking (POST)</a:t>
-            </a:r>
-          </a:p>
-        </p:txBody>
-      </p:sp>
     </p:spTree>
     <p:extLst>
       <p:ext uri="{BB962C8B-B14F-4D97-AF65-F5344CB8AC3E}">
-        <p14:creationId xmlns:p14="http://schemas.microsoft.com/office/powerpoint/2010/main" val="667543355"/>
+        <p14:creationId xmlns:p14="http://schemas.microsoft.com/office/powerpoint/2010/main" val="3474914528"/>
       </p:ext>
     </p:extLst>
   </p:cSld>
@@ -5696,12 +7829,47 @@
           <a:chExt cx="0" cy="0"/>
         </a:xfrm>
       </p:grpSpPr>
+      <p:sp>
+        <p:nvSpPr>
+          <p:cNvPr id="8" name="กล่องข้อความ 7">
+            <a:extLst>
+              <a:ext uri="{FF2B5EF4-FFF2-40B4-BE49-F238E27FC236}">
+                <a16:creationId xmlns:a16="http://schemas.microsoft.com/office/drawing/2014/main" id="{C85C1662-391F-503B-67A6-F79737A40D40}"/>
+              </a:ext>
+            </a:extLst>
+          </p:cNvPr>
+          <p:cNvSpPr txBox="1"/>
+          <p:nvPr/>
+        </p:nvSpPr>
+        <p:spPr>
+          <a:xfrm>
+            <a:off x="363894" y="223935"/>
+            <a:ext cx="2930418" cy="584775"/>
+          </a:xfrm>
+          <a:prstGeom prst="rect">
+            <a:avLst/>
+          </a:prstGeom>
+          <a:noFill/>
+        </p:spPr>
+        <p:txBody>
+          <a:bodyPr wrap="none" rtlCol="0">
+            <a:spAutoFit/>
+          </a:bodyPr>
+          <a:lstStyle/>
+          <a:p>
+            <a:r>
+              <a:rPr lang="en-US" sz="3200" dirty="0"/>
+              <a:t>routes/dentist.js</a:t>
+            </a:r>
+          </a:p>
+        </p:txBody>
+      </p:sp>
       <p:pic>
         <p:nvPicPr>
-          <p:cNvPr id="3" name="รูปภาพ 2">
-            <a:extLst>
-              <a:ext uri="{FF2B5EF4-FFF2-40B4-BE49-F238E27FC236}">
-                <a16:creationId xmlns:a16="http://schemas.microsoft.com/office/drawing/2014/main" id="{6F2142F9-CECC-2E56-7FB2-A7BDB71BD21F}"/>
+          <p:cNvPr id="4" name="รูปภาพ 3">
+            <a:extLst>
+              <a:ext uri="{FF2B5EF4-FFF2-40B4-BE49-F238E27FC236}">
+                <a16:creationId xmlns:a16="http://schemas.microsoft.com/office/drawing/2014/main" id="{CC09C06D-86C0-BE40-D4B4-0230A1DDC534}"/>
               </a:ext>
             </a:extLst>
           </p:cNvPr>
@@ -5711,21 +7879,15 @@
           <p:nvPr/>
         </p:nvPicPr>
         <p:blipFill>
-          <a:blip r:embed="rId2">
-            <a:extLst>
-              <a:ext uri="{28A0092B-C50C-407E-A947-70E740481C1C}">
-                <a14:useLocalDpi xmlns:a14="http://schemas.microsoft.com/office/drawing/2010/main" val="0"/>
-              </a:ext>
-            </a:extLst>
-          </a:blip>
+          <a:blip r:embed="rId2"/>
           <a:stretch>
             <a:fillRect/>
           </a:stretch>
         </p:blipFill>
         <p:spPr>
           <a:xfrm>
-            <a:off x="295275" y="890360"/>
-            <a:ext cx="11601450" cy="5495925"/>
+            <a:off x="188036" y="1854136"/>
+            <a:ext cx="11815928" cy="3149728"/>
           </a:xfrm>
           <a:prstGeom prst="rect">
             <a:avLst/>
@@ -5734,10 +7896,10 @@
       </p:pic>
       <p:sp>
         <p:nvSpPr>
-          <p:cNvPr id="4" name="กล่องข้อความ 3">
-            <a:extLst>
-              <a:ext uri="{FF2B5EF4-FFF2-40B4-BE49-F238E27FC236}">
-                <a16:creationId xmlns:a16="http://schemas.microsoft.com/office/drawing/2014/main" id="{6F568353-C51D-FB3E-383B-41629AAB2277}"/>
+          <p:cNvPr id="7" name="กล่องข้อความ 6">
+            <a:extLst>
+              <a:ext uri="{FF2B5EF4-FFF2-40B4-BE49-F238E27FC236}">
+                <a16:creationId xmlns:a16="http://schemas.microsoft.com/office/drawing/2014/main" id="{5385D3F6-6360-7603-4688-9926EA7914BE}"/>
               </a:ext>
             </a:extLst>
           </p:cNvPr>
@@ -5746,7 +7908,7 @@
         </p:nvSpPr>
         <p:spPr>
           <a:xfrm>
-            <a:off x="11492889" y="6201619"/>
+            <a:off x="11492889" y="6213194"/>
             <a:ext cx="301686" cy="369332"/>
           </a:xfrm>
           <a:prstGeom prst="rect">
@@ -5767,45 +7929,10 @@
           </a:p>
         </p:txBody>
       </p:sp>
-      <p:sp>
-        <p:nvSpPr>
-          <p:cNvPr id="5" name="กล่องข้อความ 4">
-            <a:extLst>
-              <a:ext uri="{FF2B5EF4-FFF2-40B4-BE49-F238E27FC236}">
-                <a16:creationId xmlns:a16="http://schemas.microsoft.com/office/drawing/2014/main" id="{3003A8B6-A8A0-7D2F-4A0C-F3C04FBE2274}"/>
-              </a:ext>
-            </a:extLst>
-          </p:cNvPr>
-          <p:cNvSpPr txBox="1"/>
-          <p:nvPr/>
-        </p:nvSpPr>
-        <p:spPr>
-          <a:xfrm>
-            <a:off x="363894" y="223935"/>
-            <a:ext cx="7186006" cy="584775"/>
-          </a:xfrm>
-          <a:prstGeom prst="rect">
-            <a:avLst/>
-          </a:prstGeom>
-          <a:noFill/>
-        </p:spPr>
-        <p:txBody>
-          <a:bodyPr wrap="none" rtlCol="0">
-            <a:spAutoFit/>
-          </a:bodyPr>
-          <a:lstStyle/>
-          <a:p>
-            <a:r>
-              <a:rPr lang="en-US" sz="3200" dirty="0"/>
-              <a:t>Sequence Diagram: Update Booking (PUT)</a:t>
-            </a:r>
-          </a:p>
-        </p:txBody>
-      </p:sp>
     </p:spTree>
     <p:extLst>
       <p:ext uri="{BB962C8B-B14F-4D97-AF65-F5344CB8AC3E}">
-        <p14:creationId xmlns:p14="http://schemas.microsoft.com/office/powerpoint/2010/main" val="982277753"/>
+        <p14:creationId xmlns:p14="http://schemas.microsoft.com/office/powerpoint/2010/main" val="2732559403"/>
       </p:ext>
     </p:extLst>
   </p:cSld>
@@ -6108,4 +8235,299 @@
     </a:ext>
   </a:extLst>
 </a:theme>
+</file>
+
+<file path=ppt/theme/theme2.xml><?xml version="1.0" encoding="utf-8"?>
+<a:theme xmlns:a="http://schemas.openxmlformats.org/drawingml/2006/main" name="ธีมของ Office">
+  <a:themeElements>
+    <a:clrScheme name="Office">
+      <a:dk1>
+        <a:sysClr val="windowText" lastClr="000000"/>
+      </a:dk1>
+      <a:lt1>
+        <a:sysClr val="window" lastClr="FFFFFF"/>
+      </a:lt1>
+      <a:dk2>
+        <a:srgbClr val="44546A"/>
+      </a:dk2>
+      <a:lt2>
+        <a:srgbClr val="E7E6E6"/>
+      </a:lt2>
+      <a:accent1>
+        <a:srgbClr val="4472C4"/>
+      </a:accent1>
+      <a:accent2>
+        <a:srgbClr val="ED7D31"/>
+      </a:accent2>
+      <a:accent3>
+        <a:srgbClr val="A5A5A5"/>
+      </a:accent3>
+      <a:accent4>
+        <a:srgbClr val="FFC000"/>
+      </a:accent4>
+      <a:accent5>
+        <a:srgbClr val="5B9BD5"/>
+      </a:accent5>
+      <a:accent6>
+        <a:srgbClr val="70AD47"/>
+      </a:accent6>
+      <a:hlink>
+        <a:srgbClr val="0563C1"/>
+      </a:hlink>
+      <a:folHlink>
+        <a:srgbClr val="954F72"/>
+      </a:folHlink>
+    </a:clrScheme>
+    <a:fontScheme name="Office">
+      <a:majorFont>
+        <a:latin typeface="Calibri Light" panose="020F0302020204030204"/>
+        <a:ea typeface=""/>
+        <a:cs typeface=""/>
+        <a:font script="Jpan" typeface="游ゴシック Light"/>
+        <a:font script="Hang" typeface="맑은 고딕"/>
+        <a:font script="Hans" typeface="等线 Light"/>
+        <a:font script="Hant" typeface="新細明體"/>
+        <a:font script="Arab" typeface="Times New Roman"/>
+        <a:font script="Hebr" typeface="Times New Roman"/>
+        <a:font script="Thai" typeface="Angsana New"/>
+        <a:font script="Ethi" typeface="Nyala"/>
+        <a:font script="Beng" typeface="Vrinda"/>
+        <a:font script="Gujr" typeface="Shruti"/>
+        <a:font script="Khmr" typeface="MoolBoran"/>
+        <a:font script="Knda" typeface="Tunga"/>
+        <a:font script="Guru" typeface="Raavi"/>
+        <a:font script="Cans" typeface="Euphemia"/>
+        <a:font script="Cher" typeface="Plantagenet Cherokee"/>
+        <a:font script="Yiii" typeface="Microsoft Yi Baiti"/>
+        <a:font script="Tibt" typeface="Microsoft Himalaya"/>
+        <a:font script="Thaa" typeface="MV Boli"/>
+        <a:font script="Deva" typeface="Mangal"/>
+        <a:font script="Telu" typeface="Gautami"/>
+        <a:font script="Taml" typeface="Latha"/>
+        <a:font script="Syrc" typeface="Estrangelo Edessa"/>
+        <a:font script="Orya" typeface="Kalinga"/>
+        <a:font script="Mlym" typeface="Kartika"/>
+        <a:font script="Laoo" typeface="DokChampa"/>
+        <a:font script="Sinh" typeface="Iskoola Pota"/>
+        <a:font script="Mong" typeface="Mongolian Baiti"/>
+        <a:font script="Viet" typeface="Times New Roman"/>
+        <a:font script="Uigh" typeface="Microsoft Uighur"/>
+        <a:font script="Geor" typeface="Sylfaen"/>
+        <a:font script="Armn" typeface="Arial"/>
+        <a:font script="Bugi" typeface="Leelawadee UI"/>
+        <a:font script="Bopo" typeface="Microsoft JhengHei"/>
+        <a:font script="Java" typeface="Javanese Text"/>
+        <a:font script="Lisu" typeface="Segoe UI"/>
+        <a:font script="Mymr" typeface="Myanmar Text"/>
+        <a:font script="Nkoo" typeface="Ebrima"/>
+        <a:font script="Olck" typeface="Nirmala UI"/>
+        <a:font script="Osma" typeface="Ebrima"/>
+        <a:font script="Phag" typeface="Phagspa"/>
+        <a:font script="Syrn" typeface="Estrangelo Edessa"/>
+        <a:font script="Syrj" typeface="Estrangelo Edessa"/>
+        <a:font script="Syre" typeface="Estrangelo Edessa"/>
+        <a:font script="Sora" typeface="Nirmala UI"/>
+        <a:font script="Tale" typeface="Microsoft Tai Le"/>
+        <a:font script="Talu" typeface="Microsoft New Tai Lue"/>
+        <a:font script="Tfng" typeface="Ebrima"/>
+      </a:majorFont>
+      <a:minorFont>
+        <a:latin typeface="Calibri" panose="020F0502020204030204"/>
+        <a:ea typeface=""/>
+        <a:cs typeface=""/>
+        <a:font script="Jpan" typeface="游ゴシック"/>
+        <a:font script="Hang" typeface="맑은 고딕"/>
+        <a:font script="Hans" typeface="等线"/>
+        <a:font script="Hant" typeface="新細明體"/>
+        <a:font script="Arab" typeface="Arial"/>
+        <a:font script="Hebr" typeface="Arial"/>
+        <a:font script="Thai" typeface="Cordia New"/>
+        <a:font script="Ethi" typeface="Nyala"/>
+        <a:font script="Beng" typeface="Vrinda"/>
+        <a:font script="Gujr" typeface="Shruti"/>
+        <a:font script="Khmr" typeface="DaunPenh"/>
+        <a:font script="Knda" typeface="Tunga"/>
+        <a:font script="Guru" typeface="Raavi"/>
+        <a:font script="Cans" typeface="Euphemia"/>
+        <a:font script="Cher" typeface="Plantagenet Cherokee"/>
+        <a:font script="Yiii" typeface="Microsoft Yi Baiti"/>
+        <a:font script="Tibt" typeface="Microsoft Himalaya"/>
+        <a:font script="Thaa" typeface="MV Boli"/>
+        <a:font script="Deva" typeface="Mangal"/>
+        <a:font script="Telu" typeface="Gautami"/>
+        <a:font script="Taml" typeface="Latha"/>
+        <a:font script="Syrc" typeface="Estrangelo Edessa"/>
+        <a:font script="Orya" typeface="Kalinga"/>
+        <a:font script="Mlym" typeface="Kartika"/>
+        <a:font script="Laoo" typeface="DokChampa"/>
+        <a:font script="Sinh" typeface="Iskoola Pota"/>
+        <a:font script="Mong" typeface="Mongolian Baiti"/>
+        <a:font script="Viet" typeface="Arial"/>
+        <a:font script="Uigh" typeface="Microsoft Uighur"/>
+        <a:font script="Geor" typeface="Sylfaen"/>
+        <a:font script="Armn" typeface="Arial"/>
+        <a:font script="Bugi" typeface="Leelawadee UI"/>
+        <a:font script="Bopo" typeface="Microsoft JhengHei"/>
+        <a:font script="Java" typeface="Javanese Text"/>
+        <a:font script="Lisu" typeface="Segoe UI"/>
+        <a:font script="Mymr" typeface="Myanmar Text"/>
+        <a:font script="Nkoo" typeface="Ebrima"/>
+        <a:font script="Olck" typeface="Nirmala UI"/>
+        <a:font script="Osma" typeface="Ebrima"/>
+        <a:font script="Phag" typeface="Phagspa"/>
+        <a:font script="Syrn" typeface="Estrangelo Edessa"/>
+        <a:font script="Syrj" typeface="Estrangelo Edessa"/>
+        <a:font script="Syre" typeface="Estrangelo Edessa"/>
+        <a:font script="Sora" typeface="Nirmala UI"/>
+        <a:font script="Tale" typeface="Microsoft Tai Le"/>
+        <a:font script="Talu" typeface="Microsoft New Tai Lue"/>
+        <a:font script="Tfng" typeface="Ebrima"/>
+      </a:minorFont>
+    </a:fontScheme>
+    <a:fmtScheme name="Office">
+      <a:fillStyleLst>
+        <a:solidFill>
+          <a:schemeClr val="phClr"/>
+        </a:solidFill>
+        <a:gradFill rotWithShape="1">
+          <a:gsLst>
+            <a:gs pos="0">
+              <a:schemeClr val="phClr">
+                <a:lumMod val="110000"/>
+                <a:satMod val="105000"/>
+                <a:tint val="67000"/>
+              </a:schemeClr>
+            </a:gs>
+            <a:gs pos="50000">
+              <a:schemeClr val="phClr">
+                <a:lumMod val="105000"/>
+                <a:satMod val="103000"/>
+                <a:tint val="73000"/>
+              </a:schemeClr>
+            </a:gs>
+            <a:gs pos="100000">
+              <a:schemeClr val="phClr">
+                <a:lumMod val="105000"/>
+                <a:satMod val="109000"/>
+                <a:tint val="81000"/>
+              </a:schemeClr>
+            </a:gs>
+          </a:gsLst>
+          <a:lin ang="5400000" scaled="0"/>
+        </a:gradFill>
+        <a:gradFill rotWithShape="1">
+          <a:gsLst>
+            <a:gs pos="0">
+              <a:schemeClr val="phClr">
+                <a:satMod val="103000"/>
+                <a:lumMod val="102000"/>
+                <a:tint val="94000"/>
+              </a:schemeClr>
+            </a:gs>
+            <a:gs pos="50000">
+              <a:schemeClr val="phClr">
+                <a:satMod val="110000"/>
+                <a:lumMod val="100000"/>
+                <a:shade val="100000"/>
+              </a:schemeClr>
+            </a:gs>
+            <a:gs pos="100000">
+              <a:schemeClr val="phClr">
+                <a:lumMod val="99000"/>
+                <a:satMod val="120000"/>
+                <a:shade val="78000"/>
+              </a:schemeClr>
+            </a:gs>
+          </a:gsLst>
+          <a:lin ang="5400000" scaled="0"/>
+        </a:gradFill>
+      </a:fillStyleLst>
+      <a:lnStyleLst>
+        <a:ln w="6350" cap="flat" cmpd="sng" algn="ctr">
+          <a:solidFill>
+            <a:schemeClr val="phClr"/>
+          </a:solidFill>
+          <a:prstDash val="solid"/>
+          <a:miter lim="800000"/>
+        </a:ln>
+        <a:ln w="12700" cap="flat" cmpd="sng" algn="ctr">
+          <a:solidFill>
+            <a:schemeClr val="phClr"/>
+          </a:solidFill>
+          <a:prstDash val="solid"/>
+          <a:miter lim="800000"/>
+        </a:ln>
+        <a:ln w="19050" cap="flat" cmpd="sng" algn="ctr">
+          <a:solidFill>
+            <a:schemeClr val="phClr"/>
+          </a:solidFill>
+          <a:prstDash val="solid"/>
+          <a:miter lim="800000"/>
+        </a:ln>
+      </a:lnStyleLst>
+      <a:effectStyleLst>
+        <a:effectStyle>
+          <a:effectLst/>
+        </a:effectStyle>
+        <a:effectStyle>
+          <a:effectLst/>
+        </a:effectStyle>
+        <a:effectStyle>
+          <a:effectLst>
+            <a:outerShdw blurRad="57150" dist="19050" dir="5400000" algn="ctr" rotWithShape="0">
+              <a:srgbClr val="000000">
+                <a:alpha val="63000"/>
+              </a:srgbClr>
+            </a:outerShdw>
+          </a:effectLst>
+        </a:effectStyle>
+      </a:effectStyleLst>
+      <a:bgFillStyleLst>
+        <a:solidFill>
+          <a:schemeClr val="phClr"/>
+        </a:solidFill>
+        <a:solidFill>
+          <a:schemeClr val="phClr">
+            <a:tint val="95000"/>
+            <a:satMod val="170000"/>
+          </a:schemeClr>
+        </a:solidFill>
+        <a:gradFill rotWithShape="1">
+          <a:gsLst>
+            <a:gs pos="0">
+              <a:schemeClr val="phClr">
+                <a:tint val="93000"/>
+                <a:satMod val="150000"/>
+                <a:shade val="98000"/>
+                <a:lumMod val="102000"/>
+              </a:schemeClr>
+            </a:gs>
+            <a:gs pos="50000">
+              <a:schemeClr val="phClr">
+                <a:tint val="98000"/>
+                <a:satMod val="130000"/>
+                <a:shade val="90000"/>
+                <a:lumMod val="103000"/>
+              </a:schemeClr>
+            </a:gs>
+            <a:gs pos="100000">
+              <a:schemeClr val="phClr">
+                <a:shade val="63000"/>
+                <a:satMod val="120000"/>
+              </a:schemeClr>
+            </a:gs>
+          </a:gsLst>
+          <a:lin ang="5400000" scaled="0"/>
+        </a:gradFill>
+      </a:bgFillStyleLst>
+    </a:fmtScheme>
+  </a:themeElements>
+  <a:objectDefaults/>
+  <a:extraClrSchemeLst/>
+  <a:extLst>
+    <a:ext uri="{05A4C25C-085E-4340-85A3-A5531E510DB2}">
+      <thm15:themeFamily xmlns:thm15="http://schemas.microsoft.com/office/thememl/2012/main" name="Office Theme" id="{62F939B6-93AF-4DB8-9C6B-D6C7DFDC589F}" vid="{4A3C46E8-61CC-4603-A589-7422A47A8E4A}"/>
+    </a:ext>
+  </a:extLst>
+</a:theme>
 </file>
</xml_diff>